<commit_message>
Update to presentation with anomaly characteristics and protocol distribution
</commit_message>
<xml_diff>
--- a/Documentation/Anomaly-Detection-in-Network-Traffic-with-K-means-Clustering.pptx
+++ b/Documentation/Anomaly-Detection-in-Network-Traffic-with-K-means-Clustering.pptx
@@ -5,7 +5,7 @@
     <p:sldMasterId id="2147483648" r:id="rId1"/>
   </p:sldMasterIdLst>
   <p:notesMasterIdLst>
-    <p:notesMasterId r:id="rId20"/>
+    <p:notesMasterId r:id="rId22"/>
   </p:notesMasterIdLst>
   <p:sldIdLst>
     <p:sldId id="256" r:id="rId2"/>
@@ -18,14 +18,16 @@
     <p:sldId id="259" r:id="rId9"/>
     <p:sldId id="274" r:id="rId10"/>
     <p:sldId id="263" r:id="rId11"/>
-    <p:sldId id="261" r:id="rId12"/>
-    <p:sldId id="262" r:id="rId13"/>
-    <p:sldId id="264" r:id="rId14"/>
-    <p:sldId id="272" r:id="rId15"/>
-    <p:sldId id="273" r:id="rId16"/>
-    <p:sldId id="265" r:id="rId17"/>
-    <p:sldId id="266" r:id="rId18"/>
-    <p:sldId id="267" r:id="rId19"/>
+    <p:sldId id="275" r:id="rId12"/>
+    <p:sldId id="261" r:id="rId13"/>
+    <p:sldId id="262" r:id="rId14"/>
+    <p:sldId id="264" r:id="rId15"/>
+    <p:sldId id="272" r:id="rId16"/>
+    <p:sldId id="273" r:id="rId17"/>
+    <p:sldId id="265" r:id="rId18"/>
+    <p:sldId id="276" r:id="rId19"/>
+    <p:sldId id="266" r:id="rId20"/>
+    <p:sldId id="267" r:id="rId21"/>
   </p:sldIdLst>
   <p:sldSz cx="12192000" cy="6858000"/>
   <p:notesSz cx="6858000" cy="9144000"/>
@@ -132,6 +134,924 @@
 </p:presentation>
 </file>
 
+<file path=ppt/charts/chart1.xml><?xml version="1.0" encoding="utf-8"?>
+<c:chartSpace xmlns:c="http://schemas.openxmlformats.org/drawingml/2006/chart" xmlns:a="http://schemas.openxmlformats.org/drawingml/2006/main" xmlns:r="http://schemas.openxmlformats.org/officeDocument/2006/relationships" xmlns:c16r2="http://schemas.microsoft.com/office/drawing/2015/06/chart">
+  <c:date1904 val="0"/>
+  <c:lang val="fr-FR"/>
+  <c:roundedCorners val="0"/>
+  <mc:AlternateContent xmlns:mc="http://schemas.openxmlformats.org/markup-compatibility/2006">
+    <mc:Choice xmlns:c14="http://schemas.microsoft.com/office/drawing/2007/8/2/chart" Requires="c14">
+      <c14:style val="102"/>
+    </mc:Choice>
+    <mc:Fallback>
+      <c:style val="2"/>
+    </mc:Fallback>
+  </mc:AlternateContent>
+  <c:chart>
+    <c:title>
+      <c:tx>
+        <c:rich>
+          <a:bodyPr rot="0" spcFirstLastPara="1" vertOverflow="ellipsis" vert="horz" wrap="square" anchor="ctr" anchorCtr="1"/>
+          <a:lstStyle/>
+          <a:p>
+            <a:pPr>
+              <a:defRPr sz="1800" b="1" i="0" u="none" strike="noStrike" kern="1200" baseline="0">
+                <a:solidFill>
+                  <a:schemeClr val="dk1">
+                    <a:lumMod val="65000"/>
+                    <a:lumOff val="35000"/>
+                  </a:schemeClr>
+                </a:solidFill>
+                <a:latin typeface="+mn-lt"/>
+                <a:ea typeface="+mn-ea"/>
+                <a:cs typeface="+mn-cs"/>
+              </a:defRPr>
+            </a:pPr>
+            <a:r>
+              <a:rPr lang="en-US"/>
+              <a:t>Distribution of Protocol</a:t>
+            </a:r>
+          </a:p>
+        </c:rich>
+      </c:tx>
+      <c:overlay val="0"/>
+      <c:spPr>
+        <a:noFill/>
+        <a:ln>
+          <a:noFill/>
+        </a:ln>
+        <a:effectLst/>
+      </c:spPr>
+      <c:txPr>
+        <a:bodyPr rot="0" spcFirstLastPara="1" vertOverflow="ellipsis" vert="horz" wrap="square" anchor="ctr" anchorCtr="1"/>
+        <a:lstStyle/>
+        <a:p>
+          <a:pPr>
+            <a:defRPr sz="1800" b="1" i="0" u="none" strike="noStrike" kern="1200" baseline="0">
+              <a:solidFill>
+                <a:schemeClr val="dk1">
+                  <a:lumMod val="65000"/>
+                  <a:lumOff val="35000"/>
+                </a:schemeClr>
+              </a:solidFill>
+              <a:latin typeface="+mn-lt"/>
+              <a:ea typeface="+mn-ea"/>
+              <a:cs typeface="+mn-cs"/>
+            </a:defRPr>
+          </a:pPr>
+          <a:endParaRPr lang="fr-FR"/>
+        </a:p>
+      </c:txPr>
+    </c:title>
+    <c:autoTitleDeleted val="0"/>
+    <c:plotArea>
+      <c:layout/>
+      <c:pieChart>
+        <c:varyColors val="1"/>
+        <c:ser>
+          <c:idx val="0"/>
+          <c:order val="0"/>
+          <c:dPt>
+            <c:idx val="0"/>
+            <c:bubble3D val="0"/>
+            <c:spPr>
+              <a:solidFill>
+                <a:schemeClr val="accent1"/>
+              </a:solidFill>
+              <a:ln>
+                <a:noFill/>
+              </a:ln>
+              <a:effectLst>
+                <a:outerShdw blurRad="317500" algn="ctr" rotWithShape="0">
+                  <a:prstClr val="black">
+                    <a:alpha val="25000"/>
+                  </a:prstClr>
+                </a:outerShdw>
+              </a:effectLst>
+            </c:spPr>
+            <c:extLst>
+              <c:ext xmlns:c16="http://schemas.microsoft.com/office/drawing/2014/chart" uri="{C3380CC4-5D6E-409C-BE32-E72D297353CC}">
+                <c16:uniqueId val="{00000001-9F60-46EC-B7B8-BD8352C63DAF}"/>
+              </c:ext>
+            </c:extLst>
+          </c:dPt>
+          <c:dPt>
+            <c:idx val="1"/>
+            <c:bubble3D val="0"/>
+            <c:spPr>
+              <a:solidFill>
+                <a:schemeClr val="accent2"/>
+              </a:solidFill>
+              <a:ln>
+                <a:noFill/>
+              </a:ln>
+              <a:effectLst>
+                <a:outerShdw blurRad="317500" algn="ctr" rotWithShape="0">
+                  <a:prstClr val="black">
+                    <a:alpha val="25000"/>
+                  </a:prstClr>
+                </a:outerShdw>
+              </a:effectLst>
+            </c:spPr>
+            <c:extLst>
+              <c:ext xmlns:c16="http://schemas.microsoft.com/office/drawing/2014/chart" uri="{C3380CC4-5D6E-409C-BE32-E72D297353CC}">
+                <c16:uniqueId val="{00000003-9F60-46EC-B7B8-BD8352C63DAF}"/>
+              </c:ext>
+            </c:extLst>
+          </c:dPt>
+          <c:dPt>
+            <c:idx val="2"/>
+            <c:bubble3D val="0"/>
+            <c:spPr>
+              <a:solidFill>
+                <a:schemeClr val="accent3"/>
+              </a:solidFill>
+              <a:ln>
+                <a:noFill/>
+              </a:ln>
+              <a:effectLst>
+                <a:outerShdw blurRad="317500" algn="ctr" rotWithShape="0">
+                  <a:prstClr val="black">
+                    <a:alpha val="25000"/>
+                  </a:prstClr>
+                </a:outerShdw>
+              </a:effectLst>
+            </c:spPr>
+            <c:extLst>
+              <c:ext xmlns:c16="http://schemas.microsoft.com/office/drawing/2014/chart" uri="{C3380CC4-5D6E-409C-BE32-E72D297353CC}">
+                <c16:uniqueId val="{00000005-9F60-46EC-B7B8-BD8352C63DAF}"/>
+              </c:ext>
+            </c:extLst>
+          </c:dPt>
+          <c:dLbls>
+            <c:spPr>
+              <a:noFill/>
+              <a:ln>
+                <a:noFill/>
+              </a:ln>
+              <a:effectLst/>
+            </c:spPr>
+            <c:txPr>
+              <a:bodyPr rot="0" spcFirstLastPara="1" vertOverflow="ellipsis" vert="horz" wrap="square" lIns="38100" tIns="19050" rIns="38100" bIns="19050" anchor="ctr" anchorCtr="1">
+                <a:spAutoFit/>
+              </a:bodyPr>
+              <a:lstStyle/>
+              <a:p>
+                <a:pPr>
+                  <a:defRPr sz="900" b="1" i="0" u="none" strike="noStrike" kern="1200" baseline="0">
+                    <a:solidFill>
+                      <a:schemeClr val="lt1"/>
+                    </a:solidFill>
+                    <a:latin typeface="+mn-lt"/>
+                    <a:ea typeface="+mn-ea"/>
+                    <a:cs typeface="+mn-cs"/>
+                  </a:defRPr>
+                </a:pPr>
+                <a:endParaRPr lang="fr-FR"/>
+              </a:p>
+            </c:txPr>
+            <c:dLblPos val="inEnd"/>
+            <c:showLegendKey val="0"/>
+            <c:showVal val="0"/>
+            <c:showCatName val="0"/>
+            <c:showSerName val="0"/>
+            <c:showPercent val="1"/>
+            <c:showBubbleSize val="0"/>
+            <c:showLeaderLines val="1"/>
+            <c:leaderLines>
+              <c:spPr>
+                <a:ln w="9525" cap="flat" cmpd="sng" algn="ctr">
+                  <a:solidFill>
+                    <a:schemeClr val="dk1">
+                      <a:lumMod val="35000"/>
+                      <a:lumOff val="65000"/>
+                    </a:schemeClr>
+                  </a:solidFill>
+                  <a:round/>
+                </a:ln>
+                <a:effectLst/>
+              </c:spPr>
+            </c:leaderLines>
+            <c:extLst>
+              <c:ext xmlns:c15="http://schemas.microsoft.com/office/drawing/2012/chart" uri="{CE6537A1-D6FC-4f65-9D91-7224C49458BB}"/>
+            </c:extLst>
+          </c:dLbls>
+          <c:cat>
+            <c:strRef>
+              <c:f>Feuil1!$A$1:$A$3</c:f>
+              <c:strCache>
+                <c:ptCount val="3"/>
+                <c:pt idx="0">
+                  <c:v>icmp</c:v>
+                </c:pt>
+                <c:pt idx="1">
+                  <c:v>tcp</c:v>
+                </c:pt>
+                <c:pt idx="2">
+                  <c:v>udp</c:v>
+                </c:pt>
+              </c:strCache>
+            </c:strRef>
+          </c:cat>
+          <c:val>
+            <c:numRef>
+              <c:f>Feuil1!$B$1:$B$3</c:f>
+              <c:numCache>
+                <c:formatCode>General</c:formatCode>
+                <c:ptCount val="3"/>
+                <c:pt idx="0">
+                  <c:v>2833545</c:v>
+                </c:pt>
+                <c:pt idx="1">
+                  <c:v>1870598</c:v>
+                </c:pt>
+                <c:pt idx="2">
+                  <c:v>194288</c:v>
+                </c:pt>
+              </c:numCache>
+            </c:numRef>
+          </c:val>
+          <c:extLst>
+            <c:ext xmlns:c16="http://schemas.microsoft.com/office/drawing/2014/chart" uri="{C3380CC4-5D6E-409C-BE32-E72D297353CC}">
+              <c16:uniqueId val="{00000006-9F60-46EC-B7B8-BD8352C63DAF}"/>
+            </c:ext>
+          </c:extLst>
+        </c:ser>
+        <c:dLbls>
+          <c:dLblPos val="inEnd"/>
+          <c:showLegendKey val="0"/>
+          <c:showVal val="0"/>
+          <c:showCatName val="0"/>
+          <c:showSerName val="0"/>
+          <c:showPercent val="1"/>
+          <c:showBubbleSize val="0"/>
+          <c:showLeaderLines val="1"/>
+        </c:dLbls>
+        <c:firstSliceAng val="0"/>
+      </c:pieChart>
+      <c:spPr>
+        <a:noFill/>
+        <a:ln>
+          <a:noFill/>
+        </a:ln>
+        <a:effectLst/>
+      </c:spPr>
+    </c:plotArea>
+    <c:legend>
+      <c:legendPos val="b"/>
+      <c:overlay val="0"/>
+      <c:spPr>
+        <a:solidFill>
+          <a:schemeClr val="lt1">
+            <a:alpha val="78000"/>
+          </a:schemeClr>
+        </a:solidFill>
+        <a:ln>
+          <a:noFill/>
+        </a:ln>
+        <a:effectLst/>
+      </c:spPr>
+      <c:txPr>
+        <a:bodyPr rot="0" spcFirstLastPara="1" vertOverflow="ellipsis" vert="horz" wrap="square" anchor="ctr" anchorCtr="1"/>
+        <a:lstStyle/>
+        <a:p>
+          <a:pPr>
+            <a:defRPr sz="900" b="0" i="0" u="none" strike="noStrike" kern="1200" baseline="0">
+              <a:solidFill>
+                <a:schemeClr val="dk1">
+                  <a:lumMod val="65000"/>
+                  <a:lumOff val="35000"/>
+                </a:schemeClr>
+              </a:solidFill>
+              <a:latin typeface="+mn-lt"/>
+              <a:ea typeface="+mn-ea"/>
+              <a:cs typeface="+mn-cs"/>
+            </a:defRPr>
+          </a:pPr>
+          <a:endParaRPr lang="fr-FR"/>
+        </a:p>
+      </c:txPr>
+    </c:legend>
+    <c:plotVisOnly val="1"/>
+    <c:dispBlanksAs val="gap"/>
+    <c:extLst>
+      <c:ext xmlns:c16r3="http://schemas.microsoft.com/office/drawing/2017/03/chart" uri="{56B9EC1D-385E-4148-901F-78D8002777C0}">
+        <c16r3:dataDisplayOptions16>
+          <c16r3:dispNaAsBlank val="1"/>
+        </c16r3:dataDisplayOptions16>
+      </c:ext>
+    </c:extLst>
+    <c:showDLblsOverMax val="0"/>
+  </c:chart>
+  <c:spPr>
+    <a:pattFill prst="dkDnDiag">
+      <a:fgClr>
+        <a:schemeClr val="lt1">
+          <a:lumMod val="95000"/>
+        </a:schemeClr>
+      </a:fgClr>
+      <a:bgClr>
+        <a:schemeClr val="lt1"/>
+      </a:bgClr>
+    </a:pattFill>
+    <a:ln w="9525" cap="flat" cmpd="sng" algn="ctr">
+      <a:solidFill>
+        <a:schemeClr val="dk1">
+          <a:lumMod val="15000"/>
+          <a:lumOff val="85000"/>
+        </a:schemeClr>
+      </a:solidFill>
+      <a:round/>
+    </a:ln>
+    <a:effectLst/>
+  </c:spPr>
+  <c:txPr>
+    <a:bodyPr/>
+    <a:lstStyle/>
+    <a:p>
+      <a:pPr>
+        <a:defRPr/>
+      </a:pPr>
+      <a:endParaRPr lang="fr-FR"/>
+    </a:p>
+  </c:txPr>
+  <c:externalData r:id="rId3">
+    <c:autoUpdate val="0"/>
+  </c:externalData>
+</c:chartSpace>
+</file>
+
+<file path=ppt/charts/colors1.xml><?xml version="1.0" encoding="utf-8"?>
+<cs:colorStyle xmlns:cs="http://schemas.microsoft.com/office/drawing/2012/chartStyle" xmlns:a="http://schemas.openxmlformats.org/drawingml/2006/main" meth="cycle" id="10">
+  <a:schemeClr val="accent1"/>
+  <a:schemeClr val="accent2"/>
+  <a:schemeClr val="accent3"/>
+  <a:schemeClr val="accent4"/>
+  <a:schemeClr val="accent5"/>
+  <a:schemeClr val="accent6"/>
+  <cs:variation/>
+  <cs:variation>
+    <a:lumMod val="60000"/>
+  </cs:variation>
+  <cs:variation>
+    <a:lumMod val="80000"/>
+    <a:lumOff val="20000"/>
+  </cs:variation>
+  <cs:variation>
+    <a:lumMod val="80000"/>
+  </cs:variation>
+  <cs:variation>
+    <a:lumMod val="60000"/>
+    <a:lumOff val="40000"/>
+  </cs:variation>
+  <cs:variation>
+    <a:lumMod val="50000"/>
+  </cs:variation>
+  <cs:variation>
+    <a:lumMod val="70000"/>
+    <a:lumOff val="30000"/>
+  </cs:variation>
+  <cs:variation>
+    <a:lumMod val="70000"/>
+  </cs:variation>
+  <cs:variation>
+    <a:lumMod val="50000"/>
+    <a:lumOff val="50000"/>
+  </cs:variation>
+</cs:colorStyle>
+</file>
+
+<file path=ppt/charts/style1.xml><?xml version="1.0" encoding="utf-8"?>
+<cs:chartStyle xmlns:cs="http://schemas.microsoft.com/office/drawing/2012/chartStyle" xmlns:a="http://schemas.openxmlformats.org/drawingml/2006/main" id="261">
+  <cs:axisTitle>
+    <cs:lnRef idx="0"/>
+    <cs:fillRef idx="0"/>
+    <cs:effectRef idx="0"/>
+    <cs:fontRef idx="minor">
+      <a:schemeClr val="dk1">
+        <a:lumMod val="65000"/>
+        <a:lumOff val="35000"/>
+      </a:schemeClr>
+    </cs:fontRef>
+    <cs:defRPr sz="900" kern="1200"/>
+  </cs:axisTitle>
+  <cs:categoryAxis>
+    <cs:lnRef idx="0"/>
+    <cs:fillRef idx="0"/>
+    <cs:effectRef idx="0"/>
+    <cs:fontRef idx="minor">
+      <a:schemeClr val="dk1">
+        <a:lumMod val="65000"/>
+        <a:lumOff val="35000"/>
+      </a:schemeClr>
+    </cs:fontRef>
+    <cs:defRPr sz="900" kern="1200"/>
+  </cs:categoryAxis>
+  <cs:chartArea>
+    <cs:lnRef idx="0"/>
+    <cs:fillRef idx="0"/>
+    <cs:effectRef idx="0"/>
+    <cs:fontRef idx="minor">
+      <a:schemeClr val="dk1"/>
+    </cs:fontRef>
+    <cs:spPr>
+      <a:pattFill prst="dkDnDiag">
+        <a:fgClr>
+          <a:schemeClr val="lt1">
+            <a:lumMod val="95000"/>
+          </a:schemeClr>
+        </a:fgClr>
+        <a:bgClr>
+          <a:schemeClr val="lt1"/>
+        </a:bgClr>
+      </a:pattFill>
+      <a:ln w="9525" cap="flat" cmpd="sng" algn="ctr">
+        <a:solidFill>
+          <a:schemeClr val="dk1">
+            <a:lumMod val="15000"/>
+            <a:lumOff val="85000"/>
+          </a:schemeClr>
+        </a:solidFill>
+        <a:round/>
+      </a:ln>
+    </cs:spPr>
+    <cs:defRPr sz="900" kern="1200"/>
+  </cs:chartArea>
+  <cs:dataLabel>
+    <cs:lnRef idx="0"/>
+    <cs:fillRef idx="0"/>
+    <cs:effectRef idx="0"/>
+    <cs:fontRef idx="minor">
+      <a:schemeClr val="lt1"/>
+    </cs:fontRef>
+    <cs:defRPr sz="900" b="1" i="0" u="none" strike="noStrike" kern="1200" baseline="0"/>
+  </cs:dataLabel>
+  <cs:dataLabelCallout>
+    <cs:lnRef idx="0"/>
+    <cs:fillRef idx="0"/>
+    <cs:effectRef idx="0"/>
+    <cs:fontRef idx="minor">
+      <a:schemeClr val="dk1">
+        <a:lumMod val="65000"/>
+        <a:lumOff val="35000"/>
+      </a:schemeClr>
+    </cs:fontRef>
+    <cs:spPr>
+      <a:solidFill>
+        <a:schemeClr val="lt1">
+          <a:alpha val="75000"/>
+        </a:schemeClr>
+      </a:solidFill>
+      <a:ln w="9525">
+        <a:solidFill>
+          <a:schemeClr val="dk1">
+            <a:lumMod val="25000"/>
+            <a:lumOff val="75000"/>
+          </a:schemeClr>
+        </a:solidFill>
+      </a:ln>
+    </cs:spPr>
+    <cs:defRPr sz="900" kern="1200"/>
+    <cs:bodyPr rot="0" spcFirstLastPara="1" vertOverflow="clip" horzOverflow="clip" vert="horz" wrap="square" lIns="36576" tIns="18288" rIns="36576" bIns="18288" anchor="ctr" anchorCtr="1">
+      <a:spAutoFit/>
+    </cs:bodyPr>
+  </cs:dataLabelCallout>
+  <cs:dataPoint>
+    <cs:lnRef idx="0"/>
+    <cs:fillRef idx="0">
+      <cs:styleClr val="auto"/>
+    </cs:fillRef>
+    <cs:effectRef idx="0"/>
+    <cs:fontRef idx="minor">
+      <a:schemeClr val="dk1"/>
+    </cs:fontRef>
+    <cs:spPr>
+      <a:solidFill>
+        <a:schemeClr val="phClr"/>
+      </a:solidFill>
+      <a:effectLst>
+        <a:outerShdw blurRad="317500" algn="ctr" rotWithShape="0">
+          <a:prstClr val="black">
+            <a:alpha val="25000"/>
+          </a:prstClr>
+        </a:outerShdw>
+      </a:effectLst>
+    </cs:spPr>
+  </cs:dataPoint>
+  <cs:dataPoint3D>
+    <cs:lnRef idx="0"/>
+    <cs:fillRef idx="0">
+      <cs:styleClr val="auto"/>
+    </cs:fillRef>
+    <cs:effectRef idx="0"/>
+    <cs:fontRef idx="minor">
+      <a:schemeClr val="dk1"/>
+    </cs:fontRef>
+    <cs:spPr>
+      <a:solidFill>
+        <a:schemeClr val="phClr"/>
+      </a:solidFill>
+      <a:effectLst>
+        <a:outerShdw blurRad="88900" sx="102000" sy="102000" algn="ctr" rotWithShape="0">
+          <a:prstClr val="black">
+            <a:alpha val="20000"/>
+          </a:prstClr>
+        </a:outerShdw>
+      </a:effectLst>
+      <a:scene3d>
+        <a:camera prst="orthographicFront"/>
+        <a:lightRig rig="threePt" dir="t"/>
+      </a:scene3d>
+      <a:sp3d prstMaterial="matte"/>
+    </cs:spPr>
+  </cs:dataPoint3D>
+  <cs:dataPointLine>
+    <cs:lnRef idx="0">
+      <cs:styleClr val="auto"/>
+    </cs:lnRef>
+    <cs:fillRef idx="0"/>
+    <cs:effectRef idx="0"/>
+    <cs:fontRef idx="minor">
+      <a:schemeClr val="dk1"/>
+    </cs:fontRef>
+    <cs:spPr>
+      <a:ln w="28575" cap="rnd">
+        <a:solidFill>
+          <a:schemeClr val="phClr"/>
+        </a:solidFill>
+        <a:round/>
+      </a:ln>
+    </cs:spPr>
+  </cs:dataPointLine>
+  <cs:dataPointMarker>
+    <cs:lnRef idx="0"/>
+    <cs:fillRef idx="0">
+      <cs:styleClr val="auto"/>
+    </cs:fillRef>
+    <cs:effectRef idx="0"/>
+    <cs:fontRef idx="minor">
+      <a:schemeClr val="dk1"/>
+    </cs:fontRef>
+    <cs:spPr>
+      <a:solidFill>
+        <a:schemeClr val="phClr"/>
+      </a:solidFill>
+      <a:ln w="9525">
+        <a:solidFill>
+          <a:schemeClr val="lt1"/>
+        </a:solidFill>
+      </a:ln>
+    </cs:spPr>
+  </cs:dataPointMarker>
+  <cs:dataPointMarkerLayout symbol="circle" size="6"/>
+  <cs:dataPointWireframe>
+    <cs:lnRef idx="0">
+      <cs:styleClr val="auto"/>
+    </cs:lnRef>
+    <cs:fillRef idx="0"/>
+    <cs:effectRef idx="0"/>
+    <cs:fontRef idx="minor">
+      <a:schemeClr val="dk1"/>
+    </cs:fontRef>
+    <cs:spPr>
+      <a:ln w="9525" cap="rnd">
+        <a:solidFill>
+          <a:schemeClr val="phClr"/>
+        </a:solidFill>
+        <a:round/>
+      </a:ln>
+    </cs:spPr>
+  </cs:dataPointWireframe>
+  <cs:dataTable>
+    <cs:lnRef idx="0"/>
+    <cs:fillRef idx="0"/>
+    <cs:effectRef idx="0"/>
+    <cs:fontRef idx="minor">
+      <a:schemeClr val="dk1">
+        <a:lumMod val="65000"/>
+        <a:lumOff val="35000"/>
+      </a:schemeClr>
+    </cs:fontRef>
+    <cs:spPr>
+      <a:noFill/>
+      <a:ln w="9525" cap="flat" cmpd="sng" algn="ctr">
+        <a:solidFill>
+          <a:schemeClr val="dk1">
+            <a:lumMod val="15000"/>
+            <a:lumOff val="85000"/>
+          </a:schemeClr>
+        </a:solidFill>
+        <a:round/>
+      </a:ln>
+    </cs:spPr>
+    <cs:defRPr sz="900" kern="1200"/>
+  </cs:dataTable>
+  <cs:downBar>
+    <cs:lnRef idx="0"/>
+    <cs:fillRef idx="0"/>
+    <cs:effectRef idx="0"/>
+    <cs:fontRef idx="minor">
+      <a:schemeClr val="dk1"/>
+    </cs:fontRef>
+    <cs:spPr>
+      <a:solidFill>
+        <a:schemeClr val="dk1">
+          <a:lumMod val="75000"/>
+          <a:lumOff val="25000"/>
+        </a:schemeClr>
+      </a:solidFill>
+      <a:ln w="9525" cap="flat" cmpd="sng" algn="ctr">
+        <a:solidFill>
+          <a:schemeClr val="dk1">
+            <a:lumMod val="65000"/>
+            <a:lumOff val="35000"/>
+          </a:schemeClr>
+        </a:solidFill>
+        <a:round/>
+      </a:ln>
+    </cs:spPr>
+  </cs:downBar>
+  <cs:dropLine>
+    <cs:lnRef idx="0"/>
+    <cs:fillRef idx="0"/>
+    <cs:effectRef idx="0"/>
+    <cs:fontRef idx="minor">
+      <a:schemeClr val="dk1"/>
+    </cs:fontRef>
+    <cs:spPr>
+      <a:ln w="9525" cap="flat" cmpd="sng" algn="ctr">
+        <a:solidFill>
+          <a:schemeClr val="dk1">
+            <a:lumMod val="35000"/>
+            <a:lumOff val="65000"/>
+          </a:schemeClr>
+        </a:solidFill>
+        <a:round/>
+      </a:ln>
+    </cs:spPr>
+  </cs:dropLine>
+  <cs:errorBar>
+    <cs:lnRef idx="0"/>
+    <cs:fillRef idx="0"/>
+    <cs:effectRef idx="0"/>
+    <cs:fontRef idx="minor">
+      <a:schemeClr val="dk1"/>
+    </cs:fontRef>
+    <cs:spPr>
+      <a:ln w="9525" cap="flat" cmpd="sng" algn="ctr">
+        <a:solidFill>
+          <a:schemeClr val="dk1">
+            <a:lumMod val="65000"/>
+            <a:lumOff val="35000"/>
+          </a:schemeClr>
+        </a:solidFill>
+        <a:round/>
+      </a:ln>
+    </cs:spPr>
+  </cs:errorBar>
+  <cs:floor>
+    <cs:lnRef idx="0"/>
+    <cs:fillRef idx="0"/>
+    <cs:effectRef idx="0"/>
+    <cs:fontRef idx="minor">
+      <a:schemeClr val="dk1"/>
+    </cs:fontRef>
+    <cs:spPr>
+      <a:noFill/>
+      <a:ln>
+        <a:noFill/>
+      </a:ln>
+    </cs:spPr>
+  </cs:floor>
+  <cs:gridlineMajor>
+    <cs:lnRef idx="0"/>
+    <cs:fillRef idx="0"/>
+    <cs:effectRef idx="0"/>
+    <cs:fontRef idx="minor">
+      <a:schemeClr val="dk1"/>
+    </cs:fontRef>
+    <cs:spPr>
+      <a:ln w="9525" cap="flat" cmpd="sng" algn="ctr">
+        <a:solidFill>
+          <a:schemeClr val="dk1">
+            <a:lumMod val="15000"/>
+            <a:lumOff val="85000"/>
+          </a:schemeClr>
+        </a:solidFill>
+        <a:round/>
+      </a:ln>
+    </cs:spPr>
+  </cs:gridlineMajor>
+  <cs:gridlineMinor>
+    <cs:lnRef idx="0"/>
+    <cs:fillRef idx="0"/>
+    <cs:effectRef idx="0"/>
+    <cs:fontRef idx="minor">
+      <a:schemeClr val="dk1"/>
+    </cs:fontRef>
+    <cs:spPr>
+      <a:ln w="9525" cap="flat" cmpd="sng" algn="ctr">
+        <a:solidFill>
+          <a:schemeClr val="dk1">
+            <a:lumMod val="5000"/>
+            <a:lumOff val="95000"/>
+          </a:schemeClr>
+        </a:solidFill>
+        <a:round/>
+      </a:ln>
+    </cs:spPr>
+  </cs:gridlineMinor>
+  <cs:hiLoLine>
+    <cs:lnRef idx="0"/>
+    <cs:fillRef idx="0"/>
+    <cs:effectRef idx="0"/>
+    <cs:fontRef idx="minor">
+      <a:schemeClr val="dk1"/>
+    </cs:fontRef>
+    <cs:spPr>
+      <a:ln w="9525" cap="flat" cmpd="sng" algn="ctr">
+        <a:solidFill>
+          <a:schemeClr val="dk1">
+            <a:lumMod val="50000"/>
+            <a:lumOff val="50000"/>
+          </a:schemeClr>
+        </a:solidFill>
+        <a:round/>
+      </a:ln>
+    </cs:spPr>
+  </cs:hiLoLine>
+  <cs:leaderLine>
+    <cs:lnRef idx="0"/>
+    <cs:fillRef idx="0"/>
+    <cs:effectRef idx="0"/>
+    <cs:fontRef idx="minor">
+      <a:schemeClr val="dk1"/>
+    </cs:fontRef>
+    <cs:spPr>
+      <a:ln w="9525" cap="flat" cmpd="sng" algn="ctr">
+        <a:solidFill>
+          <a:schemeClr val="dk1">
+            <a:lumMod val="35000"/>
+            <a:lumOff val="65000"/>
+          </a:schemeClr>
+        </a:solidFill>
+        <a:round/>
+      </a:ln>
+    </cs:spPr>
+  </cs:leaderLine>
+  <cs:legend>
+    <cs:lnRef idx="0"/>
+    <cs:fillRef idx="0"/>
+    <cs:effectRef idx="0"/>
+    <cs:fontRef idx="minor">
+      <a:schemeClr val="dk1">
+        <a:lumMod val="65000"/>
+        <a:lumOff val="35000"/>
+      </a:schemeClr>
+    </cs:fontRef>
+    <cs:spPr>
+      <a:solidFill>
+        <a:schemeClr val="lt1">
+          <a:alpha val="78000"/>
+        </a:schemeClr>
+      </a:solidFill>
+    </cs:spPr>
+    <cs:defRPr sz="900" kern="1200"/>
+  </cs:legend>
+  <cs:plotArea mods="allowNoFillOverride allowNoLineOverride">
+    <cs:lnRef idx="0"/>
+    <cs:fillRef idx="0"/>
+    <cs:effectRef idx="0"/>
+    <cs:fontRef idx="minor">
+      <a:schemeClr val="dk1"/>
+    </cs:fontRef>
+  </cs:plotArea>
+  <cs:plotArea3D mods="allowNoFillOverride allowNoLineOverride">
+    <cs:lnRef idx="0"/>
+    <cs:fillRef idx="0"/>
+    <cs:effectRef idx="0"/>
+    <cs:fontRef idx="minor">
+      <a:schemeClr val="dk1"/>
+    </cs:fontRef>
+  </cs:plotArea3D>
+  <cs:seriesAxis>
+    <cs:lnRef idx="0"/>
+    <cs:fillRef idx="0"/>
+    <cs:effectRef idx="0"/>
+    <cs:fontRef idx="minor">
+      <a:schemeClr val="dk1">
+        <a:lumMod val="65000"/>
+        <a:lumOff val="35000"/>
+      </a:schemeClr>
+    </cs:fontRef>
+    <cs:defRPr sz="900" kern="1200"/>
+  </cs:seriesAxis>
+  <cs:seriesLine>
+    <cs:lnRef idx="0"/>
+    <cs:fillRef idx="0"/>
+    <cs:effectRef idx="0"/>
+    <cs:fontRef idx="minor">
+      <a:schemeClr val="dk1"/>
+    </cs:fontRef>
+    <cs:spPr>
+      <a:ln w="9525" cap="flat" cmpd="sng" algn="ctr">
+        <a:solidFill>
+          <a:schemeClr val="dk1">
+            <a:lumMod val="35000"/>
+            <a:lumOff val="65000"/>
+          </a:schemeClr>
+        </a:solidFill>
+        <a:round/>
+      </a:ln>
+    </cs:spPr>
+  </cs:seriesLine>
+  <cs:title>
+    <cs:lnRef idx="0"/>
+    <cs:fillRef idx="0"/>
+    <cs:effectRef idx="0"/>
+    <cs:fontRef idx="minor">
+      <a:schemeClr val="dk1">
+        <a:lumMod val="65000"/>
+        <a:lumOff val="35000"/>
+      </a:schemeClr>
+    </cs:fontRef>
+    <cs:defRPr sz="1800" b="1" kern="1200" baseline="0"/>
+  </cs:title>
+  <cs:trendline>
+    <cs:lnRef idx="0">
+      <cs:styleClr val="auto"/>
+    </cs:lnRef>
+    <cs:fillRef idx="0"/>
+    <cs:effectRef idx="0"/>
+    <cs:fontRef idx="minor">
+      <a:schemeClr val="dk1"/>
+    </cs:fontRef>
+    <cs:spPr>
+      <a:ln w="19050" cap="rnd">
+        <a:solidFill>
+          <a:schemeClr val="phClr"/>
+        </a:solidFill>
+        <a:prstDash val="sysDash"/>
+      </a:ln>
+    </cs:spPr>
+  </cs:trendline>
+  <cs:trendlineLabel>
+    <cs:lnRef idx="0"/>
+    <cs:fillRef idx="0"/>
+    <cs:effectRef idx="0"/>
+    <cs:fontRef idx="minor">
+      <a:schemeClr val="dk1">
+        <a:lumMod val="65000"/>
+        <a:lumOff val="35000"/>
+      </a:schemeClr>
+    </cs:fontRef>
+    <cs:defRPr sz="900" kern="1200"/>
+  </cs:trendlineLabel>
+  <cs:upBar>
+    <cs:lnRef idx="0"/>
+    <cs:fillRef idx="0"/>
+    <cs:effectRef idx="0"/>
+    <cs:fontRef idx="minor">
+      <a:schemeClr val="dk1"/>
+    </cs:fontRef>
+    <cs:spPr>
+      <a:solidFill>
+        <a:schemeClr val="lt1"/>
+      </a:solidFill>
+      <a:ln w="9525" cap="flat" cmpd="sng" algn="ctr">
+        <a:solidFill>
+          <a:schemeClr val="dk1">
+            <a:lumMod val="65000"/>
+            <a:lumOff val="35000"/>
+          </a:schemeClr>
+        </a:solidFill>
+        <a:round/>
+      </a:ln>
+    </cs:spPr>
+  </cs:upBar>
+  <cs:valueAxis>
+    <cs:lnRef idx="0"/>
+    <cs:fillRef idx="0"/>
+    <cs:effectRef idx="0"/>
+    <cs:fontRef idx="minor">
+      <a:schemeClr val="dk1">
+        <a:lumMod val="65000"/>
+        <a:lumOff val="35000"/>
+      </a:schemeClr>
+    </cs:fontRef>
+    <cs:defRPr sz="900" kern="1200"/>
+  </cs:valueAxis>
+  <cs:wall>
+    <cs:lnRef idx="0"/>
+    <cs:fillRef idx="0"/>
+    <cs:effectRef idx="0"/>
+    <cs:fontRef idx="minor">
+      <a:schemeClr val="dk1"/>
+    </cs:fontRef>
+  </cs:wall>
+</cs:chartStyle>
+</file>
+
 <file path=ppt/notesMasters/notesMaster1.xml><?xml version="1.0" encoding="utf-8"?>
 <p:notesMaster xmlns:a="http://schemas.openxmlformats.org/drawingml/2006/main" xmlns:r="http://schemas.openxmlformats.org/officeDocument/2006/relationships" xmlns:p="http://schemas.openxmlformats.org/presentationml/2006/main">
   <p:cSld>
@@ -373,7 +1293,7 @@
           <a:p>
             <a:fld id="{0816C602-ED9F-514A-8C86-73D406EEAFE5}" type="slidenum">
               <a:rPr lang="fr-FR" smtClean="0"/>
-              <a:t>‹#›</a:t>
+              <a:t>‹N°›</a:t>
             </a:fld>
             <a:endParaRPr lang="fr-FR"/>
           </a:p>
@@ -1529,7 +2449,7 @@
           <a:p>
             <a:fld id="{50E96FFC-9A77-BE40-93A2-F2F19ACBA9AE}" type="slidenum">
               <a:rPr lang="fr-FR" smtClean="0"/>
-              <a:t>‹#›</a:t>
+              <a:t>‹N°›</a:t>
             </a:fld>
             <a:endParaRPr lang="fr-FR"/>
           </a:p>
@@ -1732,7 +2652,7 @@
           <a:p>
             <a:fld id="{50E96FFC-9A77-BE40-93A2-F2F19ACBA9AE}" type="slidenum">
               <a:rPr lang="fr-FR" smtClean="0"/>
-              <a:t>‹#›</a:t>
+              <a:t>‹N°›</a:t>
             </a:fld>
             <a:endParaRPr lang="fr-FR"/>
           </a:p>
@@ -1945,7 +2865,7 @@
           <a:p>
             <a:fld id="{50E96FFC-9A77-BE40-93A2-F2F19ACBA9AE}" type="slidenum">
               <a:rPr lang="fr-FR" smtClean="0"/>
-              <a:t>‹#›</a:t>
+              <a:t>‹N°›</a:t>
             </a:fld>
             <a:endParaRPr lang="fr-FR"/>
           </a:p>
@@ -2148,7 +3068,7 @@
           <a:p>
             <a:fld id="{50E96FFC-9A77-BE40-93A2-F2F19ACBA9AE}" type="slidenum">
               <a:rPr lang="fr-FR" smtClean="0"/>
-              <a:t>‹#›</a:t>
+              <a:t>‹N°›</a:t>
             </a:fld>
             <a:endParaRPr lang="fr-FR"/>
           </a:p>
@@ -2427,7 +3347,7 @@
           <a:p>
             <a:fld id="{50E96FFC-9A77-BE40-93A2-F2F19ACBA9AE}" type="slidenum">
               <a:rPr lang="fr-FR" smtClean="0"/>
-              <a:t>‹#›</a:t>
+              <a:t>‹N°›</a:t>
             </a:fld>
             <a:endParaRPr lang="fr-FR"/>
           </a:p>
@@ -2698,7 +3618,7 @@
           <a:p>
             <a:fld id="{50E96FFC-9A77-BE40-93A2-F2F19ACBA9AE}" type="slidenum">
               <a:rPr lang="fr-FR" smtClean="0"/>
-              <a:t>‹#›</a:t>
+              <a:t>‹N°›</a:t>
             </a:fld>
             <a:endParaRPr lang="fr-FR"/>
           </a:p>
@@ -3116,7 +4036,7 @@
           <a:p>
             <a:fld id="{50E96FFC-9A77-BE40-93A2-F2F19ACBA9AE}" type="slidenum">
               <a:rPr lang="fr-FR" smtClean="0"/>
-              <a:t>‹#›</a:t>
+              <a:t>‹N°›</a:t>
             </a:fld>
             <a:endParaRPr lang="fr-FR"/>
           </a:p>
@@ -3261,7 +4181,7 @@
           <a:p>
             <a:fld id="{50E96FFC-9A77-BE40-93A2-F2F19ACBA9AE}" type="slidenum">
               <a:rPr lang="fr-FR" smtClean="0"/>
-              <a:t>‹#›</a:t>
+              <a:t>‹N°›</a:t>
             </a:fld>
             <a:endParaRPr lang="fr-FR"/>
           </a:p>
@@ -3377,7 +4297,7 @@
           <a:p>
             <a:fld id="{50E96FFC-9A77-BE40-93A2-F2F19ACBA9AE}" type="slidenum">
               <a:rPr lang="fr-FR" smtClean="0"/>
-              <a:t>‹#›</a:t>
+              <a:t>‹N°›</a:t>
             </a:fld>
             <a:endParaRPr lang="fr-FR"/>
           </a:p>
@@ -3693,7 +4613,7 @@
           <a:p>
             <a:fld id="{50E96FFC-9A77-BE40-93A2-F2F19ACBA9AE}" type="slidenum">
               <a:rPr lang="fr-FR" smtClean="0"/>
-              <a:t>‹#›</a:t>
+              <a:t>‹N°›</a:t>
             </a:fld>
             <a:endParaRPr lang="fr-FR"/>
           </a:p>
@@ -3985,7 +4905,7 @@
           <a:p>
             <a:fld id="{50E96FFC-9A77-BE40-93A2-F2F19ACBA9AE}" type="slidenum">
               <a:rPr lang="fr-FR" smtClean="0"/>
-              <a:t>‹#›</a:t>
+              <a:t>‹N°›</a:t>
             </a:fld>
             <a:endParaRPr lang="fr-FR"/>
           </a:p>
@@ -4267,7 +5187,7 @@
           <a:p>
             <a:fld id="{50E96FFC-9A77-BE40-93A2-F2F19ACBA9AE}" type="slidenum">
               <a:rPr lang="fr-FR" smtClean="0"/>
-              <a:t>‹#›</a:t>
+              <a:t>‹N°›</a:t>
             </a:fld>
             <a:endParaRPr lang="fr-FR"/>
           </a:p>
@@ -4895,7 +5815,334 @@
           </a:bodyPr>
           <a:lstStyle/>
           <a:p>
-            <a:endParaRPr lang="fr-FR" sz="2400" dirty="0">
+            <a:r>
+              <a:rPr lang="fr-FR" sz="2400" dirty="0">
+                <a:latin typeface="Avenir Next" panose="020B0503020202020204" pitchFamily="34" charset="0"/>
+              </a:rPr>
+              <a:t>Multiple </a:t>
+            </a:r>
+            <a:r>
+              <a:rPr lang="fr-FR" sz="2400" dirty="0" err="1">
+                <a:latin typeface="Avenir Next" panose="020B0503020202020204" pitchFamily="34" charset="0"/>
+              </a:rPr>
+              <a:t>attack</a:t>
+            </a:r>
+            <a:r>
+              <a:rPr lang="fr-FR" sz="2400" dirty="0">
+                <a:latin typeface="Avenir Next" panose="020B0503020202020204" pitchFamily="34" charset="0"/>
+              </a:rPr>
+              <a:t> types:</a:t>
+            </a:r>
+          </a:p>
+          <a:p>
+            <a:pPr lvl="1"/>
+            <a:r>
+              <a:rPr lang="fr-FR" sz="2000" b="1" dirty="0" err="1">
+                <a:latin typeface="Avenir Next" panose="020B0503020202020204" pitchFamily="34" charset="0"/>
+              </a:rPr>
+              <a:t>DoS</a:t>
+            </a:r>
+            <a:r>
+              <a:rPr lang="fr-FR" sz="2000" dirty="0">
+                <a:latin typeface="Avenir Next" panose="020B0503020202020204" pitchFamily="34" charset="0"/>
+              </a:rPr>
+              <a:t> (Denial of Service) : smurf, </a:t>
+            </a:r>
+            <a:r>
+              <a:rPr lang="fr-FR" sz="2000" dirty="0" err="1">
+                <a:latin typeface="Avenir Next" panose="020B0503020202020204" pitchFamily="34" charset="0"/>
+              </a:rPr>
+              <a:t>neptune</a:t>
+            </a:r>
+            <a:endParaRPr lang="fr-FR" sz="2000" dirty="0">
+              <a:latin typeface="Avenir Next" panose="020B0503020202020204" pitchFamily="34" charset="0"/>
+            </a:endParaRPr>
+          </a:p>
+          <a:p>
+            <a:pPr lvl="2"/>
+            <a:r>
+              <a:rPr lang="fr-FR" sz="1600" dirty="0" err="1">
+                <a:latin typeface="Avenir Next" panose="020B0503020202020204" pitchFamily="34" charset="0"/>
+              </a:rPr>
+              <a:t>Overflows</a:t>
+            </a:r>
+            <a:r>
+              <a:rPr lang="fr-FR" sz="1600" dirty="0">
+                <a:latin typeface="Avenir Next" panose="020B0503020202020204" pitchFamily="34" charset="0"/>
+              </a:rPr>
+              <a:t> </a:t>
+            </a:r>
+            <a:r>
+              <a:rPr lang="fr-FR" sz="1600" dirty="0" err="1">
+                <a:latin typeface="Avenir Next" panose="020B0503020202020204" pitchFamily="34" charset="0"/>
+              </a:rPr>
+              <a:t>traffic</a:t>
+            </a:r>
+            <a:endParaRPr lang="fr-FR" sz="1600" dirty="0">
+              <a:latin typeface="Avenir Next" panose="020B0503020202020204" pitchFamily="34" charset="0"/>
+            </a:endParaRPr>
+          </a:p>
+          <a:p>
+            <a:pPr lvl="2"/>
+            <a:r>
+              <a:rPr lang="fr-FR" sz="1600" dirty="0" err="1">
+                <a:latin typeface="Avenir Next" panose="020B0503020202020204" pitchFamily="34" charset="0"/>
+              </a:rPr>
+              <a:t>Denies</a:t>
+            </a:r>
+            <a:r>
+              <a:rPr lang="fr-FR" sz="1600" dirty="0">
+                <a:latin typeface="Avenir Next" panose="020B0503020202020204" pitchFamily="34" charset="0"/>
+              </a:rPr>
+              <a:t> </a:t>
+            </a:r>
+            <a:r>
+              <a:rPr lang="fr-FR" sz="1600" dirty="0" err="1">
+                <a:latin typeface="Avenir Next" panose="020B0503020202020204" pitchFamily="34" charset="0"/>
+              </a:rPr>
+              <a:t>other</a:t>
+            </a:r>
+            <a:r>
+              <a:rPr lang="fr-FR" sz="1600" dirty="0">
+                <a:latin typeface="Avenir Next" panose="020B0503020202020204" pitchFamily="34" charset="0"/>
+              </a:rPr>
+              <a:t> </a:t>
+            </a:r>
+            <a:r>
+              <a:rPr lang="fr-FR" sz="1600" dirty="0" err="1">
+                <a:latin typeface="Avenir Next" panose="020B0503020202020204" pitchFamily="34" charset="0"/>
+              </a:rPr>
+              <a:t>requests</a:t>
+            </a:r>
+            <a:endParaRPr lang="fr-FR" sz="1600" dirty="0">
+              <a:latin typeface="Avenir Next" panose="020B0503020202020204" pitchFamily="34" charset="0"/>
+            </a:endParaRPr>
+          </a:p>
+          <a:p>
+            <a:pPr lvl="1"/>
+            <a:r>
+              <a:rPr lang="fr-FR" sz="2000" b="1" dirty="0">
+                <a:latin typeface="Avenir Next" panose="020B0503020202020204" pitchFamily="34" charset="0"/>
+              </a:rPr>
+              <a:t>R2L</a:t>
+            </a:r>
+            <a:r>
+              <a:rPr lang="fr-FR" sz="2000" dirty="0">
+                <a:latin typeface="Avenir Next" panose="020B0503020202020204" pitchFamily="34" charset="0"/>
+              </a:rPr>
+              <a:t> (Root to Local) : </a:t>
+            </a:r>
+            <a:r>
+              <a:rPr lang="fr-FR" sz="2000" dirty="0" err="1">
+                <a:latin typeface="Avenir Next" panose="020B0503020202020204" pitchFamily="34" charset="0"/>
+              </a:rPr>
+              <a:t>warezclient</a:t>
+            </a:r>
+            <a:r>
+              <a:rPr lang="fr-FR" sz="2000" dirty="0">
+                <a:latin typeface="Avenir Next" panose="020B0503020202020204" pitchFamily="34" charset="0"/>
+              </a:rPr>
+              <a:t>, </a:t>
+            </a:r>
+            <a:r>
+              <a:rPr lang="fr-FR" sz="2000" dirty="0" err="1">
+                <a:latin typeface="Avenir Next" panose="020B0503020202020204" pitchFamily="34" charset="0"/>
+              </a:rPr>
+              <a:t>guess_pwd</a:t>
+            </a:r>
+            <a:endParaRPr lang="fr-FR" sz="2000" dirty="0">
+              <a:latin typeface="Avenir Next" panose="020B0503020202020204" pitchFamily="34" charset="0"/>
+            </a:endParaRPr>
+          </a:p>
+          <a:p>
+            <a:pPr lvl="2"/>
+            <a:r>
+              <a:rPr lang="fr-FR" sz="1600" dirty="0" err="1">
+                <a:latin typeface="Avenir Next" panose="020B0503020202020204" pitchFamily="34" charset="0"/>
+              </a:rPr>
+              <a:t>Seek</a:t>
+            </a:r>
+            <a:r>
+              <a:rPr lang="fr-FR" sz="1600" dirty="0">
+                <a:latin typeface="Avenir Next" panose="020B0503020202020204" pitchFamily="34" charset="0"/>
+              </a:rPr>
+              <a:t> </a:t>
+            </a:r>
+            <a:r>
+              <a:rPr lang="fr-FR" sz="1600" dirty="0" err="1">
+                <a:latin typeface="Avenir Next" panose="020B0503020202020204" pitchFamily="34" charset="0"/>
+              </a:rPr>
+              <a:t>vulnerabilites</a:t>
+            </a:r>
+            <a:endParaRPr lang="fr-FR" sz="1600" dirty="0">
+              <a:latin typeface="Avenir Next" panose="020B0503020202020204" pitchFamily="34" charset="0"/>
+            </a:endParaRPr>
+          </a:p>
+          <a:p>
+            <a:pPr lvl="2"/>
+            <a:r>
+              <a:rPr lang="fr-FR" sz="1600" dirty="0" err="1">
+                <a:latin typeface="Avenir Next" panose="020B0503020202020204" pitchFamily="34" charset="0"/>
+              </a:rPr>
+              <a:t>Illegal</a:t>
+            </a:r>
+            <a:r>
+              <a:rPr lang="fr-FR" sz="1600" dirty="0">
+                <a:latin typeface="Avenir Next" panose="020B0503020202020204" pitchFamily="34" charset="0"/>
+              </a:rPr>
+              <a:t> local </a:t>
+            </a:r>
+            <a:r>
+              <a:rPr lang="fr-FR" sz="1600" dirty="0" err="1">
+                <a:latin typeface="Avenir Next" panose="020B0503020202020204" pitchFamily="34" charset="0"/>
+              </a:rPr>
+              <a:t>access</a:t>
+            </a:r>
+            <a:endParaRPr lang="fr-FR" sz="1600" dirty="0">
+              <a:latin typeface="Avenir Next" panose="020B0503020202020204" pitchFamily="34" charset="0"/>
+            </a:endParaRPr>
+          </a:p>
+          <a:p>
+            <a:pPr lvl="1"/>
+            <a:r>
+              <a:rPr lang="fr-FR" sz="2000" b="1" dirty="0">
+                <a:latin typeface="Avenir Next" panose="020B0503020202020204" pitchFamily="34" charset="0"/>
+              </a:rPr>
+              <a:t>U2R</a:t>
+            </a:r>
+            <a:r>
+              <a:rPr lang="fr-FR" sz="2000" dirty="0">
+                <a:latin typeface="Avenir Next" panose="020B0503020202020204" pitchFamily="34" charset="0"/>
+              </a:rPr>
+              <a:t> (User to Root) : </a:t>
+            </a:r>
+            <a:r>
+              <a:rPr lang="fr-FR" sz="2000" dirty="0" err="1">
+                <a:latin typeface="Avenir Next" panose="020B0503020202020204" pitchFamily="34" charset="0"/>
+              </a:rPr>
+              <a:t>buffer_overflow</a:t>
+            </a:r>
+            <a:r>
+              <a:rPr lang="fr-FR" sz="2000" dirty="0">
+                <a:latin typeface="Avenir Next" panose="020B0503020202020204" pitchFamily="34" charset="0"/>
+              </a:rPr>
+              <a:t>, rootkit</a:t>
+            </a:r>
+          </a:p>
+          <a:p>
+            <a:pPr lvl="2"/>
+            <a:r>
+              <a:rPr lang="fr-FR" sz="1600" dirty="0">
+                <a:latin typeface="Avenir Next" panose="020B0503020202020204" pitchFamily="34" charset="0"/>
+              </a:rPr>
+              <a:t>Memory manipulation</a:t>
+            </a:r>
+          </a:p>
+          <a:p>
+            <a:pPr lvl="2"/>
+            <a:r>
+              <a:rPr lang="fr-FR" sz="1600" dirty="0">
+                <a:latin typeface="Avenir Next" panose="020B0503020202020204" pitchFamily="34" charset="0"/>
+              </a:rPr>
+              <a:t>Access to root user</a:t>
+            </a:r>
+          </a:p>
+          <a:p>
+            <a:pPr lvl="1"/>
+            <a:r>
+              <a:rPr lang="fr-FR" sz="2000" b="1" dirty="0">
+                <a:latin typeface="Avenir Next" panose="020B0503020202020204" pitchFamily="34" charset="0"/>
+              </a:rPr>
+              <a:t>Probe</a:t>
+            </a:r>
+            <a:r>
+              <a:rPr lang="fr-FR" sz="2000" dirty="0">
+                <a:latin typeface="Avenir Next" panose="020B0503020202020204" pitchFamily="34" charset="0"/>
+              </a:rPr>
+              <a:t> : </a:t>
+            </a:r>
+            <a:r>
+              <a:rPr lang="fr-FR" sz="2000" dirty="0" err="1">
+                <a:latin typeface="Avenir Next" panose="020B0503020202020204" pitchFamily="34" charset="0"/>
+              </a:rPr>
+              <a:t>ipsweep</a:t>
+            </a:r>
+            <a:r>
+              <a:rPr lang="fr-FR" sz="2000" dirty="0">
+                <a:latin typeface="Avenir Next" panose="020B0503020202020204" pitchFamily="34" charset="0"/>
+              </a:rPr>
+              <a:t>, </a:t>
+            </a:r>
+            <a:r>
+              <a:rPr lang="fr-FR" sz="2000" dirty="0" err="1">
+                <a:latin typeface="Avenir Next" panose="020B0503020202020204" pitchFamily="34" charset="0"/>
+              </a:rPr>
+              <a:t>portsweep</a:t>
+            </a:r>
+            <a:endParaRPr lang="fr-FR" sz="2000" dirty="0">
+              <a:latin typeface="Avenir Next" panose="020B0503020202020204" pitchFamily="34" charset="0"/>
+            </a:endParaRPr>
+          </a:p>
+          <a:p>
+            <a:pPr lvl="2"/>
+            <a:r>
+              <a:rPr lang="fr-FR" sz="1600" dirty="0" err="1">
+                <a:latin typeface="Avenir Next" panose="020B0503020202020204" pitchFamily="34" charset="0"/>
+              </a:rPr>
+              <a:t>Finds</a:t>
+            </a:r>
+            <a:r>
+              <a:rPr lang="fr-FR" sz="1600" dirty="0">
+                <a:latin typeface="Avenir Next" panose="020B0503020202020204" pitchFamily="34" charset="0"/>
+              </a:rPr>
+              <a:t> </a:t>
+            </a:r>
+            <a:r>
+              <a:rPr lang="fr-FR" sz="1600" dirty="0" err="1">
+                <a:latin typeface="Avenir Next" panose="020B0503020202020204" pitchFamily="34" charset="0"/>
+              </a:rPr>
+              <a:t>vulnerable</a:t>
+            </a:r>
+            <a:r>
+              <a:rPr lang="fr-FR" sz="1600" dirty="0">
+                <a:latin typeface="Avenir Next" panose="020B0503020202020204" pitchFamily="34" charset="0"/>
+              </a:rPr>
+              <a:t> ports</a:t>
+            </a:r>
+          </a:p>
+          <a:p>
+            <a:pPr lvl="2"/>
+            <a:r>
+              <a:rPr lang="fr-FR" sz="1600" dirty="0" err="1">
+                <a:latin typeface="Avenir Next" panose="020B0503020202020204" pitchFamily="34" charset="0"/>
+              </a:rPr>
+              <a:t>Gate</a:t>
+            </a:r>
+            <a:r>
+              <a:rPr lang="fr-FR" sz="1600" dirty="0">
+                <a:latin typeface="Avenir Next" panose="020B0503020202020204" pitchFamily="34" charset="0"/>
+              </a:rPr>
+              <a:t> to </a:t>
+            </a:r>
+            <a:r>
+              <a:rPr lang="fr-FR" sz="1600" dirty="0" err="1">
+                <a:latin typeface="Avenir Next" panose="020B0503020202020204" pitchFamily="34" charset="0"/>
+              </a:rPr>
+              <a:t>other</a:t>
+            </a:r>
+            <a:r>
+              <a:rPr lang="fr-FR" sz="1600" dirty="0">
+                <a:latin typeface="Avenir Next" panose="020B0503020202020204" pitchFamily="34" charset="0"/>
+              </a:rPr>
+              <a:t> </a:t>
+            </a:r>
+            <a:r>
+              <a:rPr lang="fr-FR" sz="1600" dirty="0" err="1">
+                <a:latin typeface="Avenir Next" panose="020B0503020202020204" pitchFamily="34" charset="0"/>
+              </a:rPr>
+              <a:t>attacks</a:t>
+            </a:r>
+            <a:endParaRPr lang="fr-FR" sz="1600" dirty="0">
               <a:latin typeface="Avenir Next" panose="020B0503020202020204" pitchFamily="34" charset="0"/>
             </a:endParaRPr>
           </a:p>
@@ -5038,6 +6285,296 @@
       </p:grpSpPr>
       <p:sp>
         <p:nvSpPr>
+          <p:cNvPr id="2" name="Titre 1">
+            <a:extLst>
+              <a:ext uri="{FF2B5EF4-FFF2-40B4-BE49-F238E27FC236}">
+                <a16:creationId xmlns:a16="http://schemas.microsoft.com/office/drawing/2014/main" id="{7B24666F-D5E8-1E61-34A8-833EA0C59717}"/>
+              </a:ext>
+            </a:extLst>
+          </p:cNvPr>
+          <p:cNvSpPr>
+            <a:spLocks noGrp="1"/>
+          </p:cNvSpPr>
+          <p:nvPr>
+            <p:ph type="title"/>
+          </p:nvPr>
+        </p:nvSpPr>
+        <p:spPr/>
+        <p:txBody>
+          <a:bodyPr/>
+          <a:lstStyle/>
+          <a:p>
+            <a:r>
+              <a:rPr lang="fr-CH" dirty="0" err="1"/>
+              <a:t>Anomaly</a:t>
+            </a:r>
+            <a:r>
+              <a:rPr lang="fr-CH" dirty="0"/>
+              <a:t> </a:t>
+            </a:r>
+            <a:r>
+              <a:rPr lang="fr-CH" dirty="0" err="1"/>
+              <a:t>characteristics</a:t>
+            </a:r>
+            <a:endParaRPr lang="fr-CH" dirty="0"/>
+          </a:p>
+        </p:txBody>
+      </p:sp>
+      <p:sp>
+        <p:nvSpPr>
+          <p:cNvPr id="3" name="Espace réservé du contenu 2">
+            <a:extLst>
+              <a:ext uri="{FF2B5EF4-FFF2-40B4-BE49-F238E27FC236}">
+                <a16:creationId xmlns:a16="http://schemas.microsoft.com/office/drawing/2014/main" id="{FFE8A463-47F6-ED7A-4F39-3DCA870CF788}"/>
+              </a:ext>
+            </a:extLst>
+          </p:cNvPr>
+          <p:cNvSpPr>
+            <a:spLocks noGrp="1"/>
+          </p:cNvSpPr>
+          <p:nvPr>
+            <p:ph idx="1"/>
+          </p:nvPr>
+        </p:nvSpPr>
+        <p:spPr/>
+        <p:txBody>
+          <a:bodyPr/>
+          <a:lstStyle/>
+          <a:p>
+            <a:r>
+              <a:rPr lang="fr-CH" dirty="0" err="1"/>
+              <a:t>DoS</a:t>
+            </a:r>
+            <a:r>
+              <a:rPr lang="fr-CH" dirty="0"/>
+              <a:t>:</a:t>
+            </a:r>
+          </a:p>
+          <a:p>
+            <a:pPr lvl="1"/>
+            <a:r>
+              <a:rPr lang="fr-CH" dirty="0"/>
+              <a:t>A lot of </a:t>
+            </a:r>
+            <a:r>
+              <a:rPr lang="fr-CH" dirty="0" err="1"/>
+              <a:t>request</a:t>
+            </a:r>
+            <a:r>
+              <a:rPr lang="fr-CH" dirty="0"/>
+              <a:t> of </a:t>
+            </a:r>
+            <a:r>
+              <a:rPr lang="fr-CH" dirty="0" err="1"/>
+              <a:t>very</a:t>
+            </a:r>
+            <a:r>
+              <a:rPr lang="fr-CH" dirty="0"/>
+              <a:t> </a:t>
+            </a:r>
+            <a:r>
+              <a:rPr lang="fr-CH" dirty="0" err="1"/>
+              <a:t>small</a:t>
+            </a:r>
+            <a:r>
+              <a:rPr lang="fr-CH" dirty="0"/>
+              <a:t> size</a:t>
+            </a:r>
+          </a:p>
+          <a:p>
+            <a:r>
+              <a:rPr lang="fr-CH" dirty="0"/>
+              <a:t>R2L</a:t>
+            </a:r>
+          </a:p>
+          <a:p>
+            <a:pPr lvl="1"/>
+            <a:r>
+              <a:rPr lang="fr-CH" dirty="0"/>
+              <a:t>More normal </a:t>
+            </a:r>
+            <a:r>
+              <a:rPr lang="fr-CH" dirty="0" err="1"/>
+              <a:t>sized</a:t>
+            </a:r>
+            <a:r>
+              <a:rPr lang="fr-CH" dirty="0"/>
+              <a:t> </a:t>
+            </a:r>
+            <a:r>
+              <a:rPr lang="fr-CH" dirty="0" err="1"/>
+              <a:t>requests</a:t>
+            </a:r>
+            <a:endParaRPr lang="fr-CH" dirty="0"/>
+          </a:p>
+          <a:p>
+            <a:r>
+              <a:rPr lang="fr-CH" dirty="0"/>
+              <a:t>U2R</a:t>
+            </a:r>
+          </a:p>
+          <a:p>
+            <a:pPr lvl="1"/>
+            <a:r>
+              <a:rPr lang="fr-CH" dirty="0"/>
+              <a:t>More normal </a:t>
+            </a:r>
+            <a:r>
+              <a:rPr lang="fr-CH" dirty="0" err="1"/>
+              <a:t>sized</a:t>
+            </a:r>
+            <a:r>
+              <a:rPr lang="fr-CH" dirty="0"/>
+              <a:t> </a:t>
+            </a:r>
+            <a:r>
+              <a:rPr lang="fr-CH" dirty="0" err="1"/>
+              <a:t>requests</a:t>
+            </a:r>
+            <a:endParaRPr lang="fr-CH" dirty="0"/>
+          </a:p>
+          <a:p>
+            <a:r>
+              <a:rPr lang="fr-CH" dirty="0" err="1"/>
+              <a:t>Probing</a:t>
+            </a:r>
+            <a:endParaRPr lang="fr-CH" dirty="0"/>
+          </a:p>
+          <a:p>
+            <a:pPr lvl="1"/>
+            <a:r>
+              <a:rPr lang="fr-CH" dirty="0" err="1"/>
+              <a:t>Bigger</a:t>
+            </a:r>
+            <a:r>
+              <a:rPr lang="fr-CH" dirty="0"/>
+              <a:t> </a:t>
+            </a:r>
+            <a:r>
+              <a:rPr lang="fr-CH" dirty="0" err="1"/>
+              <a:t>requests</a:t>
+            </a:r>
+            <a:r>
+              <a:rPr lang="fr-CH" dirty="0"/>
+              <a:t>, in </a:t>
+            </a:r>
+            <a:r>
+              <a:rPr lang="fr-CH" dirty="0" err="1"/>
+              <a:t>particular</a:t>
+            </a:r>
+            <a:r>
+              <a:rPr lang="fr-CH" dirty="0"/>
+              <a:t> for the </a:t>
+            </a:r>
+            <a:r>
+              <a:rPr lang="fr-CH" dirty="0" err="1"/>
+              <a:t>portsweep</a:t>
+            </a:r>
+            <a:r>
+              <a:rPr lang="fr-CH" dirty="0"/>
+              <a:t> </a:t>
+            </a:r>
+            <a:r>
+              <a:rPr lang="fr-CH" dirty="0" err="1"/>
+              <a:t>attack</a:t>
+            </a:r>
+            <a:endParaRPr lang="fr-CH" dirty="0"/>
+          </a:p>
+          <a:p>
+            <a:endParaRPr lang="fr-CH" dirty="0"/>
+          </a:p>
+        </p:txBody>
+      </p:sp>
+      <p:sp>
+        <p:nvSpPr>
+          <p:cNvPr id="4" name="Espace réservé de la date 3">
+            <a:extLst>
+              <a:ext uri="{FF2B5EF4-FFF2-40B4-BE49-F238E27FC236}">
+                <a16:creationId xmlns:a16="http://schemas.microsoft.com/office/drawing/2014/main" id="{DDA7F289-88E1-34D5-B282-173E02BDF0C3}"/>
+              </a:ext>
+            </a:extLst>
+          </p:cNvPr>
+          <p:cNvSpPr>
+            <a:spLocks noGrp="1"/>
+          </p:cNvSpPr>
+          <p:nvPr>
+            <p:ph type="dt" sz="half" idx="10"/>
+          </p:nvPr>
+        </p:nvSpPr>
+        <p:spPr/>
+        <p:txBody>
+          <a:bodyPr/>
+          <a:lstStyle/>
+          <a:p>
+            <a:r>
+              <a:rPr lang="de-CH"/>
+              <a:t>10.06.2022</a:t>
+            </a:r>
+            <a:endParaRPr lang="fr-FR"/>
+          </a:p>
+        </p:txBody>
+      </p:sp>
+      <p:sp>
+        <p:nvSpPr>
+          <p:cNvPr id="5" name="Espace réservé du numéro de diapositive 4">
+            <a:extLst>
+              <a:ext uri="{FF2B5EF4-FFF2-40B4-BE49-F238E27FC236}">
+                <a16:creationId xmlns:a16="http://schemas.microsoft.com/office/drawing/2014/main" id="{6A9531E7-FC16-8109-E338-BA338E0547B2}"/>
+              </a:ext>
+            </a:extLst>
+          </p:cNvPr>
+          <p:cNvSpPr>
+            <a:spLocks noGrp="1"/>
+          </p:cNvSpPr>
+          <p:nvPr>
+            <p:ph type="sldNum" sz="quarter" idx="12"/>
+          </p:nvPr>
+        </p:nvSpPr>
+        <p:spPr/>
+        <p:txBody>
+          <a:bodyPr/>
+          <a:lstStyle/>
+          <a:p>
+            <a:fld id="{50E96FFC-9A77-BE40-93A2-F2F19ACBA9AE}" type="slidenum">
+              <a:rPr lang="fr-FR" smtClean="0"/>
+              <a:t>11</a:t>
+            </a:fld>
+            <a:endParaRPr lang="fr-FR"/>
+          </a:p>
+        </p:txBody>
+      </p:sp>
+    </p:spTree>
+    <p:extLst>
+      <p:ext uri="{BB962C8B-B14F-4D97-AF65-F5344CB8AC3E}">
+        <p14:creationId xmlns:p14="http://schemas.microsoft.com/office/powerpoint/2010/main" val="3108134522"/>
+      </p:ext>
+    </p:extLst>
+  </p:cSld>
+  <p:clrMapOvr>
+    <a:masterClrMapping/>
+  </p:clrMapOvr>
+</p:sld>
+</file>
+
+<file path=ppt/slides/slide12.xml><?xml version="1.0" encoding="utf-8"?>
+<p:sld xmlns:a="http://schemas.openxmlformats.org/drawingml/2006/main" xmlns:r="http://schemas.openxmlformats.org/officeDocument/2006/relationships" xmlns:p="http://schemas.openxmlformats.org/presentationml/2006/main">
+  <p:cSld>
+    <p:spTree>
+      <p:nvGrpSpPr>
+        <p:cNvPr id="1" name=""/>
+        <p:cNvGrpSpPr/>
+        <p:nvPr/>
+      </p:nvGrpSpPr>
+      <p:grpSpPr>
+        <a:xfrm>
+          <a:off x="0" y="0"/>
+          <a:ext cx="0" cy="0"/>
+          <a:chOff x="0" y="0"/>
+          <a:chExt cx="0" cy="0"/>
+        </a:xfrm>
+      </p:grpSpPr>
+      <p:sp>
+        <p:nvSpPr>
           <p:cNvPr id="2" name="Title 1">
             <a:extLst>
               <a:ext uri="{FF2B5EF4-FFF2-40B4-BE49-F238E27FC236}">
@@ -5120,7 +6657,7 @@
           <a:p>
             <a:fld id="{50E96FFC-9A77-BE40-93A2-F2F19ACBA9AE}" type="slidenum">
               <a:rPr lang="fr-FR" smtClean="0"/>
-              <a:t>11</a:t>
+              <a:t>12</a:t>
             </a:fld>
             <a:endParaRPr lang="fr-FR"/>
           </a:p>
@@ -5186,7 +6723,7 @@
 </p:sld>
 </file>
 
-<file path=ppt/slides/slide12.xml><?xml version="1.0" encoding="utf-8"?>
+<file path=ppt/slides/slide13.xml><?xml version="1.0" encoding="utf-8"?>
 <p:sld xmlns:a="http://schemas.openxmlformats.org/drawingml/2006/main" xmlns:r="http://schemas.openxmlformats.org/officeDocument/2006/relationships" xmlns:p="http://schemas.openxmlformats.org/presentationml/2006/main">
   <p:cSld>
     <p:bg>
@@ -5334,7 +6871,7 @@
                   <a:schemeClr val="bg1"/>
                 </a:solidFill>
               </a:rPr>
-              <a:t>12</a:t>
+              <a:t>13</a:t>
             </a:fld>
             <a:endParaRPr lang="fr-FR">
               <a:solidFill>
@@ -5404,7 +6941,7 @@
 </p:sld>
 </file>
 
-<file path=ppt/slides/slide13.xml><?xml version="1.0" encoding="utf-8"?>
+<file path=ppt/slides/slide14.xml><?xml version="1.0" encoding="utf-8"?>
 <p:sld xmlns:a="http://schemas.openxmlformats.org/drawingml/2006/main" xmlns:r="http://schemas.openxmlformats.org/officeDocument/2006/relationships" xmlns:p="http://schemas.openxmlformats.org/presentationml/2006/main">
   <p:cSld>
     <p:spTree>
@@ -5749,7 +7286,7 @@
           <a:p>
             <a:fld id="{50E96FFC-9A77-BE40-93A2-F2F19ACBA9AE}" type="slidenum">
               <a:rPr lang="fr-FR" smtClean="0"/>
-              <a:t>13</a:t>
+              <a:t>14</a:t>
             </a:fld>
             <a:endParaRPr lang="fr-FR"/>
           </a:p>
@@ -5815,7 +7352,7 @@
 </p:sld>
 </file>
 
-<file path=ppt/slides/slide14.xml><?xml version="1.0" encoding="utf-8"?>
+<file path=ppt/slides/slide15.xml><?xml version="1.0" encoding="utf-8"?>
 <p:sld xmlns:a="http://schemas.openxmlformats.org/drawingml/2006/main" xmlns:r="http://schemas.openxmlformats.org/officeDocument/2006/relationships" xmlns:p="http://schemas.openxmlformats.org/presentationml/2006/main">
   <p:cSld>
     <p:spTree>
@@ -5962,7 +7499,7 @@
           <a:p>
             <a:fld id="{50E96FFC-9A77-BE40-93A2-F2F19ACBA9AE}" type="slidenum">
               <a:rPr lang="fr-FR" smtClean="0"/>
-              <a:t>14</a:t>
+              <a:t>15</a:t>
             </a:fld>
             <a:endParaRPr lang="fr-FR"/>
           </a:p>
@@ -6028,7 +7565,7 @@
 </p:sld>
 </file>
 
-<file path=ppt/slides/slide15.xml><?xml version="1.0" encoding="utf-8"?>
+<file path=ppt/slides/slide16.xml><?xml version="1.0" encoding="utf-8"?>
 <p:sld xmlns:a="http://schemas.openxmlformats.org/drawingml/2006/main" xmlns:r="http://schemas.openxmlformats.org/officeDocument/2006/relationships" xmlns:p="http://schemas.openxmlformats.org/presentationml/2006/main">
   <p:cSld>
     <p:bg>
@@ -6176,7 +7713,7 @@
                   <a:schemeClr val="bg1"/>
                 </a:solidFill>
               </a:rPr>
-              <a:t>15</a:t>
+              <a:t>16</a:t>
             </a:fld>
             <a:endParaRPr lang="fr-FR">
               <a:solidFill>
@@ -6246,7 +7783,7 @@
 </p:sld>
 </file>
 
-<file path=ppt/slides/slide16.xml><?xml version="1.0" encoding="utf-8"?>
+<file path=ppt/slides/slide17.xml><?xml version="1.0" encoding="utf-8"?>
 <p:sld xmlns:a="http://schemas.openxmlformats.org/drawingml/2006/main" xmlns:r="http://schemas.openxmlformats.org/officeDocument/2006/relationships" xmlns:p="http://schemas.openxmlformats.org/presentationml/2006/main">
   <p:cSld>
     <p:spTree>
@@ -6288,7 +7825,7 @@
               <a:rPr lang="en-GB" dirty="0">
                 <a:latin typeface="Avenir Next Medium" panose="020B0503020202020204" pitchFamily="34" charset="0"/>
               </a:rPr>
-              <a:t>Distribution of attacks</a:t>
+              <a:t>Distribution of protocol</a:t>
             </a:r>
             <a:endParaRPr lang="fr-FR" dirty="0">
               <a:latin typeface="Avenir Next Medium" panose="020B0503020202020204" pitchFamily="34" charset="0"/>
@@ -6377,7 +7914,7 @@
           <a:p>
             <a:fld id="{50E96FFC-9A77-BE40-93A2-F2F19ACBA9AE}" type="slidenum">
               <a:rPr lang="fr-FR" smtClean="0"/>
-              <a:t>16</a:t>
+              <a:t>17</a:t>
             </a:fld>
             <a:endParaRPr lang="fr-FR"/>
           </a:p>
@@ -6430,6 +7967,36 @@
           </a:extLst>
         </p:spPr>
       </p:pic>
+      <p:graphicFrame>
+        <p:nvGraphicFramePr>
+          <p:cNvPr id="10" name="Graphique 9">
+            <a:extLst>
+              <a:ext uri="{FF2B5EF4-FFF2-40B4-BE49-F238E27FC236}">
+                <a16:creationId xmlns:a16="http://schemas.microsoft.com/office/drawing/2014/main" id="{DE436372-8ED7-D416-24D3-0F0315FF786F}"/>
+              </a:ext>
+            </a:extLst>
+          </p:cNvPr>
+          <p:cNvGraphicFramePr>
+            <a:graphicFrameLocks/>
+          </p:cNvGraphicFramePr>
+          <p:nvPr>
+            <p:extLst>
+              <p:ext uri="{D42A27DB-BD31-4B8C-83A1-F6EECF244321}">
+                <p14:modId xmlns:p14="http://schemas.microsoft.com/office/powerpoint/2010/main" val="871992513"/>
+              </p:ext>
+            </p:extLst>
+          </p:nvPr>
+        </p:nvGraphicFramePr>
+        <p:xfrm>
+          <a:off x="838200" y="1825625"/>
+          <a:ext cx="10515600" cy="4351338"/>
+        </p:xfrm>
+        <a:graphic>
+          <a:graphicData uri="http://schemas.openxmlformats.org/drawingml/2006/chart">
+            <c:chart xmlns:c="http://schemas.openxmlformats.org/drawingml/2006/chart" xmlns:r="http://schemas.openxmlformats.org/officeDocument/2006/relationships" r:id="rId3"/>
+          </a:graphicData>
+        </a:graphic>
+      </p:graphicFrame>
     </p:spTree>
     <p:extLst>
       <p:ext uri="{BB962C8B-B14F-4D97-AF65-F5344CB8AC3E}">
@@ -6443,7 +8010,7 @@
 </p:sld>
 </file>
 
-<file path=ppt/slides/slide17.xml><?xml version="1.0" encoding="utf-8"?>
+<file path=ppt/slides/slide18.xml><?xml version="1.0" encoding="utf-8"?>
 <p:sld xmlns:a="http://schemas.openxmlformats.org/drawingml/2006/main" xmlns:r="http://schemas.openxmlformats.org/officeDocument/2006/relationships" xmlns:p="http://schemas.openxmlformats.org/presentationml/2006/main">
   <p:cSld>
     <p:spTree>
@@ -6462,6 +8029,160 @@
       </p:grpSpPr>
       <p:sp>
         <p:nvSpPr>
+          <p:cNvPr id="2" name="Titre 1">
+            <a:extLst>
+              <a:ext uri="{FF2B5EF4-FFF2-40B4-BE49-F238E27FC236}">
+                <a16:creationId xmlns:a16="http://schemas.microsoft.com/office/drawing/2014/main" id="{09342CB2-B197-DEF3-4436-03EA8C74A9A1}"/>
+              </a:ext>
+            </a:extLst>
+          </p:cNvPr>
+          <p:cNvSpPr>
+            <a:spLocks noGrp="1"/>
+          </p:cNvSpPr>
+          <p:nvPr>
+            <p:ph type="title"/>
+          </p:nvPr>
+        </p:nvSpPr>
+        <p:spPr/>
+        <p:txBody>
+          <a:bodyPr/>
+          <a:lstStyle/>
+          <a:p>
+            <a:r>
+              <a:rPr lang="fr-CH" dirty="0"/>
+              <a:t>Distribution of </a:t>
+            </a:r>
+            <a:r>
+              <a:rPr lang="fr-CH" dirty="0" err="1"/>
+              <a:t>attacks</a:t>
+            </a:r>
+            <a:r>
+              <a:rPr lang="fr-CH" dirty="0"/>
+              <a:t> by </a:t>
+            </a:r>
+            <a:r>
+              <a:rPr lang="fr-CH" dirty="0" err="1"/>
+              <a:t>protocol</a:t>
+            </a:r>
+            <a:endParaRPr lang="fr-CH" dirty="0"/>
+          </a:p>
+        </p:txBody>
+      </p:sp>
+      <p:sp>
+        <p:nvSpPr>
+          <p:cNvPr id="3" name="Espace réservé du contenu 2">
+            <a:extLst>
+              <a:ext uri="{FF2B5EF4-FFF2-40B4-BE49-F238E27FC236}">
+                <a16:creationId xmlns:a16="http://schemas.microsoft.com/office/drawing/2014/main" id="{CC8C98FC-302E-C64C-F11A-E60A71BA9C74}"/>
+              </a:ext>
+            </a:extLst>
+          </p:cNvPr>
+          <p:cNvSpPr>
+            <a:spLocks noGrp="1"/>
+          </p:cNvSpPr>
+          <p:nvPr>
+            <p:ph idx="1"/>
+          </p:nvPr>
+        </p:nvSpPr>
+        <p:spPr/>
+        <p:txBody>
+          <a:bodyPr/>
+          <a:lstStyle/>
+          <a:p>
+            <a:endParaRPr lang="fr-CH" dirty="0"/>
+          </a:p>
+        </p:txBody>
+      </p:sp>
+      <p:sp>
+        <p:nvSpPr>
+          <p:cNvPr id="4" name="Espace réservé de la date 3">
+            <a:extLst>
+              <a:ext uri="{FF2B5EF4-FFF2-40B4-BE49-F238E27FC236}">
+                <a16:creationId xmlns:a16="http://schemas.microsoft.com/office/drawing/2014/main" id="{6B6B9AF9-BD7B-7079-5B1B-3E7DC049489E}"/>
+              </a:ext>
+            </a:extLst>
+          </p:cNvPr>
+          <p:cNvSpPr>
+            <a:spLocks noGrp="1"/>
+          </p:cNvSpPr>
+          <p:nvPr>
+            <p:ph type="dt" sz="half" idx="10"/>
+          </p:nvPr>
+        </p:nvSpPr>
+        <p:spPr/>
+        <p:txBody>
+          <a:bodyPr/>
+          <a:lstStyle/>
+          <a:p>
+            <a:r>
+              <a:rPr lang="de-CH"/>
+              <a:t>10.06.2022</a:t>
+            </a:r>
+            <a:endParaRPr lang="fr-FR"/>
+          </a:p>
+        </p:txBody>
+      </p:sp>
+      <p:sp>
+        <p:nvSpPr>
+          <p:cNvPr id="5" name="Espace réservé du numéro de diapositive 4">
+            <a:extLst>
+              <a:ext uri="{FF2B5EF4-FFF2-40B4-BE49-F238E27FC236}">
+                <a16:creationId xmlns:a16="http://schemas.microsoft.com/office/drawing/2014/main" id="{61FB39D0-D776-4562-280C-22BD4B296A24}"/>
+              </a:ext>
+            </a:extLst>
+          </p:cNvPr>
+          <p:cNvSpPr>
+            <a:spLocks noGrp="1"/>
+          </p:cNvSpPr>
+          <p:nvPr>
+            <p:ph type="sldNum" sz="quarter" idx="12"/>
+          </p:nvPr>
+        </p:nvSpPr>
+        <p:spPr/>
+        <p:txBody>
+          <a:bodyPr/>
+          <a:lstStyle/>
+          <a:p>
+            <a:fld id="{50E96FFC-9A77-BE40-93A2-F2F19ACBA9AE}" type="slidenum">
+              <a:rPr lang="fr-FR" smtClean="0"/>
+              <a:t>18</a:t>
+            </a:fld>
+            <a:endParaRPr lang="fr-FR"/>
+          </a:p>
+        </p:txBody>
+      </p:sp>
+    </p:spTree>
+    <p:extLst>
+      <p:ext uri="{BB962C8B-B14F-4D97-AF65-F5344CB8AC3E}">
+        <p14:creationId xmlns:p14="http://schemas.microsoft.com/office/powerpoint/2010/main" val="3427995524"/>
+      </p:ext>
+    </p:extLst>
+  </p:cSld>
+  <p:clrMapOvr>
+    <a:masterClrMapping/>
+  </p:clrMapOvr>
+</p:sld>
+</file>
+
+<file path=ppt/slides/slide19.xml><?xml version="1.0" encoding="utf-8"?>
+<p:sld xmlns:a="http://schemas.openxmlformats.org/drawingml/2006/main" xmlns:r="http://schemas.openxmlformats.org/officeDocument/2006/relationships" xmlns:p="http://schemas.openxmlformats.org/presentationml/2006/main">
+  <p:cSld>
+    <p:spTree>
+      <p:nvGrpSpPr>
+        <p:cNvPr id="1" name=""/>
+        <p:cNvGrpSpPr/>
+        <p:nvPr/>
+      </p:nvGrpSpPr>
+      <p:grpSpPr>
+        <a:xfrm>
+          <a:off x="0" y="0"/>
+          <a:ext cx="0" cy="0"/>
+          <a:chOff x="0" y="0"/>
+          <a:chExt cx="0" cy="0"/>
+        </a:xfrm>
+      </p:grpSpPr>
+      <p:sp>
+        <p:nvSpPr>
           <p:cNvPr id="2" name="Title 1">
             <a:extLst>
               <a:ext uri="{FF2B5EF4-FFF2-40B4-BE49-F238E27FC236}">
@@ -6574,7 +8295,7 @@
           <a:p>
             <a:fld id="{50E96FFC-9A77-BE40-93A2-F2F19ACBA9AE}" type="slidenum">
               <a:rPr lang="fr-FR" smtClean="0"/>
-              <a:t>17</a:t>
+              <a:t>19</a:t>
             </a:fld>
             <a:endParaRPr lang="fr-FR"/>
           </a:p>
@@ -6640,7 +8361,520 @@
 </p:sld>
 </file>
 
-<file path=ppt/slides/slide18.xml><?xml version="1.0" encoding="utf-8"?>
+<file path=ppt/slides/slide2.xml><?xml version="1.0" encoding="utf-8"?>
+<p:sld xmlns:a="http://schemas.openxmlformats.org/drawingml/2006/main" xmlns:r="http://schemas.openxmlformats.org/officeDocument/2006/relationships" xmlns:p="http://schemas.openxmlformats.org/presentationml/2006/main">
+  <p:cSld>
+    <p:bg>
+      <p:bgPr>
+        <a:solidFill>
+          <a:schemeClr val="bg1"/>
+        </a:solidFill>
+        <a:effectLst/>
+      </p:bgPr>
+    </p:bg>
+    <p:spTree>
+      <p:nvGrpSpPr>
+        <p:cNvPr id="1" name=""/>
+        <p:cNvGrpSpPr/>
+        <p:nvPr/>
+      </p:nvGrpSpPr>
+      <p:grpSpPr>
+        <a:xfrm>
+          <a:off x="0" y="0"/>
+          <a:ext cx="0" cy="0"/>
+          <a:chOff x="0" y="0"/>
+          <a:chExt cx="0" cy="0"/>
+        </a:xfrm>
+      </p:grpSpPr>
+      <p:sp>
+        <p:nvSpPr>
+          <p:cNvPr id="3" name="Content Placeholder 2">
+            <a:extLst>
+              <a:ext uri="{FF2B5EF4-FFF2-40B4-BE49-F238E27FC236}">
+                <a16:creationId xmlns:a16="http://schemas.microsoft.com/office/drawing/2014/main" id="{138ECBA7-E0A5-8D39-6737-EB13A307A0BE}"/>
+              </a:ext>
+            </a:extLst>
+          </p:cNvPr>
+          <p:cNvSpPr>
+            <a:spLocks noGrp="1"/>
+          </p:cNvSpPr>
+          <p:nvPr>
+            <p:ph idx="1"/>
+          </p:nvPr>
+        </p:nvSpPr>
+        <p:spPr>
+          <a:xfrm>
+            <a:off x="838201" y="2358912"/>
+            <a:ext cx="6766096" cy="2140173"/>
+          </a:xfrm>
+        </p:spPr>
+        <p:txBody>
+          <a:bodyPr anchor="ctr">
+            <a:normAutofit/>
+          </a:bodyPr>
+          <a:lstStyle/>
+          <a:p>
+            <a:pPr marL="0" indent="0" algn="just">
+              <a:buNone/>
+            </a:pPr>
+            <a:r>
+              <a:rPr lang="en-GB" sz="2400" dirty="0">
+                <a:latin typeface="Avenir Next" panose="020B0503020202020204" pitchFamily="34" charset="0"/>
+              </a:rPr>
+              <a:t>The goal is to </a:t>
+            </a:r>
+            <a:r>
+              <a:rPr lang="en-GB" sz="2400" b="1" dirty="0">
+                <a:latin typeface="Avenir Next" panose="020B0503020202020204" pitchFamily="34" charset="0"/>
+              </a:rPr>
+              <a:t>detect anomalous </a:t>
+            </a:r>
+            <a:r>
+              <a:rPr lang="en-GB" sz="2400" b="1" dirty="0" err="1">
+                <a:latin typeface="Avenir Next" panose="020B0503020202020204" pitchFamily="34" charset="0"/>
+              </a:rPr>
+              <a:t>behavior</a:t>
+            </a:r>
+            <a:r>
+              <a:rPr lang="en-GB" sz="2400" b="1" dirty="0">
+                <a:latin typeface="Avenir Next" panose="020B0503020202020204" pitchFamily="34" charset="0"/>
+              </a:rPr>
+              <a:t> in the network traffic of an organization</a:t>
+            </a:r>
+            <a:r>
+              <a:rPr lang="en-GB" sz="2400" dirty="0">
+                <a:latin typeface="Avenir Next" panose="020B0503020202020204" pitchFamily="34" charset="0"/>
+              </a:rPr>
+              <a:t>.</a:t>
+            </a:r>
+          </a:p>
+          <a:p>
+            <a:pPr marL="0" indent="0" algn="just">
+              <a:buNone/>
+            </a:pPr>
+            <a:r>
+              <a:rPr lang="en-GB" sz="2400" dirty="0">
+                <a:latin typeface="Avenir Next" panose="020B0503020202020204" pitchFamily="34" charset="0"/>
+              </a:rPr>
+              <a:t>Anomalous </a:t>
+            </a:r>
+            <a:r>
+              <a:rPr lang="en-GB" sz="2400" dirty="0" err="1">
+                <a:latin typeface="Avenir Next" panose="020B0503020202020204" pitchFamily="34" charset="0"/>
+              </a:rPr>
+              <a:t>behavior</a:t>
+            </a:r>
+            <a:r>
+              <a:rPr lang="en-GB" sz="2400" dirty="0">
+                <a:latin typeface="Avenir Next" panose="020B0503020202020204" pitchFamily="34" charset="0"/>
+              </a:rPr>
+              <a:t> can point to things like intrusion attempts, denial-of-service attacks, port scanning, etc.</a:t>
+            </a:r>
+            <a:endParaRPr lang="fr-FR" sz="2400" dirty="0">
+              <a:latin typeface="Avenir Next" panose="020B0503020202020204" pitchFamily="34" charset="0"/>
+            </a:endParaRPr>
+          </a:p>
+        </p:txBody>
+      </p:sp>
+      <p:sp>
+        <p:nvSpPr>
+          <p:cNvPr id="20" name="Rectangle 13">
+            <a:extLst>
+              <a:ext uri="{FF2B5EF4-FFF2-40B4-BE49-F238E27FC236}">
+                <a16:creationId xmlns:a16="http://schemas.microsoft.com/office/drawing/2014/main" id="{59A309A7-1751-4ABE-A3C1-EEC40366AD89}"/>
+              </a:ext>
+              <a:ext uri="{C183D7F6-B498-43B3-948B-1728B52AA6E4}">
+                <adec:decorative xmlns:adec="http://schemas.microsoft.com/office/drawing/2017/decorative" val="1"/>
+              </a:ext>
+            </a:extLst>
+          </p:cNvPr>
+          <p:cNvSpPr>
+            <a:spLocks noGrp="1" noRot="1" noChangeAspect="1" noMove="1" noResize="1" noEditPoints="1" noAdjustHandles="1" noChangeArrowheads="1" noChangeShapeType="1" noTextEdit="1"/>
+          </p:cNvSpPr>
+          <p:nvPr>
+            <p:extLst>
+              <p:ext uri="{386F3935-93C4-4BCD-93E2-E3B085C9AB24}">
+                <p16:designElem xmlns:p16="http://schemas.microsoft.com/office/powerpoint/2015/main" val="1"/>
+              </p:ext>
+            </p:extLst>
+          </p:nvPr>
+        </p:nvSpPr>
+        <p:spPr>
+          <a:xfrm>
+            <a:off x="10088880" y="0"/>
+            <a:ext cx="2103120" cy="6858000"/>
+          </a:xfrm>
+          <a:prstGeom prst="rect">
+            <a:avLst/>
+          </a:prstGeom>
+          <a:ln>
+            <a:noFill/>
+          </a:ln>
+        </p:spPr>
+        <p:style>
+          <a:lnRef idx="2">
+            <a:schemeClr val="accent1">
+              <a:shade val="50000"/>
+            </a:schemeClr>
+          </a:lnRef>
+          <a:fillRef idx="1">
+            <a:schemeClr val="accent1"/>
+          </a:fillRef>
+          <a:effectRef idx="0">
+            <a:schemeClr val="accent1"/>
+          </a:effectRef>
+          <a:fontRef idx="minor">
+            <a:schemeClr val="lt1"/>
+          </a:fontRef>
+        </p:style>
+        <p:txBody>
+          <a:bodyPr rtlCol="0" anchor="ctr"/>
+          <a:lstStyle/>
+          <a:p>
+            <a:pPr algn="ctr"/>
+            <a:endParaRPr lang="en-US"/>
+          </a:p>
+        </p:txBody>
+      </p:sp>
+      <p:sp>
+        <p:nvSpPr>
+          <p:cNvPr id="21" name="Oval 15">
+            <a:extLst>
+              <a:ext uri="{FF2B5EF4-FFF2-40B4-BE49-F238E27FC236}">
+                <a16:creationId xmlns:a16="http://schemas.microsoft.com/office/drawing/2014/main" id="{967D8EB6-EAE1-4F9C-B398-83321E287204}"/>
+              </a:ext>
+              <a:ext uri="{C183D7F6-B498-43B3-948B-1728B52AA6E4}">
+                <adec:decorative xmlns:adec="http://schemas.microsoft.com/office/drawing/2017/decorative" val="1"/>
+              </a:ext>
+            </a:extLst>
+          </p:cNvPr>
+          <p:cNvSpPr>
+            <a:spLocks noGrp="1" noRot="1" noChangeAspect="1" noMove="1" noResize="1" noEditPoints="1" noAdjustHandles="1" noChangeArrowheads="1" noChangeShapeType="1" noTextEdit="1"/>
+          </p:cNvSpPr>
+          <p:nvPr>
+            <p:extLst>
+              <p:ext uri="{386F3935-93C4-4BCD-93E2-E3B085C9AB24}">
+                <p16:designElem xmlns:p16="http://schemas.microsoft.com/office/powerpoint/2015/main" val="1"/>
+              </p:ext>
+            </p:extLst>
+          </p:nvPr>
+        </p:nvSpPr>
+        <p:spPr>
+          <a:xfrm>
+            <a:off x="8915400" y="2358913"/>
+            <a:ext cx="2140172" cy="2140172"/>
+          </a:xfrm>
+          <a:prstGeom prst="ellipse">
+            <a:avLst/>
+          </a:prstGeom>
+          <a:solidFill>
+            <a:srgbClr val="FFFFFF"/>
+          </a:solidFill>
+          <a:ln w="22225">
+            <a:solidFill>
+              <a:srgbClr val="FABB74"/>
+            </a:solidFill>
+          </a:ln>
+        </p:spPr>
+        <p:style>
+          <a:lnRef idx="2">
+            <a:schemeClr val="accent1">
+              <a:shade val="50000"/>
+            </a:schemeClr>
+          </a:lnRef>
+          <a:fillRef idx="1">
+            <a:schemeClr val="accent1"/>
+          </a:fillRef>
+          <a:effectRef idx="0">
+            <a:schemeClr val="accent1"/>
+          </a:effectRef>
+          <a:fontRef idx="minor">
+            <a:schemeClr val="lt1"/>
+          </a:fontRef>
+        </p:style>
+        <p:txBody>
+          <a:bodyPr rtlCol="0" anchor="ctr"/>
+          <a:lstStyle/>
+          <a:p>
+            <a:pPr algn="ctr"/>
+            <a:endParaRPr lang="en-US"/>
+          </a:p>
+        </p:txBody>
+      </p:sp>
+      <p:pic>
+        <p:nvPicPr>
+          <p:cNvPr id="9" name="Picture 8" descr="Icon&#10;&#10;Description automatically generated">
+            <a:extLst>
+              <a:ext uri="{FF2B5EF4-FFF2-40B4-BE49-F238E27FC236}">
+                <a16:creationId xmlns:a16="http://schemas.microsoft.com/office/drawing/2014/main" id="{B4A247D1-F4D9-20CE-9159-2D581C81B4F8}"/>
+              </a:ext>
+            </a:extLst>
+          </p:cNvPr>
+          <p:cNvPicPr>
+            <a:picLocks noChangeAspect="1"/>
+          </p:cNvPicPr>
+          <p:nvPr/>
+        </p:nvPicPr>
+        <p:blipFill rotWithShape="1">
+          <a:blip r:embed="rId2">
+            <a:alphaModFix/>
+          </a:blip>
+          <a:srcRect r="-5" b="156"/>
+          <a:stretch/>
+        </p:blipFill>
+        <p:spPr>
+          <a:xfrm>
+            <a:off x="9030743" y="2474254"/>
+            <a:ext cx="1912560" cy="1909489"/>
+          </a:xfrm>
+          <a:custGeom>
+            <a:avLst/>
+            <a:gdLst/>
+            <a:ahLst/>
+            <a:cxnLst/>
+            <a:rect l="l" t="t" r="r" b="b"/>
+            <a:pathLst>
+              <a:path w="6057610" h="6057610">
+                <a:moveTo>
+                  <a:pt x="3028805" y="0"/>
+                </a:moveTo>
+                <a:cubicBezTo>
+                  <a:pt x="4701568" y="0"/>
+                  <a:pt x="6057610" y="1356042"/>
+                  <a:pt x="6057610" y="3028805"/>
+                </a:cubicBezTo>
+                <a:cubicBezTo>
+                  <a:pt x="6057610" y="4701568"/>
+                  <a:pt x="4701568" y="6057610"/>
+                  <a:pt x="3028805" y="6057610"/>
+                </a:cubicBezTo>
+                <a:cubicBezTo>
+                  <a:pt x="1356042" y="6057610"/>
+                  <a:pt x="0" y="4701568"/>
+                  <a:pt x="0" y="3028805"/>
+                </a:cubicBezTo>
+                <a:cubicBezTo>
+                  <a:pt x="0" y="1356042"/>
+                  <a:pt x="1356042" y="0"/>
+                  <a:pt x="3028805" y="0"/>
+                </a:cubicBezTo>
+                <a:close/>
+              </a:path>
+            </a:pathLst>
+          </a:custGeom>
+          <a:effectLst>
+            <a:softEdge rad="0"/>
+          </a:effectLst>
+        </p:spPr>
+      </p:pic>
+      <p:sp>
+        <p:nvSpPr>
+          <p:cNvPr id="6" name="Slide Number Placeholder 5">
+            <a:extLst>
+              <a:ext uri="{FF2B5EF4-FFF2-40B4-BE49-F238E27FC236}">
+                <a16:creationId xmlns:a16="http://schemas.microsoft.com/office/drawing/2014/main" id="{A06554C2-2984-B2C8-2158-C04BED7CEDFC}"/>
+              </a:ext>
+            </a:extLst>
+          </p:cNvPr>
+          <p:cNvSpPr>
+            <a:spLocks noGrp="1"/>
+          </p:cNvSpPr>
+          <p:nvPr>
+            <p:ph type="sldNum" sz="quarter" idx="12"/>
+          </p:nvPr>
+        </p:nvSpPr>
+        <p:spPr>
+          <a:xfrm>
+            <a:off x="10341428" y="6356350"/>
+            <a:ext cx="1012371" cy="365125"/>
+          </a:xfrm>
+        </p:spPr>
+        <p:txBody>
+          <a:bodyPr>
+            <a:normAutofit/>
+          </a:bodyPr>
+          <a:lstStyle/>
+          <a:p>
+            <a:pPr>
+              <a:spcAft>
+                <a:spcPts val="600"/>
+              </a:spcAft>
+            </a:pPr>
+            <a:fld id="{50E96FFC-9A77-BE40-93A2-F2F19ACBA9AE}" type="slidenum">
+              <a:rPr lang="fr-FR">
+                <a:solidFill>
+                  <a:srgbClr val="FFFFFF"/>
+                </a:solidFill>
+              </a:rPr>
+              <a:pPr>
+                <a:spcAft>
+                  <a:spcPts val="600"/>
+                </a:spcAft>
+              </a:pPr>
+              <a:t>2</a:t>
+            </a:fld>
+            <a:endParaRPr lang="fr-FR">
+              <a:solidFill>
+                <a:srgbClr val="FFFFFF"/>
+              </a:solidFill>
+            </a:endParaRPr>
+          </a:p>
+        </p:txBody>
+      </p:sp>
+      <p:pic>
+        <p:nvPicPr>
+          <p:cNvPr id="17" name="Picture 2" descr="HES-SO - Logo - Haute école">
+            <a:extLst>
+              <a:ext uri="{FF2B5EF4-FFF2-40B4-BE49-F238E27FC236}">
+                <a16:creationId xmlns:a16="http://schemas.microsoft.com/office/drawing/2014/main" id="{1476530F-F70B-1342-F4CE-A0DBB1A8D85C}"/>
+              </a:ext>
+            </a:extLst>
+          </p:cNvPr>
+          <p:cNvPicPr>
+            <a:picLocks noChangeAspect="1" noChangeArrowheads="1"/>
+          </p:cNvPicPr>
+          <p:nvPr/>
+        </p:nvPicPr>
+        <p:blipFill>
+          <a:blip r:embed="rId3">
+            <a:extLst>
+              <a:ext uri="{28A0092B-C50C-407E-A947-70E740481C1C}">
+                <a14:useLocalDpi xmlns:a14="http://schemas.microsoft.com/office/drawing/2010/main" val="0"/>
+              </a:ext>
+            </a:extLst>
+          </a:blip>
+          <a:srcRect/>
+          <a:stretch>
+            <a:fillRect/>
+          </a:stretch>
+        </p:blipFill>
+        <p:spPr bwMode="auto">
+          <a:xfrm>
+            <a:off x="5563101" y="6386879"/>
+            <a:ext cx="1065798" cy="334596"/>
+          </a:xfrm>
+          <a:prstGeom prst="rect">
+            <a:avLst/>
+          </a:prstGeom>
+          <a:noFill/>
+          <a:extLst>
+            <a:ext uri="{909E8E84-426E-40DD-AFC4-6F175D3DCCD1}">
+              <a14:hiddenFill xmlns:a14="http://schemas.microsoft.com/office/drawing/2010/main">
+                <a:solidFill>
+                  <a:srgbClr val="FFFFFF"/>
+                </a:solidFill>
+              </a14:hiddenFill>
+            </a:ext>
+          </a:extLst>
+        </p:spPr>
+      </p:pic>
+      <p:sp>
+        <p:nvSpPr>
+          <p:cNvPr id="19" name="Title 1">
+            <a:extLst>
+              <a:ext uri="{FF2B5EF4-FFF2-40B4-BE49-F238E27FC236}">
+                <a16:creationId xmlns:a16="http://schemas.microsoft.com/office/drawing/2014/main" id="{6CFBBD01-9649-6E46-A136-139A8E0CD8B4}"/>
+              </a:ext>
+            </a:extLst>
+          </p:cNvPr>
+          <p:cNvSpPr txBox="1">
+            <a:spLocks/>
+          </p:cNvSpPr>
+          <p:nvPr/>
+        </p:nvSpPr>
+        <p:spPr>
+          <a:xfrm>
+            <a:off x="838200" y="365125"/>
+            <a:ext cx="10515600" cy="1325563"/>
+          </a:xfrm>
+          <a:prstGeom prst="rect">
+            <a:avLst/>
+          </a:prstGeom>
+        </p:spPr>
+        <p:txBody>
+          <a:bodyPr vert="horz" lIns="91440" tIns="45720" rIns="91440" bIns="45720" rtlCol="0" anchor="ctr">
+            <a:normAutofit/>
+          </a:bodyPr>
+          <a:lstStyle>
+            <a:lvl1pPr algn="l" defTabSz="914400" rtl="0" eaLnBrk="1" latinLnBrk="0" hangingPunct="1">
+              <a:lnSpc>
+                <a:spcPct val="90000"/>
+              </a:lnSpc>
+              <a:spcBef>
+                <a:spcPct val="0"/>
+              </a:spcBef>
+              <a:buNone/>
+              <a:defRPr sz="4400" kern="1200">
+                <a:solidFill>
+                  <a:schemeClr val="tx1"/>
+                </a:solidFill>
+                <a:latin typeface="+mj-lt"/>
+                <a:ea typeface="+mj-ea"/>
+                <a:cs typeface="+mj-cs"/>
+              </a:defRPr>
+            </a:lvl1pPr>
+          </a:lstStyle>
+          <a:p>
+            <a:r>
+              <a:rPr lang="en-GB" dirty="0">
+                <a:latin typeface="Avenir Next Medium" panose="020B0503020202020204" pitchFamily="34" charset="0"/>
+              </a:rPr>
+              <a:t>Summary</a:t>
+            </a:r>
+            <a:endParaRPr lang="fr-FR" dirty="0">
+              <a:latin typeface="Avenir Next Medium" panose="020B0503020202020204" pitchFamily="34" charset="0"/>
+            </a:endParaRPr>
+          </a:p>
+        </p:txBody>
+      </p:sp>
+      <p:sp>
+        <p:nvSpPr>
+          <p:cNvPr id="22" name="Date Placeholder 3">
+            <a:extLst>
+              <a:ext uri="{FF2B5EF4-FFF2-40B4-BE49-F238E27FC236}">
+                <a16:creationId xmlns:a16="http://schemas.microsoft.com/office/drawing/2014/main" id="{087E2B1B-C49D-038D-6CFC-57F0DB254730}"/>
+              </a:ext>
+            </a:extLst>
+          </p:cNvPr>
+          <p:cNvSpPr>
+            <a:spLocks noGrp="1"/>
+          </p:cNvSpPr>
+          <p:nvPr>
+            <p:ph type="dt" sz="half" idx="10"/>
+          </p:nvPr>
+        </p:nvSpPr>
+        <p:spPr>
+          <a:xfrm>
+            <a:off x="838200" y="6356350"/>
+            <a:ext cx="2743200" cy="365125"/>
+          </a:xfrm>
+        </p:spPr>
+        <p:txBody>
+          <a:bodyPr/>
+          <a:lstStyle/>
+          <a:p>
+            <a:r>
+              <a:rPr lang="de-CH" dirty="0"/>
+              <a:t>10.06.2022</a:t>
+            </a:r>
+            <a:endParaRPr lang="fr-FR" dirty="0"/>
+          </a:p>
+        </p:txBody>
+      </p:sp>
+    </p:spTree>
+    <p:extLst>
+      <p:ext uri="{BB962C8B-B14F-4D97-AF65-F5344CB8AC3E}">
+        <p14:creationId xmlns:p14="http://schemas.microsoft.com/office/powerpoint/2010/main" val="3937285735"/>
+      </p:ext>
+    </p:extLst>
+  </p:cSld>
+  <p:clrMapOvr>
+    <a:masterClrMapping/>
+  </p:clrMapOvr>
+</p:sld>
+</file>
+
+<file path=ppt/slides/slide20.xml><?xml version="1.0" encoding="utf-8"?>
 <p:sld xmlns:a="http://schemas.openxmlformats.org/drawingml/2006/main" xmlns:r="http://schemas.openxmlformats.org/officeDocument/2006/relationships" xmlns:p="http://schemas.openxmlformats.org/presentationml/2006/main">
   <p:cSld>
     <p:bg>
@@ -7260,7 +9494,7 @@
                   <a:spcPts val="600"/>
                 </a:spcAft>
               </a:pPr>
-              <a:t>18</a:t>
+              <a:t>20</a:t>
             </a:fld>
             <a:endParaRPr lang="fr-FR">
               <a:solidFill>
@@ -7326,519 +9560,6 @@
   </p:cSld>
   <p:clrMapOvr>
     <a:overrideClrMapping bg1="dk1" tx1="lt1" bg2="dk2" tx2="lt2" accent1="accent1" accent2="accent2" accent3="accent3" accent4="accent4" accent5="accent5" accent6="accent6" hlink="hlink" folHlink="folHlink"/>
-  </p:clrMapOvr>
-</p:sld>
-</file>
-
-<file path=ppt/slides/slide2.xml><?xml version="1.0" encoding="utf-8"?>
-<p:sld xmlns:a="http://schemas.openxmlformats.org/drawingml/2006/main" xmlns:r="http://schemas.openxmlformats.org/officeDocument/2006/relationships" xmlns:p="http://schemas.openxmlformats.org/presentationml/2006/main">
-  <p:cSld>
-    <p:bg>
-      <p:bgPr>
-        <a:solidFill>
-          <a:schemeClr val="bg1"/>
-        </a:solidFill>
-        <a:effectLst/>
-      </p:bgPr>
-    </p:bg>
-    <p:spTree>
-      <p:nvGrpSpPr>
-        <p:cNvPr id="1" name=""/>
-        <p:cNvGrpSpPr/>
-        <p:nvPr/>
-      </p:nvGrpSpPr>
-      <p:grpSpPr>
-        <a:xfrm>
-          <a:off x="0" y="0"/>
-          <a:ext cx="0" cy="0"/>
-          <a:chOff x="0" y="0"/>
-          <a:chExt cx="0" cy="0"/>
-        </a:xfrm>
-      </p:grpSpPr>
-      <p:sp>
-        <p:nvSpPr>
-          <p:cNvPr id="3" name="Content Placeholder 2">
-            <a:extLst>
-              <a:ext uri="{FF2B5EF4-FFF2-40B4-BE49-F238E27FC236}">
-                <a16:creationId xmlns:a16="http://schemas.microsoft.com/office/drawing/2014/main" id="{138ECBA7-E0A5-8D39-6737-EB13A307A0BE}"/>
-              </a:ext>
-            </a:extLst>
-          </p:cNvPr>
-          <p:cNvSpPr>
-            <a:spLocks noGrp="1"/>
-          </p:cNvSpPr>
-          <p:nvPr>
-            <p:ph idx="1"/>
-          </p:nvPr>
-        </p:nvSpPr>
-        <p:spPr>
-          <a:xfrm>
-            <a:off x="838201" y="2358912"/>
-            <a:ext cx="6766096" cy="2140173"/>
-          </a:xfrm>
-        </p:spPr>
-        <p:txBody>
-          <a:bodyPr anchor="ctr">
-            <a:normAutofit/>
-          </a:bodyPr>
-          <a:lstStyle/>
-          <a:p>
-            <a:pPr marL="0" indent="0" algn="just">
-              <a:buNone/>
-            </a:pPr>
-            <a:r>
-              <a:rPr lang="en-GB" sz="2400" dirty="0">
-                <a:latin typeface="Avenir Next" panose="020B0503020202020204" pitchFamily="34" charset="0"/>
-              </a:rPr>
-              <a:t>The goal is to </a:t>
-            </a:r>
-            <a:r>
-              <a:rPr lang="en-GB" sz="2400" b="1" dirty="0">
-                <a:latin typeface="Avenir Next" panose="020B0503020202020204" pitchFamily="34" charset="0"/>
-              </a:rPr>
-              <a:t>detect anomalous </a:t>
-            </a:r>
-            <a:r>
-              <a:rPr lang="en-GB" sz="2400" b="1" dirty="0" err="1">
-                <a:latin typeface="Avenir Next" panose="020B0503020202020204" pitchFamily="34" charset="0"/>
-              </a:rPr>
-              <a:t>behavior</a:t>
-            </a:r>
-            <a:r>
-              <a:rPr lang="en-GB" sz="2400" b="1" dirty="0">
-                <a:latin typeface="Avenir Next" panose="020B0503020202020204" pitchFamily="34" charset="0"/>
-              </a:rPr>
-              <a:t> in the network traffic of an organization</a:t>
-            </a:r>
-            <a:r>
-              <a:rPr lang="en-GB" sz="2400" dirty="0">
-                <a:latin typeface="Avenir Next" panose="020B0503020202020204" pitchFamily="34" charset="0"/>
-              </a:rPr>
-              <a:t>.</a:t>
-            </a:r>
-          </a:p>
-          <a:p>
-            <a:pPr marL="0" indent="0" algn="just">
-              <a:buNone/>
-            </a:pPr>
-            <a:r>
-              <a:rPr lang="en-GB" sz="2400" dirty="0">
-                <a:latin typeface="Avenir Next" panose="020B0503020202020204" pitchFamily="34" charset="0"/>
-              </a:rPr>
-              <a:t>Anomalous </a:t>
-            </a:r>
-            <a:r>
-              <a:rPr lang="en-GB" sz="2400" dirty="0" err="1">
-                <a:latin typeface="Avenir Next" panose="020B0503020202020204" pitchFamily="34" charset="0"/>
-              </a:rPr>
-              <a:t>behavior</a:t>
-            </a:r>
-            <a:r>
-              <a:rPr lang="en-GB" sz="2400" dirty="0">
-                <a:latin typeface="Avenir Next" panose="020B0503020202020204" pitchFamily="34" charset="0"/>
-              </a:rPr>
-              <a:t> can point to things like intrusion attempts, denial-of-service attacks, port scanning, etc.</a:t>
-            </a:r>
-            <a:endParaRPr lang="fr-FR" sz="2400" dirty="0">
-              <a:latin typeface="Avenir Next" panose="020B0503020202020204" pitchFamily="34" charset="0"/>
-            </a:endParaRPr>
-          </a:p>
-        </p:txBody>
-      </p:sp>
-      <p:sp>
-        <p:nvSpPr>
-          <p:cNvPr id="20" name="Rectangle 13">
-            <a:extLst>
-              <a:ext uri="{FF2B5EF4-FFF2-40B4-BE49-F238E27FC236}">
-                <a16:creationId xmlns:a16="http://schemas.microsoft.com/office/drawing/2014/main" id="{59A309A7-1751-4ABE-A3C1-EEC40366AD89}"/>
-              </a:ext>
-              <a:ext uri="{C183D7F6-B498-43B3-948B-1728B52AA6E4}">
-                <adec:decorative xmlns:adec="http://schemas.microsoft.com/office/drawing/2017/decorative" val="1"/>
-              </a:ext>
-            </a:extLst>
-          </p:cNvPr>
-          <p:cNvSpPr>
-            <a:spLocks noGrp="1" noRot="1" noChangeAspect="1" noMove="1" noResize="1" noEditPoints="1" noAdjustHandles="1" noChangeArrowheads="1" noChangeShapeType="1" noTextEdit="1"/>
-          </p:cNvSpPr>
-          <p:nvPr>
-            <p:extLst>
-              <p:ext uri="{386F3935-93C4-4BCD-93E2-E3B085C9AB24}">
-                <p16:designElem xmlns:p16="http://schemas.microsoft.com/office/powerpoint/2015/main" val="1"/>
-              </p:ext>
-            </p:extLst>
-          </p:nvPr>
-        </p:nvSpPr>
-        <p:spPr>
-          <a:xfrm>
-            <a:off x="10088880" y="0"/>
-            <a:ext cx="2103120" cy="6858000"/>
-          </a:xfrm>
-          <a:prstGeom prst="rect">
-            <a:avLst/>
-          </a:prstGeom>
-          <a:ln>
-            <a:noFill/>
-          </a:ln>
-        </p:spPr>
-        <p:style>
-          <a:lnRef idx="2">
-            <a:schemeClr val="accent1">
-              <a:shade val="50000"/>
-            </a:schemeClr>
-          </a:lnRef>
-          <a:fillRef idx="1">
-            <a:schemeClr val="accent1"/>
-          </a:fillRef>
-          <a:effectRef idx="0">
-            <a:schemeClr val="accent1"/>
-          </a:effectRef>
-          <a:fontRef idx="minor">
-            <a:schemeClr val="lt1"/>
-          </a:fontRef>
-        </p:style>
-        <p:txBody>
-          <a:bodyPr rtlCol="0" anchor="ctr"/>
-          <a:lstStyle/>
-          <a:p>
-            <a:pPr algn="ctr"/>
-            <a:endParaRPr lang="en-US"/>
-          </a:p>
-        </p:txBody>
-      </p:sp>
-      <p:sp>
-        <p:nvSpPr>
-          <p:cNvPr id="21" name="Oval 15">
-            <a:extLst>
-              <a:ext uri="{FF2B5EF4-FFF2-40B4-BE49-F238E27FC236}">
-                <a16:creationId xmlns:a16="http://schemas.microsoft.com/office/drawing/2014/main" id="{967D8EB6-EAE1-4F9C-B398-83321E287204}"/>
-              </a:ext>
-              <a:ext uri="{C183D7F6-B498-43B3-948B-1728B52AA6E4}">
-                <adec:decorative xmlns:adec="http://schemas.microsoft.com/office/drawing/2017/decorative" val="1"/>
-              </a:ext>
-            </a:extLst>
-          </p:cNvPr>
-          <p:cNvSpPr>
-            <a:spLocks noGrp="1" noRot="1" noChangeAspect="1" noMove="1" noResize="1" noEditPoints="1" noAdjustHandles="1" noChangeArrowheads="1" noChangeShapeType="1" noTextEdit="1"/>
-          </p:cNvSpPr>
-          <p:nvPr>
-            <p:extLst>
-              <p:ext uri="{386F3935-93C4-4BCD-93E2-E3B085C9AB24}">
-                <p16:designElem xmlns:p16="http://schemas.microsoft.com/office/powerpoint/2015/main" val="1"/>
-              </p:ext>
-            </p:extLst>
-          </p:nvPr>
-        </p:nvSpPr>
-        <p:spPr>
-          <a:xfrm>
-            <a:off x="8915400" y="2358913"/>
-            <a:ext cx="2140172" cy="2140172"/>
-          </a:xfrm>
-          <a:prstGeom prst="ellipse">
-            <a:avLst/>
-          </a:prstGeom>
-          <a:solidFill>
-            <a:srgbClr val="FFFFFF"/>
-          </a:solidFill>
-          <a:ln w="22225">
-            <a:solidFill>
-              <a:srgbClr val="FABB74"/>
-            </a:solidFill>
-          </a:ln>
-        </p:spPr>
-        <p:style>
-          <a:lnRef idx="2">
-            <a:schemeClr val="accent1">
-              <a:shade val="50000"/>
-            </a:schemeClr>
-          </a:lnRef>
-          <a:fillRef idx="1">
-            <a:schemeClr val="accent1"/>
-          </a:fillRef>
-          <a:effectRef idx="0">
-            <a:schemeClr val="accent1"/>
-          </a:effectRef>
-          <a:fontRef idx="minor">
-            <a:schemeClr val="lt1"/>
-          </a:fontRef>
-        </p:style>
-        <p:txBody>
-          <a:bodyPr rtlCol="0" anchor="ctr"/>
-          <a:lstStyle/>
-          <a:p>
-            <a:pPr algn="ctr"/>
-            <a:endParaRPr lang="en-US"/>
-          </a:p>
-        </p:txBody>
-      </p:sp>
-      <p:pic>
-        <p:nvPicPr>
-          <p:cNvPr id="9" name="Picture 8" descr="Icon&#10;&#10;Description automatically generated">
-            <a:extLst>
-              <a:ext uri="{FF2B5EF4-FFF2-40B4-BE49-F238E27FC236}">
-                <a16:creationId xmlns:a16="http://schemas.microsoft.com/office/drawing/2014/main" id="{B4A247D1-F4D9-20CE-9159-2D581C81B4F8}"/>
-              </a:ext>
-            </a:extLst>
-          </p:cNvPr>
-          <p:cNvPicPr>
-            <a:picLocks noChangeAspect="1"/>
-          </p:cNvPicPr>
-          <p:nvPr/>
-        </p:nvPicPr>
-        <p:blipFill rotWithShape="1">
-          <a:blip r:embed="rId2">
-            <a:alphaModFix/>
-          </a:blip>
-          <a:srcRect r="-5" b="156"/>
-          <a:stretch/>
-        </p:blipFill>
-        <p:spPr>
-          <a:xfrm>
-            <a:off x="9030743" y="2474254"/>
-            <a:ext cx="1912560" cy="1909489"/>
-          </a:xfrm>
-          <a:custGeom>
-            <a:avLst/>
-            <a:gdLst/>
-            <a:ahLst/>
-            <a:cxnLst/>
-            <a:rect l="l" t="t" r="r" b="b"/>
-            <a:pathLst>
-              <a:path w="6057610" h="6057610">
-                <a:moveTo>
-                  <a:pt x="3028805" y="0"/>
-                </a:moveTo>
-                <a:cubicBezTo>
-                  <a:pt x="4701568" y="0"/>
-                  <a:pt x="6057610" y="1356042"/>
-                  <a:pt x="6057610" y="3028805"/>
-                </a:cubicBezTo>
-                <a:cubicBezTo>
-                  <a:pt x="6057610" y="4701568"/>
-                  <a:pt x="4701568" y="6057610"/>
-                  <a:pt x="3028805" y="6057610"/>
-                </a:cubicBezTo>
-                <a:cubicBezTo>
-                  <a:pt x="1356042" y="6057610"/>
-                  <a:pt x="0" y="4701568"/>
-                  <a:pt x="0" y="3028805"/>
-                </a:cubicBezTo>
-                <a:cubicBezTo>
-                  <a:pt x="0" y="1356042"/>
-                  <a:pt x="1356042" y="0"/>
-                  <a:pt x="3028805" y="0"/>
-                </a:cubicBezTo>
-                <a:close/>
-              </a:path>
-            </a:pathLst>
-          </a:custGeom>
-          <a:effectLst>
-            <a:softEdge rad="0"/>
-          </a:effectLst>
-        </p:spPr>
-      </p:pic>
-      <p:sp>
-        <p:nvSpPr>
-          <p:cNvPr id="6" name="Slide Number Placeholder 5">
-            <a:extLst>
-              <a:ext uri="{FF2B5EF4-FFF2-40B4-BE49-F238E27FC236}">
-                <a16:creationId xmlns:a16="http://schemas.microsoft.com/office/drawing/2014/main" id="{A06554C2-2984-B2C8-2158-C04BED7CEDFC}"/>
-              </a:ext>
-            </a:extLst>
-          </p:cNvPr>
-          <p:cNvSpPr>
-            <a:spLocks noGrp="1"/>
-          </p:cNvSpPr>
-          <p:nvPr>
-            <p:ph type="sldNum" sz="quarter" idx="12"/>
-          </p:nvPr>
-        </p:nvSpPr>
-        <p:spPr>
-          <a:xfrm>
-            <a:off x="10341428" y="6356350"/>
-            <a:ext cx="1012371" cy="365125"/>
-          </a:xfrm>
-        </p:spPr>
-        <p:txBody>
-          <a:bodyPr>
-            <a:normAutofit/>
-          </a:bodyPr>
-          <a:lstStyle/>
-          <a:p>
-            <a:pPr>
-              <a:spcAft>
-                <a:spcPts val="600"/>
-              </a:spcAft>
-            </a:pPr>
-            <a:fld id="{50E96FFC-9A77-BE40-93A2-F2F19ACBA9AE}" type="slidenum">
-              <a:rPr lang="fr-FR">
-                <a:solidFill>
-                  <a:srgbClr val="FFFFFF"/>
-                </a:solidFill>
-              </a:rPr>
-              <a:pPr>
-                <a:spcAft>
-                  <a:spcPts val="600"/>
-                </a:spcAft>
-              </a:pPr>
-              <a:t>2</a:t>
-            </a:fld>
-            <a:endParaRPr lang="fr-FR">
-              <a:solidFill>
-                <a:srgbClr val="FFFFFF"/>
-              </a:solidFill>
-            </a:endParaRPr>
-          </a:p>
-        </p:txBody>
-      </p:sp>
-      <p:pic>
-        <p:nvPicPr>
-          <p:cNvPr id="17" name="Picture 2" descr="HES-SO - Logo - Haute école">
-            <a:extLst>
-              <a:ext uri="{FF2B5EF4-FFF2-40B4-BE49-F238E27FC236}">
-                <a16:creationId xmlns:a16="http://schemas.microsoft.com/office/drawing/2014/main" id="{1476530F-F70B-1342-F4CE-A0DBB1A8D85C}"/>
-              </a:ext>
-            </a:extLst>
-          </p:cNvPr>
-          <p:cNvPicPr>
-            <a:picLocks noChangeAspect="1" noChangeArrowheads="1"/>
-          </p:cNvPicPr>
-          <p:nvPr/>
-        </p:nvPicPr>
-        <p:blipFill>
-          <a:blip r:embed="rId3">
-            <a:extLst>
-              <a:ext uri="{28A0092B-C50C-407E-A947-70E740481C1C}">
-                <a14:useLocalDpi xmlns:a14="http://schemas.microsoft.com/office/drawing/2010/main" val="0"/>
-              </a:ext>
-            </a:extLst>
-          </a:blip>
-          <a:srcRect/>
-          <a:stretch>
-            <a:fillRect/>
-          </a:stretch>
-        </p:blipFill>
-        <p:spPr bwMode="auto">
-          <a:xfrm>
-            <a:off x="5563101" y="6386879"/>
-            <a:ext cx="1065798" cy="334596"/>
-          </a:xfrm>
-          <a:prstGeom prst="rect">
-            <a:avLst/>
-          </a:prstGeom>
-          <a:noFill/>
-          <a:extLst>
-            <a:ext uri="{909E8E84-426E-40DD-AFC4-6F175D3DCCD1}">
-              <a14:hiddenFill xmlns:a14="http://schemas.microsoft.com/office/drawing/2010/main">
-                <a:solidFill>
-                  <a:srgbClr val="FFFFFF"/>
-                </a:solidFill>
-              </a14:hiddenFill>
-            </a:ext>
-          </a:extLst>
-        </p:spPr>
-      </p:pic>
-      <p:sp>
-        <p:nvSpPr>
-          <p:cNvPr id="19" name="Title 1">
-            <a:extLst>
-              <a:ext uri="{FF2B5EF4-FFF2-40B4-BE49-F238E27FC236}">
-                <a16:creationId xmlns:a16="http://schemas.microsoft.com/office/drawing/2014/main" id="{6CFBBD01-9649-6E46-A136-139A8E0CD8B4}"/>
-              </a:ext>
-            </a:extLst>
-          </p:cNvPr>
-          <p:cNvSpPr txBox="1">
-            <a:spLocks/>
-          </p:cNvSpPr>
-          <p:nvPr/>
-        </p:nvSpPr>
-        <p:spPr>
-          <a:xfrm>
-            <a:off x="838200" y="365125"/>
-            <a:ext cx="10515600" cy="1325563"/>
-          </a:xfrm>
-          <a:prstGeom prst="rect">
-            <a:avLst/>
-          </a:prstGeom>
-        </p:spPr>
-        <p:txBody>
-          <a:bodyPr vert="horz" lIns="91440" tIns="45720" rIns="91440" bIns="45720" rtlCol="0" anchor="ctr">
-            <a:normAutofit/>
-          </a:bodyPr>
-          <a:lstStyle>
-            <a:lvl1pPr algn="l" defTabSz="914400" rtl="0" eaLnBrk="1" latinLnBrk="0" hangingPunct="1">
-              <a:lnSpc>
-                <a:spcPct val="90000"/>
-              </a:lnSpc>
-              <a:spcBef>
-                <a:spcPct val="0"/>
-              </a:spcBef>
-              <a:buNone/>
-              <a:defRPr sz="4400" kern="1200">
-                <a:solidFill>
-                  <a:schemeClr val="tx1"/>
-                </a:solidFill>
-                <a:latin typeface="+mj-lt"/>
-                <a:ea typeface="+mj-ea"/>
-                <a:cs typeface="+mj-cs"/>
-              </a:defRPr>
-            </a:lvl1pPr>
-          </a:lstStyle>
-          <a:p>
-            <a:r>
-              <a:rPr lang="en-GB" dirty="0">
-                <a:latin typeface="Avenir Next Medium" panose="020B0503020202020204" pitchFamily="34" charset="0"/>
-              </a:rPr>
-              <a:t>Summary</a:t>
-            </a:r>
-            <a:endParaRPr lang="fr-FR" dirty="0">
-              <a:latin typeface="Avenir Next Medium" panose="020B0503020202020204" pitchFamily="34" charset="0"/>
-            </a:endParaRPr>
-          </a:p>
-        </p:txBody>
-      </p:sp>
-      <p:sp>
-        <p:nvSpPr>
-          <p:cNvPr id="22" name="Date Placeholder 3">
-            <a:extLst>
-              <a:ext uri="{FF2B5EF4-FFF2-40B4-BE49-F238E27FC236}">
-                <a16:creationId xmlns:a16="http://schemas.microsoft.com/office/drawing/2014/main" id="{087E2B1B-C49D-038D-6CFC-57F0DB254730}"/>
-              </a:ext>
-            </a:extLst>
-          </p:cNvPr>
-          <p:cNvSpPr>
-            <a:spLocks noGrp="1"/>
-          </p:cNvSpPr>
-          <p:nvPr>
-            <p:ph type="dt" sz="half" idx="10"/>
-          </p:nvPr>
-        </p:nvSpPr>
-        <p:spPr>
-          <a:xfrm>
-            <a:off x="838200" y="6356350"/>
-            <a:ext cx="2743200" cy="365125"/>
-          </a:xfrm>
-        </p:spPr>
-        <p:txBody>
-          <a:bodyPr/>
-          <a:lstStyle/>
-          <a:p>
-            <a:r>
-              <a:rPr lang="de-CH" dirty="0"/>
-              <a:t>10.06.2022</a:t>
-            </a:r>
-            <a:endParaRPr lang="fr-FR" dirty="0"/>
-          </a:p>
-        </p:txBody>
-      </p:sp>
-    </p:spTree>
-    <p:extLst>
-      <p:ext uri="{BB962C8B-B14F-4D97-AF65-F5344CB8AC3E}">
-        <p14:creationId xmlns:p14="http://schemas.microsoft.com/office/powerpoint/2010/main" val="3937285735"/>
-      </p:ext>
-    </p:extLst>
-  </p:cSld>
-  <p:clrMapOvr>
-    <a:masterClrMapping/>
   </p:clrMapOvr>
 </p:sld>
 </file>

</xml_diff>

<commit_message>
Attack distribution per protocol
</commit_message>
<xml_diff>
--- a/Documentation/Anomaly-Detection-in-Network-Traffic-with-K-means-Clustering.pptx
+++ b/Documentation/Anomaly-Detection-in-Network-Traffic-with-K-means-Clustering.pptx
@@ -481,6 +481,1487 @@
 </c:chartSpace>
 </file>
 
+<file path=ppt/charts/chart2.xml><?xml version="1.0" encoding="utf-8"?>
+<c:chartSpace xmlns:c="http://schemas.openxmlformats.org/drawingml/2006/chart" xmlns:a="http://schemas.openxmlformats.org/drawingml/2006/main" xmlns:r="http://schemas.openxmlformats.org/officeDocument/2006/relationships" xmlns:c16r2="http://schemas.microsoft.com/office/drawing/2015/06/chart">
+  <c:date1904 val="0"/>
+  <c:lang val="fr-FR"/>
+  <c:roundedCorners val="0"/>
+  <mc:AlternateContent xmlns:mc="http://schemas.openxmlformats.org/markup-compatibility/2006">
+    <mc:Choice xmlns:c14="http://schemas.microsoft.com/office/drawing/2007/8/2/chart" Requires="c14">
+      <c14:style val="102"/>
+    </mc:Choice>
+    <mc:Fallback>
+      <c:style val="2"/>
+    </mc:Fallback>
+  </mc:AlternateContent>
+  <c:chart>
+    <c:title>
+      <c:tx>
+        <c:rich>
+          <a:bodyPr rot="0" spcFirstLastPara="1" vertOverflow="ellipsis" vert="horz" wrap="square" anchor="ctr" anchorCtr="1"/>
+          <a:lstStyle/>
+          <a:p>
+            <a:pPr>
+              <a:defRPr sz="1800" b="1" i="0" u="none" strike="noStrike" kern="1200" baseline="0">
+                <a:solidFill>
+                  <a:schemeClr val="dk1">
+                    <a:lumMod val="65000"/>
+                    <a:lumOff val="35000"/>
+                  </a:schemeClr>
+                </a:solidFill>
+                <a:latin typeface="+mn-lt"/>
+                <a:ea typeface="+mn-ea"/>
+                <a:cs typeface="+mn-cs"/>
+              </a:defRPr>
+            </a:pPr>
+            <a:r>
+              <a:rPr lang="fr-CH"/>
+              <a:t>UDP Request</a:t>
+            </a:r>
+            <a:r>
+              <a:rPr lang="fr-CH" baseline="0"/>
+              <a:t> distribution</a:t>
+            </a:r>
+            <a:endParaRPr lang="fr-CH"/>
+          </a:p>
+        </c:rich>
+      </c:tx>
+      <c:overlay val="0"/>
+      <c:spPr>
+        <a:noFill/>
+        <a:ln>
+          <a:noFill/>
+        </a:ln>
+        <a:effectLst/>
+      </c:spPr>
+      <c:txPr>
+        <a:bodyPr rot="0" spcFirstLastPara="1" vertOverflow="ellipsis" vert="horz" wrap="square" anchor="ctr" anchorCtr="1"/>
+        <a:lstStyle/>
+        <a:p>
+          <a:pPr>
+            <a:defRPr sz="1800" b="1" i="0" u="none" strike="noStrike" kern="1200" baseline="0">
+              <a:solidFill>
+                <a:schemeClr val="dk1">
+                  <a:lumMod val="65000"/>
+                  <a:lumOff val="35000"/>
+                </a:schemeClr>
+              </a:solidFill>
+              <a:latin typeface="+mn-lt"/>
+              <a:ea typeface="+mn-ea"/>
+              <a:cs typeface="+mn-cs"/>
+            </a:defRPr>
+          </a:pPr>
+          <a:endParaRPr lang="fr-FR"/>
+        </a:p>
+      </c:txPr>
+    </c:title>
+    <c:autoTitleDeleted val="0"/>
+    <c:plotArea>
+      <c:layout/>
+      <c:ofPieChart>
+        <c:ofPieType val="pie"/>
+        <c:varyColors val="1"/>
+        <c:ser>
+          <c:idx val="0"/>
+          <c:order val="0"/>
+          <c:explosion val="10"/>
+          <c:dPt>
+            <c:idx val="0"/>
+            <c:bubble3D val="0"/>
+            <c:spPr>
+              <a:solidFill>
+                <a:schemeClr val="accent1"/>
+              </a:solidFill>
+              <a:ln>
+                <a:noFill/>
+              </a:ln>
+              <a:effectLst>
+                <a:outerShdw blurRad="317500" algn="ctr" rotWithShape="0">
+                  <a:prstClr val="black">
+                    <a:alpha val="25000"/>
+                  </a:prstClr>
+                </a:outerShdw>
+              </a:effectLst>
+            </c:spPr>
+            <c:extLst>
+              <c:ext xmlns:c16="http://schemas.microsoft.com/office/drawing/2014/chart" uri="{C3380CC4-5D6E-409C-BE32-E72D297353CC}">
+                <c16:uniqueId val="{00000001-E6AB-4AB7-835A-15C7355A3CC4}"/>
+              </c:ext>
+            </c:extLst>
+          </c:dPt>
+          <c:dPt>
+            <c:idx val="1"/>
+            <c:bubble3D val="0"/>
+            <c:spPr>
+              <a:solidFill>
+                <a:schemeClr val="accent2"/>
+              </a:solidFill>
+              <a:ln>
+                <a:noFill/>
+              </a:ln>
+              <a:effectLst>
+                <a:outerShdw blurRad="317500" algn="ctr" rotWithShape="0">
+                  <a:prstClr val="black">
+                    <a:alpha val="25000"/>
+                  </a:prstClr>
+                </a:outerShdw>
+              </a:effectLst>
+            </c:spPr>
+            <c:extLst>
+              <c:ext xmlns:c16="http://schemas.microsoft.com/office/drawing/2014/chart" uri="{C3380CC4-5D6E-409C-BE32-E72D297353CC}">
+                <c16:uniqueId val="{00000003-E6AB-4AB7-835A-15C7355A3CC4}"/>
+              </c:ext>
+            </c:extLst>
+          </c:dPt>
+          <c:dPt>
+            <c:idx val="2"/>
+            <c:bubble3D val="0"/>
+            <c:spPr>
+              <a:solidFill>
+                <a:schemeClr val="accent3"/>
+              </a:solidFill>
+              <a:ln>
+                <a:noFill/>
+              </a:ln>
+              <a:effectLst>
+                <a:outerShdw blurRad="317500" algn="ctr" rotWithShape="0">
+                  <a:prstClr val="black">
+                    <a:alpha val="25000"/>
+                  </a:prstClr>
+                </a:outerShdw>
+              </a:effectLst>
+            </c:spPr>
+            <c:extLst>
+              <c:ext xmlns:c16="http://schemas.microsoft.com/office/drawing/2014/chart" uri="{C3380CC4-5D6E-409C-BE32-E72D297353CC}">
+                <c16:uniqueId val="{00000005-E6AB-4AB7-835A-15C7355A3CC4}"/>
+              </c:ext>
+            </c:extLst>
+          </c:dPt>
+          <c:dPt>
+            <c:idx val="3"/>
+            <c:bubble3D val="0"/>
+            <c:spPr>
+              <a:solidFill>
+                <a:schemeClr val="accent4"/>
+              </a:solidFill>
+              <a:ln>
+                <a:noFill/>
+              </a:ln>
+              <a:effectLst>
+                <a:outerShdw blurRad="317500" algn="ctr" rotWithShape="0">
+                  <a:prstClr val="black">
+                    <a:alpha val="25000"/>
+                  </a:prstClr>
+                </a:outerShdw>
+              </a:effectLst>
+            </c:spPr>
+            <c:extLst>
+              <c:ext xmlns:c16="http://schemas.microsoft.com/office/drawing/2014/chart" uri="{C3380CC4-5D6E-409C-BE32-E72D297353CC}">
+                <c16:uniqueId val="{00000007-E6AB-4AB7-835A-15C7355A3CC4}"/>
+              </c:ext>
+            </c:extLst>
+          </c:dPt>
+          <c:dPt>
+            <c:idx val="4"/>
+            <c:bubble3D val="0"/>
+            <c:spPr>
+              <a:solidFill>
+                <a:schemeClr val="accent5"/>
+              </a:solidFill>
+              <a:ln>
+                <a:noFill/>
+              </a:ln>
+              <a:effectLst>
+                <a:outerShdw blurRad="317500" algn="ctr" rotWithShape="0">
+                  <a:prstClr val="black">
+                    <a:alpha val="25000"/>
+                  </a:prstClr>
+                </a:outerShdw>
+              </a:effectLst>
+            </c:spPr>
+            <c:extLst>
+              <c:ext xmlns:c16="http://schemas.microsoft.com/office/drawing/2014/chart" uri="{C3380CC4-5D6E-409C-BE32-E72D297353CC}">
+                <c16:uniqueId val="{00000009-E6AB-4AB7-835A-15C7355A3CC4}"/>
+              </c:ext>
+            </c:extLst>
+          </c:dPt>
+          <c:dPt>
+            <c:idx val="5"/>
+            <c:bubble3D val="0"/>
+            <c:spPr>
+              <a:solidFill>
+                <a:schemeClr val="accent6"/>
+              </a:solidFill>
+              <a:ln>
+                <a:noFill/>
+              </a:ln>
+              <a:effectLst>
+                <a:outerShdw blurRad="317500" algn="ctr" rotWithShape="0">
+                  <a:prstClr val="black">
+                    <a:alpha val="25000"/>
+                  </a:prstClr>
+                </a:outerShdw>
+              </a:effectLst>
+            </c:spPr>
+            <c:extLst>
+              <c:ext xmlns:c16="http://schemas.microsoft.com/office/drawing/2014/chart" uri="{C3380CC4-5D6E-409C-BE32-E72D297353CC}">
+                <c16:uniqueId val="{0000000B-E6AB-4AB7-835A-15C7355A3CC4}"/>
+              </c:ext>
+            </c:extLst>
+          </c:dPt>
+          <c:dLbls>
+            <c:spPr>
+              <a:noFill/>
+              <a:ln>
+                <a:noFill/>
+              </a:ln>
+              <a:effectLst/>
+            </c:spPr>
+            <c:txPr>
+              <a:bodyPr rot="0" spcFirstLastPara="1" vertOverflow="ellipsis" vert="horz" wrap="square" lIns="38100" tIns="19050" rIns="38100" bIns="19050" anchor="ctr" anchorCtr="1">
+                <a:spAutoFit/>
+              </a:bodyPr>
+              <a:lstStyle/>
+              <a:p>
+                <a:pPr>
+                  <a:defRPr sz="900" b="1" i="0" u="none" strike="noStrike" kern="1200" baseline="0">
+                    <a:solidFill>
+                      <a:schemeClr val="lt1"/>
+                    </a:solidFill>
+                    <a:latin typeface="+mn-lt"/>
+                    <a:ea typeface="+mn-ea"/>
+                    <a:cs typeface="+mn-cs"/>
+                  </a:defRPr>
+                </a:pPr>
+                <a:endParaRPr lang="fr-FR"/>
+              </a:p>
+            </c:txPr>
+            <c:dLblPos val="inEnd"/>
+            <c:showLegendKey val="0"/>
+            <c:showVal val="0"/>
+            <c:showCatName val="0"/>
+            <c:showSerName val="0"/>
+            <c:showPercent val="1"/>
+            <c:showBubbleSize val="0"/>
+            <c:showLeaderLines val="1"/>
+            <c:leaderLines>
+              <c:spPr>
+                <a:ln w="9525" cap="flat" cmpd="sng" algn="ctr">
+                  <a:solidFill>
+                    <a:schemeClr val="dk1">
+                      <a:lumMod val="35000"/>
+                      <a:lumOff val="65000"/>
+                    </a:schemeClr>
+                  </a:solidFill>
+                  <a:round/>
+                </a:ln>
+                <a:effectLst/>
+              </c:spPr>
+            </c:leaderLines>
+            <c:extLst>
+              <c:ext xmlns:c15="http://schemas.microsoft.com/office/drawing/2012/chart" uri="{CE6537A1-D6FC-4f65-9D91-7224C49458BB}"/>
+            </c:extLst>
+          </c:dLbls>
+          <c:cat>
+            <c:strRef>
+              <c:f>Feuil1!$A$26:$A$30</c:f>
+              <c:strCache>
+                <c:ptCount val="5"/>
+                <c:pt idx="0">
+                  <c:v>normal</c:v>
+                </c:pt>
+                <c:pt idx="1">
+                  <c:v>satan</c:v>
+                </c:pt>
+                <c:pt idx="2">
+                  <c:v>teardrop</c:v>
+                </c:pt>
+                <c:pt idx="3">
+                  <c:v>nmap</c:v>
+                </c:pt>
+                <c:pt idx="4">
+                  <c:v>rootkit</c:v>
+                </c:pt>
+              </c:strCache>
+            </c:strRef>
+          </c:cat>
+          <c:val>
+            <c:numRef>
+              <c:f>Feuil1!$B$26:$B$30</c:f>
+              <c:numCache>
+                <c:formatCode>General</c:formatCode>
+                <c:ptCount val="5"/>
+                <c:pt idx="0">
+                  <c:v>191348</c:v>
+                </c:pt>
+                <c:pt idx="1">
+                  <c:v>1708</c:v>
+                </c:pt>
+                <c:pt idx="2">
+                  <c:v>979</c:v>
+                </c:pt>
+                <c:pt idx="3">
+                  <c:v>250</c:v>
+                </c:pt>
+                <c:pt idx="4">
+                  <c:v>3</c:v>
+                </c:pt>
+              </c:numCache>
+            </c:numRef>
+          </c:val>
+          <c:extLst>
+            <c:ext xmlns:c16="http://schemas.microsoft.com/office/drawing/2014/chart" uri="{C3380CC4-5D6E-409C-BE32-E72D297353CC}">
+              <c16:uniqueId val="{0000000C-E6AB-4AB7-835A-15C7355A3CC4}"/>
+            </c:ext>
+          </c:extLst>
+        </c:ser>
+        <c:dLbls>
+          <c:dLblPos val="inEnd"/>
+          <c:showLegendKey val="0"/>
+          <c:showVal val="0"/>
+          <c:showCatName val="0"/>
+          <c:showSerName val="0"/>
+          <c:showPercent val="1"/>
+          <c:showBubbleSize val="0"/>
+          <c:showLeaderLines val="1"/>
+        </c:dLbls>
+        <c:gapWidth val="106"/>
+        <c:splitType val="pos"/>
+        <c:splitPos val="4"/>
+        <c:secondPieSize val="75"/>
+        <c:serLines>
+          <c:spPr>
+            <a:ln w="9525" cap="flat" cmpd="sng" algn="ctr">
+              <a:solidFill>
+                <a:schemeClr val="dk1">
+                  <a:lumMod val="35000"/>
+                  <a:lumOff val="65000"/>
+                </a:schemeClr>
+              </a:solidFill>
+              <a:round/>
+            </a:ln>
+            <a:effectLst/>
+          </c:spPr>
+        </c:serLines>
+      </c:ofPieChart>
+      <c:spPr>
+        <a:noFill/>
+        <a:ln>
+          <a:noFill/>
+        </a:ln>
+        <a:effectLst/>
+      </c:spPr>
+    </c:plotArea>
+    <c:legend>
+      <c:legendPos val="b"/>
+      <c:overlay val="0"/>
+      <c:spPr>
+        <a:solidFill>
+          <a:schemeClr val="lt1">
+            <a:alpha val="78000"/>
+          </a:schemeClr>
+        </a:solidFill>
+        <a:ln>
+          <a:noFill/>
+        </a:ln>
+        <a:effectLst/>
+      </c:spPr>
+      <c:txPr>
+        <a:bodyPr rot="0" spcFirstLastPara="1" vertOverflow="ellipsis" vert="horz" wrap="square" anchor="ctr" anchorCtr="1"/>
+        <a:lstStyle/>
+        <a:p>
+          <a:pPr>
+            <a:defRPr sz="900" b="0" i="0" u="none" strike="noStrike" kern="1200" baseline="0">
+              <a:solidFill>
+                <a:schemeClr val="dk1">
+                  <a:lumMod val="65000"/>
+                  <a:lumOff val="35000"/>
+                </a:schemeClr>
+              </a:solidFill>
+              <a:latin typeface="+mn-lt"/>
+              <a:ea typeface="+mn-ea"/>
+              <a:cs typeface="+mn-cs"/>
+            </a:defRPr>
+          </a:pPr>
+          <a:endParaRPr lang="fr-FR"/>
+        </a:p>
+      </c:txPr>
+    </c:legend>
+    <c:plotVisOnly val="1"/>
+    <c:dispBlanksAs val="gap"/>
+    <c:extLst>
+      <c:ext xmlns:c16r3="http://schemas.microsoft.com/office/drawing/2017/03/chart" uri="{56B9EC1D-385E-4148-901F-78D8002777C0}">
+        <c16r3:dataDisplayOptions16>
+          <c16r3:dispNaAsBlank val="1"/>
+        </c16r3:dataDisplayOptions16>
+      </c:ext>
+    </c:extLst>
+    <c:showDLblsOverMax val="0"/>
+  </c:chart>
+  <c:spPr>
+    <a:pattFill prst="dkDnDiag">
+      <a:fgClr>
+        <a:schemeClr val="lt1">
+          <a:lumMod val="95000"/>
+        </a:schemeClr>
+      </a:fgClr>
+      <a:bgClr>
+        <a:schemeClr val="lt1"/>
+      </a:bgClr>
+    </a:pattFill>
+    <a:ln w="9525" cap="flat" cmpd="sng" algn="ctr">
+      <a:solidFill>
+        <a:schemeClr val="dk1">
+          <a:lumMod val="15000"/>
+          <a:lumOff val="85000"/>
+        </a:schemeClr>
+      </a:solidFill>
+      <a:round/>
+    </a:ln>
+    <a:effectLst/>
+  </c:spPr>
+  <c:txPr>
+    <a:bodyPr/>
+    <a:lstStyle/>
+    <a:p>
+      <a:pPr>
+        <a:defRPr/>
+      </a:pPr>
+      <a:endParaRPr lang="fr-FR"/>
+    </a:p>
+  </c:txPr>
+  <c:externalData r:id="rId3">
+    <c:autoUpdate val="0"/>
+  </c:externalData>
+</c:chartSpace>
+</file>
+
+<file path=ppt/charts/chart3.xml><?xml version="1.0" encoding="utf-8"?>
+<c:chartSpace xmlns:c="http://schemas.openxmlformats.org/drawingml/2006/chart" xmlns:a="http://schemas.openxmlformats.org/drawingml/2006/main" xmlns:r="http://schemas.openxmlformats.org/officeDocument/2006/relationships" xmlns:c16r2="http://schemas.microsoft.com/office/drawing/2015/06/chart">
+  <c:date1904 val="0"/>
+  <c:lang val="fr-FR"/>
+  <c:roundedCorners val="0"/>
+  <mc:AlternateContent xmlns:mc="http://schemas.openxmlformats.org/markup-compatibility/2006">
+    <mc:Choice xmlns:c14="http://schemas.microsoft.com/office/drawing/2007/8/2/chart" Requires="c14">
+      <c14:style val="102"/>
+    </mc:Choice>
+    <mc:Fallback>
+      <c:style val="2"/>
+    </mc:Fallback>
+  </mc:AlternateContent>
+  <c:chart>
+    <c:title>
+      <c:tx>
+        <c:rich>
+          <a:bodyPr rot="0" spcFirstLastPara="1" vertOverflow="ellipsis" vert="horz" wrap="square" anchor="ctr" anchorCtr="1"/>
+          <a:lstStyle/>
+          <a:p>
+            <a:pPr>
+              <a:defRPr sz="1800" b="1" i="0" u="none" strike="noStrike" kern="1200" baseline="0">
+                <a:solidFill>
+                  <a:schemeClr val="dk1">
+                    <a:lumMod val="65000"/>
+                    <a:lumOff val="35000"/>
+                  </a:schemeClr>
+                </a:solidFill>
+                <a:latin typeface="+mn-lt"/>
+                <a:ea typeface="+mn-ea"/>
+                <a:cs typeface="+mn-cs"/>
+              </a:defRPr>
+            </a:pPr>
+            <a:r>
+              <a:rPr lang="fr-CH"/>
+              <a:t>TCP Request distribution</a:t>
+            </a:r>
+          </a:p>
+        </c:rich>
+      </c:tx>
+      <c:overlay val="0"/>
+      <c:spPr>
+        <a:noFill/>
+        <a:ln>
+          <a:noFill/>
+        </a:ln>
+        <a:effectLst/>
+      </c:spPr>
+      <c:txPr>
+        <a:bodyPr rot="0" spcFirstLastPara="1" vertOverflow="ellipsis" vert="horz" wrap="square" anchor="ctr" anchorCtr="1"/>
+        <a:lstStyle/>
+        <a:p>
+          <a:pPr>
+            <a:defRPr sz="1800" b="1" i="0" u="none" strike="noStrike" kern="1200" baseline="0">
+              <a:solidFill>
+                <a:schemeClr val="dk1">
+                  <a:lumMod val="65000"/>
+                  <a:lumOff val="35000"/>
+                </a:schemeClr>
+              </a:solidFill>
+              <a:latin typeface="+mn-lt"/>
+              <a:ea typeface="+mn-ea"/>
+              <a:cs typeface="+mn-cs"/>
+            </a:defRPr>
+          </a:pPr>
+          <a:endParaRPr lang="fr-FR"/>
+        </a:p>
+      </c:txPr>
+    </c:title>
+    <c:autoTitleDeleted val="0"/>
+    <c:plotArea>
+      <c:layout/>
+      <c:ofPieChart>
+        <c:ofPieType val="pie"/>
+        <c:varyColors val="1"/>
+        <c:ser>
+          <c:idx val="0"/>
+          <c:order val="0"/>
+          <c:dPt>
+            <c:idx val="0"/>
+            <c:bubble3D val="0"/>
+            <c:spPr>
+              <a:solidFill>
+                <a:schemeClr val="accent1"/>
+              </a:solidFill>
+              <a:ln>
+                <a:noFill/>
+              </a:ln>
+              <a:effectLst>
+                <a:outerShdw blurRad="317500" algn="ctr" rotWithShape="0">
+                  <a:prstClr val="black">
+                    <a:alpha val="25000"/>
+                  </a:prstClr>
+                </a:outerShdw>
+              </a:effectLst>
+            </c:spPr>
+            <c:extLst>
+              <c:ext xmlns:c16="http://schemas.microsoft.com/office/drawing/2014/chart" uri="{C3380CC4-5D6E-409C-BE32-E72D297353CC}">
+                <c16:uniqueId val="{00000001-ACA4-464C-B34D-9D7DAD0F9F81}"/>
+              </c:ext>
+            </c:extLst>
+          </c:dPt>
+          <c:dPt>
+            <c:idx val="1"/>
+            <c:bubble3D val="0"/>
+            <c:spPr>
+              <a:solidFill>
+                <a:schemeClr val="accent2"/>
+              </a:solidFill>
+              <a:ln>
+                <a:noFill/>
+              </a:ln>
+              <a:effectLst>
+                <a:outerShdw blurRad="317500" algn="ctr" rotWithShape="0">
+                  <a:prstClr val="black">
+                    <a:alpha val="25000"/>
+                  </a:prstClr>
+                </a:outerShdw>
+              </a:effectLst>
+            </c:spPr>
+            <c:extLst>
+              <c:ext xmlns:c16="http://schemas.microsoft.com/office/drawing/2014/chart" uri="{C3380CC4-5D6E-409C-BE32-E72D297353CC}">
+                <c16:uniqueId val="{00000003-ACA4-464C-B34D-9D7DAD0F9F81}"/>
+              </c:ext>
+            </c:extLst>
+          </c:dPt>
+          <c:dPt>
+            <c:idx val="2"/>
+            <c:bubble3D val="0"/>
+            <c:spPr>
+              <a:solidFill>
+                <a:schemeClr val="accent3"/>
+              </a:solidFill>
+              <a:ln>
+                <a:noFill/>
+              </a:ln>
+              <a:effectLst>
+                <a:outerShdw blurRad="317500" algn="ctr" rotWithShape="0">
+                  <a:prstClr val="black">
+                    <a:alpha val="25000"/>
+                  </a:prstClr>
+                </a:outerShdw>
+              </a:effectLst>
+            </c:spPr>
+            <c:extLst>
+              <c:ext xmlns:c16="http://schemas.microsoft.com/office/drawing/2014/chart" uri="{C3380CC4-5D6E-409C-BE32-E72D297353CC}">
+                <c16:uniqueId val="{00000005-ACA4-464C-B34D-9D7DAD0F9F81}"/>
+              </c:ext>
+            </c:extLst>
+          </c:dPt>
+          <c:dPt>
+            <c:idx val="3"/>
+            <c:bubble3D val="0"/>
+            <c:spPr>
+              <a:solidFill>
+                <a:schemeClr val="accent4"/>
+              </a:solidFill>
+              <a:ln>
+                <a:noFill/>
+              </a:ln>
+              <a:effectLst>
+                <a:outerShdw blurRad="317500" algn="ctr" rotWithShape="0">
+                  <a:prstClr val="black">
+                    <a:alpha val="25000"/>
+                  </a:prstClr>
+                </a:outerShdw>
+              </a:effectLst>
+            </c:spPr>
+            <c:extLst>
+              <c:ext xmlns:c16="http://schemas.microsoft.com/office/drawing/2014/chart" uri="{C3380CC4-5D6E-409C-BE32-E72D297353CC}">
+                <c16:uniqueId val="{00000007-ACA4-464C-B34D-9D7DAD0F9F81}"/>
+              </c:ext>
+            </c:extLst>
+          </c:dPt>
+          <c:dPt>
+            <c:idx val="4"/>
+            <c:bubble3D val="0"/>
+            <c:spPr>
+              <a:solidFill>
+                <a:schemeClr val="accent5"/>
+              </a:solidFill>
+              <a:ln>
+                <a:noFill/>
+              </a:ln>
+              <a:effectLst>
+                <a:outerShdw blurRad="317500" algn="ctr" rotWithShape="0">
+                  <a:prstClr val="black">
+                    <a:alpha val="25000"/>
+                  </a:prstClr>
+                </a:outerShdw>
+              </a:effectLst>
+            </c:spPr>
+            <c:extLst>
+              <c:ext xmlns:c16="http://schemas.microsoft.com/office/drawing/2014/chart" uri="{C3380CC4-5D6E-409C-BE32-E72D297353CC}">
+                <c16:uniqueId val="{00000009-ACA4-464C-B34D-9D7DAD0F9F81}"/>
+              </c:ext>
+            </c:extLst>
+          </c:dPt>
+          <c:dPt>
+            <c:idx val="5"/>
+            <c:bubble3D val="0"/>
+            <c:spPr>
+              <a:solidFill>
+                <a:schemeClr val="accent6"/>
+              </a:solidFill>
+              <a:ln>
+                <a:noFill/>
+              </a:ln>
+              <a:effectLst>
+                <a:outerShdw blurRad="317500" algn="ctr" rotWithShape="0">
+                  <a:prstClr val="black">
+                    <a:alpha val="25000"/>
+                  </a:prstClr>
+                </a:outerShdw>
+              </a:effectLst>
+            </c:spPr>
+            <c:extLst>
+              <c:ext xmlns:c16="http://schemas.microsoft.com/office/drawing/2014/chart" uri="{C3380CC4-5D6E-409C-BE32-E72D297353CC}">
+                <c16:uniqueId val="{0000000B-ACA4-464C-B34D-9D7DAD0F9F81}"/>
+              </c:ext>
+            </c:extLst>
+          </c:dPt>
+          <c:dPt>
+            <c:idx val="6"/>
+            <c:bubble3D val="0"/>
+            <c:spPr>
+              <a:solidFill>
+                <a:schemeClr val="accent1">
+                  <a:lumMod val="60000"/>
+                </a:schemeClr>
+              </a:solidFill>
+              <a:ln>
+                <a:noFill/>
+              </a:ln>
+              <a:effectLst>
+                <a:outerShdw blurRad="317500" algn="ctr" rotWithShape="0">
+                  <a:prstClr val="black">
+                    <a:alpha val="25000"/>
+                  </a:prstClr>
+                </a:outerShdw>
+              </a:effectLst>
+            </c:spPr>
+            <c:extLst>
+              <c:ext xmlns:c16="http://schemas.microsoft.com/office/drawing/2014/chart" uri="{C3380CC4-5D6E-409C-BE32-E72D297353CC}">
+                <c16:uniqueId val="{0000000D-ACA4-464C-B34D-9D7DAD0F9F81}"/>
+              </c:ext>
+            </c:extLst>
+          </c:dPt>
+          <c:dPt>
+            <c:idx val="7"/>
+            <c:bubble3D val="0"/>
+            <c:spPr>
+              <a:solidFill>
+                <a:schemeClr val="accent2">
+                  <a:lumMod val="60000"/>
+                </a:schemeClr>
+              </a:solidFill>
+              <a:ln>
+                <a:noFill/>
+              </a:ln>
+              <a:effectLst>
+                <a:outerShdw blurRad="317500" algn="ctr" rotWithShape="0">
+                  <a:prstClr val="black">
+                    <a:alpha val="25000"/>
+                  </a:prstClr>
+                </a:outerShdw>
+              </a:effectLst>
+            </c:spPr>
+            <c:extLst>
+              <c:ext xmlns:c16="http://schemas.microsoft.com/office/drawing/2014/chart" uri="{C3380CC4-5D6E-409C-BE32-E72D297353CC}">
+                <c16:uniqueId val="{0000000F-ACA4-464C-B34D-9D7DAD0F9F81}"/>
+              </c:ext>
+            </c:extLst>
+          </c:dPt>
+          <c:dLbls>
+            <c:spPr>
+              <a:noFill/>
+              <a:ln>
+                <a:noFill/>
+              </a:ln>
+              <a:effectLst/>
+            </c:spPr>
+            <c:txPr>
+              <a:bodyPr rot="0" spcFirstLastPara="1" vertOverflow="ellipsis" vert="horz" wrap="square" lIns="38100" tIns="19050" rIns="38100" bIns="19050" anchor="ctr" anchorCtr="1">
+                <a:spAutoFit/>
+              </a:bodyPr>
+              <a:lstStyle/>
+              <a:p>
+                <a:pPr>
+                  <a:defRPr sz="900" b="1" i="0" u="none" strike="noStrike" kern="1200" baseline="0">
+                    <a:solidFill>
+                      <a:schemeClr val="lt1"/>
+                    </a:solidFill>
+                    <a:latin typeface="+mn-lt"/>
+                    <a:ea typeface="+mn-ea"/>
+                    <a:cs typeface="+mn-cs"/>
+                  </a:defRPr>
+                </a:pPr>
+                <a:endParaRPr lang="fr-FR"/>
+              </a:p>
+            </c:txPr>
+            <c:dLblPos val="inEnd"/>
+            <c:showLegendKey val="0"/>
+            <c:showVal val="0"/>
+            <c:showCatName val="0"/>
+            <c:showSerName val="0"/>
+            <c:showPercent val="1"/>
+            <c:showBubbleSize val="0"/>
+            <c:showLeaderLines val="1"/>
+            <c:leaderLines>
+              <c:spPr>
+                <a:ln w="9525" cap="flat" cmpd="sng" algn="ctr">
+                  <a:solidFill>
+                    <a:schemeClr val="dk1">
+                      <a:lumMod val="35000"/>
+                      <a:lumOff val="65000"/>
+                    </a:schemeClr>
+                  </a:solidFill>
+                  <a:round/>
+                </a:ln>
+                <a:effectLst/>
+              </c:spPr>
+            </c:leaderLines>
+            <c:extLst>
+              <c:ext xmlns:c15="http://schemas.microsoft.com/office/drawing/2012/chart" uri="{CE6537A1-D6FC-4f65-9D91-7224C49458BB}"/>
+            </c:extLst>
+          </c:dLbls>
+          <c:cat>
+            <c:strRef>
+              <c:f>Feuil1!$A$34:$A$40</c:f>
+              <c:strCache>
+                <c:ptCount val="7"/>
+                <c:pt idx="0">
+                  <c:v>neptune</c:v>
+                </c:pt>
+                <c:pt idx="1">
+                  <c:v>normal</c:v>
+                </c:pt>
+                <c:pt idx="2">
+                  <c:v>satan</c:v>
+                </c:pt>
+                <c:pt idx="3">
+                  <c:v>portsweep</c:v>
+                </c:pt>
+                <c:pt idx="4">
+                  <c:v>back</c:v>
+                </c:pt>
+                <c:pt idx="5">
+                  <c:v>nmap</c:v>
+                </c:pt>
+                <c:pt idx="6">
+                  <c:v>warezclient</c:v>
+                </c:pt>
+              </c:strCache>
+            </c:strRef>
+          </c:cat>
+          <c:val>
+            <c:numRef>
+              <c:f>Feuil1!$B$34:$B$40</c:f>
+              <c:numCache>
+                <c:formatCode>General</c:formatCode>
+                <c:ptCount val="7"/>
+                <c:pt idx="0">
+                  <c:v>1072017</c:v>
+                </c:pt>
+                <c:pt idx="1">
+                  <c:v>768670</c:v>
+                </c:pt>
+                <c:pt idx="2">
+                  <c:v>14147</c:v>
+                </c:pt>
+                <c:pt idx="3">
+                  <c:v>10407</c:v>
+                </c:pt>
+                <c:pt idx="4">
+                  <c:v>2203</c:v>
+                </c:pt>
+                <c:pt idx="5">
+                  <c:v>1034</c:v>
+                </c:pt>
+                <c:pt idx="6">
+                  <c:v>1020</c:v>
+                </c:pt>
+              </c:numCache>
+            </c:numRef>
+          </c:val>
+          <c:extLst>
+            <c:ext xmlns:c16="http://schemas.microsoft.com/office/drawing/2014/chart" uri="{C3380CC4-5D6E-409C-BE32-E72D297353CC}">
+              <c16:uniqueId val="{00000010-ACA4-464C-B34D-9D7DAD0F9F81}"/>
+            </c:ext>
+          </c:extLst>
+        </c:ser>
+        <c:dLbls>
+          <c:dLblPos val="inEnd"/>
+          <c:showLegendKey val="0"/>
+          <c:showVal val="0"/>
+          <c:showCatName val="0"/>
+          <c:showSerName val="0"/>
+          <c:showPercent val="1"/>
+          <c:showBubbleSize val="0"/>
+          <c:showLeaderLines val="1"/>
+        </c:dLbls>
+        <c:gapWidth val="100"/>
+        <c:splitType val="pos"/>
+        <c:splitPos val="5"/>
+        <c:secondPieSize val="75"/>
+        <c:serLines>
+          <c:spPr>
+            <a:ln w="9525" cap="flat" cmpd="sng" algn="ctr">
+              <a:solidFill>
+                <a:schemeClr val="dk1">
+                  <a:lumMod val="35000"/>
+                  <a:lumOff val="65000"/>
+                </a:schemeClr>
+              </a:solidFill>
+              <a:round/>
+            </a:ln>
+            <a:effectLst/>
+          </c:spPr>
+        </c:serLines>
+      </c:ofPieChart>
+      <c:spPr>
+        <a:noFill/>
+        <a:ln>
+          <a:noFill/>
+        </a:ln>
+        <a:effectLst/>
+      </c:spPr>
+    </c:plotArea>
+    <c:legend>
+      <c:legendPos val="b"/>
+      <c:overlay val="0"/>
+      <c:spPr>
+        <a:solidFill>
+          <a:schemeClr val="lt1">
+            <a:alpha val="78000"/>
+          </a:schemeClr>
+        </a:solidFill>
+        <a:ln>
+          <a:noFill/>
+        </a:ln>
+        <a:effectLst/>
+      </c:spPr>
+      <c:txPr>
+        <a:bodyPr rot="0" spcFirstLastPara="1" vertOverflow="ellipsis" vert="horz" wrap="square" anchor="ctr" anchorCtr="1"/>
+        <a:lstStyle/>
+        <a:p>
+          <a:pPr>
+            <a:defRPr sz="900" b="0" i="0" u="none" strike="noStrike" kern="1200" baseline="0">
+              <a:solidFill>
+                <a:schemeClr val="dk1">
+                  <a:lumMod val="65000"/>
+                  <a:lumOff val="35000"/>
+                </a:schemeClr>
+              </a:solidFill>
+              <a:latin typeface="+mn-lt"/>
+              <a:ea typeface="+mn-ea"/>
+              <a:cs typeface="+mn-cs"/>
+            </a:defRPr>
+          </a:pPr>
+          <a:endParaRPr lang="fr-FR"/>
+        </a:p>
+      </c:txPr>
+    </c:legend>
+    <c:plotVisOnly val="1"/>
+    <c:dispBlanksAs val="gap"/>
+    <c:extLst>
+      <c:ext xmlns:c16r3="http://schemas.microsoft.com/office/drawing/2017/03/chart" uri="{56B9EC1D-385E-4148-901F-78D8002777C0}">
+        <c16r3:dataDisplayOptions16>
+          <c16r3:dispNaAsBlank val="1"/>
+        </c16r3:dataDisplayOptions16>
+      </c:ext>
+    </c:extLst>
+    <c:showDLblsOverMax val="0"/>
+  </c:chart>
+  <c:spPr>
+    <a:pattFill prst="dkDnDiag">
+      <a:fgClr>
+        <a:schemeClr val="lt1">
+          <a:lumMod val="95000"/>
+        </a:schemeClr>
+      </a:fgClr>
+      <a:bgClr>
+        <a:schemeClr val="lt1"/>
+      </a:bgClr>
+    </a:pattFill>
+    <a:ln w="9525" cap="flat" cmpd="sng" algn="ctr">
+      <a:solidFill>
+        <a:schemeClr val="dk1">
+          <a:lumMod val="15000"/>
+          <a:lumOff val="85000"/>
+        </a:schemeClr>
+      </a:solidFill>
+      <a:round/>
+    </a:ln>
+    <a:effectLst/>
+  </c:spPr>
+  <c:txPr>
+    <a:bodyPr/>
+    <a:lstStyle/>
+    <a:p>
+      <a:pPr>
+        <a:defRPr/>
+      </a:pPr>
+      <a:endParaRPr lang="fr-FR"/>
+    </a:p>
+  </c:txPr>
+  <c:externalData r:id="rId3">
+    <c:autoUpdate val="0"/>
+  </c:externalData>
+</c:chartSpace>
+</file>
+
+<file path=ppt/charts/chart4.xml><?xml version="1.0" encoding="utf-8"?>
+<c:chartSpace xmlns:c="http://schemas.openxmlformats.org/drawingml/2006/chart" xmlns:a="http://schemas.openxmlformats.org/drawingml/2006/main" xmlns:r="http://schemas.openxmlformats.org/officeDocument/2006/relationships" xmlns:c16r2="http://schemas.microsoft.com/office/drawing/2015/06/chart">
+  <c:date1904 val="0"/>
+  <c:lang val="fr-FR"/>
+  <c:roundedCorners val="0"/>
+  <mc:AlternateContent xmlns:mc="http://schemas.openxmlformats.org/markup-compatibility/2006">
+    <mc:Choice xmlns:c14="http://schemas.microsoft.com/office/drawing/2007/8/2/chart" Requires="c14">
+      <c14:style val="102"/>
+    </mc:Choice>
+    <mc:Fallback>
+      <c:style val="2"/>
+    </mc:Fallback>
+  </mc:AlternateContent>
+  <c:chart>
+    <c:title>
+      <c:tx>
+        <c:rich>
+          <a:bodyPr rot="0" spcFirstLastPara="1" vertOverflow="ellipsis" vert="horz" wrap="square" anchor="ctr" anchorCtr="1"/>
+          <a:lstStyle/>
+          <a:p>
+            <a:pPr>
+              <a:defRPr sz="1800" b="1" i="0" u="none" strike="noStrike" kern="1200" baseline="0">
+                <a:solidFill>
+                  <a:schemeClr val="dk1">
+                    <a:lumMod val="65000"/>
+                    <a:lumOff val="35000"/>
+                  </a:schemeClr>
+                </a:solidFill>
+                <a:latin typeface="+mn-lt"/>
+                <a:ea typeface="+mn-ea"/>
+                <a:cs typeface="+mn-cs"/>
+              </a:defRPr>
+            </a:pPr>
+            <a:r>
+              <a:rPr lang="fr-CH"/>
+              <a:t>ICMP Request distribution</a:t>
+            </a:r>
+          </a:p>
+        </c:rich>
+      </c:tx>
+      <c:overlay val="0"/>
+      <c:spPr>
+        <a:noFill/>
+        <a:ln>
+          <a:noFill/>
+        </a:ln>
+        <a:effectLst/>
+      </c:spPr>
+      <c:txPr>
+        <a:bodyPr rot="0" spcFirstLastPara="1" vertOverflow="ellipsis" vert="horz" wrap="square" anchor="ctr" anchorCtr="1"/>
+        <a:lstStyle/>
+        <a:p>
+          <a:pPr>
+            <a:defRPr sz="1800" b="1" i="0" u="none" strike="noStrike" kern="1200" baseline="0">
+              <a:solidFill>
+                <a:schemeClr val="dk1">
+                  <a:lumMod val="65000"/>
+                  <a:lumOff val="35000"/>
+                </a:schemeClr>
+              </a:solidFill>
+              <a:latin typeface="+mn-lt"/>
+              <a:ea typeface="+mn-ea"/>
+              <a:cs typeface="+mn-cs"/>
+            </a:defRPr>
+          </a:pPr>
+          <a:endParaRPr lang="fr-FR"/>
+        </a:p>
+      </c:txPr>
+    </c:title>
+    <c:autoTitleDeleted val="0"/>
+    <c:plotArea>
+      <c:layout/>
+      <c:ofPieChart>
+        <c:ofPieType val="pie"/>
+        <c:varyColors val="1"/>
+        <c:ser>
+          <c:idx val="0"/>
+          <c:order val="0"/>
+          <c:dPt>
+            <c:idx val="0"/>
+            <c:bubble3D val="0"/>
+            <c:spPr>
+              <a:solidFill>
+                <a:schemeClr val="accent1"/>
+              </a:solidFill>
+              <a:ln>
+                <a:noFill/>
+              </a:ln>
+              <a:effectLst>
+                <a:outerShdw blurRad="317500" algn="ctr" rotWithShape="0">
+                  <a:prstClr val="black">
+                    <a:alpha val="25000"/>
+                  </a:prstClr>
+                </a:outerShdw>
+              </a:effectLst>
+            </c:spPr>
+            <c:extLst>
+              <c:ext xmlns:c16="http://schemas.microsoft.com/office/drawing/2014/chart" uri="{C3380CC4-5D6E-409C-BE32-E72D297353CC}">
+                <c16:uniqueId val="{00000001-75F7-4273-94EE-7DAFCA23698B}"/>
+              </c:ext>
+            </c:extLst>
+          </c:dPt>
+          <c:dPt>
+            <c:idx val="1"/>
+            <c:bubble3D val="0"/>
+            <c:spPr>
+              <a:solidFill>
+                <a:schemeClr val="accent2"/>
+              </a:solidFill>
+              <a:ln>
+                <a:noFill/>
+              </a:ln>
+              <a:effectLst>
+                <a:outerShdw blurRad="317500" algn="ctr" rotWithShape="0">
+                  <a:prstClr val="black">
+                    <a:alpha val="25000"/>
+                  </a:prstClr>
+                </a:outerShdw>
+              </a:effectLst>
+            </c:spPr>
+            <c:extLst>
+              <c:ext xmlns:c16="http://schemas.microsoft.com/office/drawing/2014/chart" uri="{C3380CC4-5D6E-409C-BE32-E72D297353CC}">
+                <c16:uniqueId val="{00000003-75F7-4273-94EE-7DAFCA23698B}"/>
+              </c:ext>
+            </c:extLst>
+          </c:dPt>
+          <c:dPt>
+            <c:idx val="2"/>
+            <c:bubble3D val="0"/>
+            <c:spPr>
+              <a:solidFill>
+                <a:schemeClr val="accent3"/>
+              </a:solidFill>
+              <a:ln>
+                <a:noFill/>
+              </a:ln>
+              <a:effectLst>
+                <a:outerShdw blurRad="317500" algn="ctr" rotWithShape="0">
+                  <a:prstClr val="black">
+                    <a:alpha val="25000"/>
+                  </a:prstClr>
+                </a:outerShdw>
+              </a:effectLst>
+            </c:spPr>
+            <c:extLst>
+              <c:ext xmlns:c16="http://schemas.microsoft.com/office/drawing/2014/chart" uri="{C3380CC4-5D6E-409C-BE32-E72D297353CC}">
+                <c16:uniqueId val="{00000005-75F7-4273-94EE-7DAFCA23698B}"/>
+              </c:ext>
+            </c:extLst>
+          </c:dPt>
+          <c:dPt>
+            <c:idx val="3"/>
+            <c:bubble3D val="0"/>
+            <c:spPr>
+              <a:solidFill>
+                <a:schemeClr val="accent4"/>
+              </a:solidFill>
+              <a:ln>
+                <a:noFill/>
+              </a:ln>
+              <a:effectLst>
+                <a:outerShdw blurRad="317500" algn="ctr" rotWithShape="0">
+                  <a:prstClr val="black">
+                    <a:alpha val="25000"/>
+                  </a:prstClr>
+                </a:outerShdw>
+              </a:effectLst>
+            </c:spPr>
+            <c:extLst>
+              <c:ext xmlns:c16="http://schemas.microsoft.com/office/drawing/2014/chart" uri="{C3380CC4-5D6E-409C-BE32-E72D297353CC}">
+                <c16:uniqueId val="{00000007-75F7-4273-94EE-7DAFCA23698B}"/>
+              </c:ext>
+            </c:extLst>
+          </c:dPt>
+          <c:dPt>
+            <c:idx val="4"/>
+            <c:bubble3D val="0"/>
+            <c:spPr>
+              <a:solidFill>
+                <a:schemeClr val="accent5"/>
+              </a:solidFill>
+              <a:ln>
+                <a:noFill/>
+              </a:ln>
+              <a:effectLst>
+                <a:outerShdw blurRad="317500" algn="ctr" rotWithShape="0">
+                  <a:prstClr val="black">
+                    <a:alpha val="25000"/>
+                  </a:prstClr>
+                </a:outerShdw>
+              </a:effectLst>
+            </c:spPr>
+            <c:extLst>
+              <c:ext xmlns:c16="http://schemas.microsoft.com/office/drawing/2014/chart" uri="{C3380CC4-5D6E-409C-BE32-E72D297353CC}">
+                <c16:uniqueId val="{00000009-75F7-4273-94EE-7DAFCA23698B}"/>
+              </c:ext>
+            </c:extLst>
+          </c:dPt>
+          <c:dPt>
+            <c:idx val="5"/>
+            <c:bubble3D val="0"/>
+            <c:spPr>
+              <a:solidFill>
+                <a:schemeClr val="accent6"/>
+              </a:solidFill>
+              <a:ln>
+                <a:noFill/>
+              </a:ln>
+              <a:effectLst>
+                <a:outerShdw blurRad="317500" algn="ctr" rotWithShape="0">
+                  <a:prstClr val="black">
+                    <a:alpha val="25000"/>
+                  </a:prstClr>
+                </a:outerShdw>
+              </a:effectLst>
+            </c:spPr>
+            <c:extLst>
+              <c:ext xmlns:c16="http://schemas.microsoft.com/office/drawing/2014/chart" uri="{C3380CC4-5D6E-409C-BE32-E72D297353CC}">
+                <c16:uniqueId val="{0000000B-75F7-4273-94EE-7DAFCA23698B}"/>
+              </c:ext>
+            </c:extLst>
+          </c:dPt>
+          <c:dPt>
+            <c:idx val="6"/>
+            <c:bubble3D val="0"/>
+            <c:spPr>
+              <a:solidFill>
+                <a:schemeClr val="accent1">
+                  <a:lumMod val="60000"/>
+                </a:schemeClr>
+              </a:solidFill>
+              <a:ln>
+                <a:noFill/>
+              </a:ln>
+              <a:effectLst>
+                <a:outerShdw blurRad="317500" algn="ctr" rotWithShape="0">
+                  <a:prstClr val="black">
+                    <a:alpha val="25000"/>
+                  </a:prstClr>
+                </a:outerShdw>
+              </a:effectLst>
+            </c:spPr>
+            <c:extLst>
+              <c:ext xmlns:c16="http://schemas.microsoft.com/office/drawing/2014/chart" uri="{C3380CC4-5D6E-409C-BE32-E72D297353CC}">
+                <c16:uniqueId val="{0000000D-75F7-4273-94EE-7DAFCA23698B}"/>
+              </c:ext>
+            </c:extLst>
+          </c:dPt>
+          <c:dPt>
+            <c:idx val="7"/>
+            <c:bubble3D val="0"/>
+            <c:spPr>
+              <a:solidFill>
+                <a:schemeClr val="accent2">
+                  <a:lumMod val="60000"/>
+                </a:schemeClr>
+              </a:solidFill>
+              <a:ln>
+                <a:noFill/>
+              </a:ln>
+              <a:effectLst>
+                <a:outerShdw blurRad="317500" algn="ctr" rotWithShape="0">
+                  <a:prstClr val="black">
+                    <a:alpha val="25000"/>
+                  </a:prstClr>
+                </a:outerShdw>
+              </a:effectLst>
+            </c:spPr>
+            <c:extLst>
+              <c:ext xmlns:c16="http://schemas.microsoft.com/office/drawing/2014/chart" uri="{C3380CC4-5D6E-409C-BE32-E72D297353CC}">
+                <c16:uniqueId val="{0000000F-75F7-4273-94EE-7DAFCA23698B}"/>
+              </c:ext>
+            </c:extLst>
+          </c:dPt>
+          <c:dLbls>
+            <c:spPr>
+              <a:noFill/>
+              <a:ln>
+                <a:noFill/>
+              </a:ln>
+              <a:effectLst/>
+            </c:spPr>
+            <c:txPr>
+              <a:bodyPr rot="0" spcFirstLastPara="1" vertOverflow="ellipsis" vert="horz" wrap="square" lIns="38100" tIns="19050" rIns="38100" bIns="19050" anchor="ctr" anchorCtr="1">
+                <a:spAutoFit/>
+              </a:bodyPr>
+              <a:lstStyle/>
+              <a:p>
+                <a:pPr>
+                  <a:defRPr sz="900" b="1" i="0" u="none" strike="noStrike" kern="1200" baseline="0">
+                    <a:solidFill>
+                      <a:schemeClr val="lt1"/>
+                    </a:solidFill>
+                    <a:latin typeface="+mn-lt"/>
+                    <a:ea typeface="+mn-ea"/>
+                    <a:cs typeface="+mn-cs"/>
+                  </a:defRPr>
+                </a:pPr>
+                <a:endParaRPr lang="fr-FR"/>
+              </a:p>
+            </c:txPr>
+            <c:dLblPos val="inEnd"/>
+            <c:showLegendKey val="0"/>
+            <c:showVal val="0"/>
+            <c:showCatName val="0"/>
+            <c:showSerName val="0"/>
+            <c:showPercent val="1"/>
+            <c:showBubbleSize val="0"/>
+            <c:showLeaderLines val="1"/>
+            <c:leaderLines>
+              <c:spPr>
+                <a:ln w="9525" cap="flat" cmpd="sng" algn="ctr">
+                  <a:solidFill>
+                    <a:schemeClr val="dk1">
+                      <a:lumMod val="35000"/>
+                      <a:lumOff val="65000"/>
+                    </a:schemeClr>
+                  </a:solidFill>
+                  <a:round/>
+                </a:ln>
+                <a:effectLst/>
+              </c:spPr>
+            </c:leaderLines>
+            <c:extLst>
+              <c:ext xmlns:c15="http://schemas.microsoft.com/office/drawing/2012/chart" uri="{CE6537A1-D6FC-4f65-9D91-7224C49458BB}"/>
+            </c:extLst>
+          </c:dLbls>
+          <c:cat>
+            <c:strRef>
+              <c:f>Feuil1!$A$6:$A$12</c:f>
+              <c:strCache>
+                <c:ptCount val="7"/>
+                <c:pt idx="0">
+                  <c:v>smurf</c:v>
+                </c:pt>
+                <c:pt idx="1">
+                  <c:v>normal</c:v>
+                </c:pt>
+                <c:pt idx="2">
+                  <c:v>ipsweep</c:v>
+                </c:pt>
+                <c:pt idx="3">
+                  <c:v>nmap</c:v>
+                </c:pt>
+                <c:pt idx="4">
+                  <c:v>pod</c:v>
+                </c:pt>
+                <c:pt idx="5">
+                  <c:v>satan</c:v>
+                </c:pt>
+                <c:pt idx="6">
+                  <c:v>portsweep</c:v>
+                </c:pt>
+              </c:strCache>
+            </c:strRef>
+          </c:cat>
+          <c:val>
+            <c:numRef>
+              <c:f>Feuil1!$B$6:$B$12</c:f>
+              <c:numCache>
+                <c:formatCode>General</c:formatCode>
+                <c:ptCount val="7"/>
+                <c:pt idx="0">
+                  <c:v>2807886</c:v>
+                </c:pt>
+                <c:pt idx="1">
+                  <c:v>12763</c:v>
+                </c:pt>
+                <c:pt idx="2">
+                  <c:v>11557</c:v>
+                </c:pt>
+                <c:pt idx="3">
+                  <c:v>1032</c:v>
+                </c:pt>
+                <c:pt idx="4">
+                  <c:v>264</c:v>
+                </c:pt>
+                <c:pt idx="5">
+                  <c:v>37</c:v>
+                </c:pt>
+                <c:pt idx="6">
+                  <c:v>6</c:v>
+                </c:pt>
+              </c:numCache>
+            </c:numRef>
+          </c:val>
+          <c:extLst>
+            <c:ext xmlns:c16="http://schemas.microsoft.com/office/drawing/2014/chart" uri="{C3380CC4-5D6E-409C-BE32-E72D297353CC}">
+              <c16:uniqueId val="{00000010-75F7-4273-94EE-7DAFCA23698B}"/>
+            </c:ext>
+          </c:extLst>
+        </c:ser>
+        <c:dLbls>
+          <c:dLblPos val="inEnd"/>
+          <c:showLegendKey val="0"/>
+          <c:showVal val="0"/>
+          <c:showCatName val="0"/>
+          <c:showSerName val="0"/>
+          <c:showPercent val="1"/>
+          <c:showBubbleSize val="0"/>
+          <c:showLeaderLines val="1"/>
+        </c:dLbls>
+        <c:gapWidth val="100"/>
+        <c:splitType val="pos"/>
+        <c:splitPos val="6"/>
+        <c:secondPieSize val="75"/>
+        <c:serLines>
+          <c:spPr>
+            <a:ln w="9525" cap="flat" cmpd="sng" algn="ctr">
+              <a:solidFill>
+                <a:schemeClr val="dk1">
+                  <a:lumMod val="35000"/>
+                  <a:lumOff val="65000"/>
+                </a:schemeClr>
+              </a:solidFill>
+              <a:round/>
+            </a:ln>
+            <a:effectLst/>
+          </c:spPr>
+        </c:serLines>
+      </c:ofPieChart>
+      <c:spPr>
+        <a:noFill/>
+        <a:ln>
+          <a:noFill/>
+        </a:ln>
+        <a:effectLst/>
+      </c:spPr>
+    </c:plotArea>
+    <c:legend>
+      <c:legendPos val="b"/>
+      <c:overlay val="0"/>
+      <c:spPr>
+        <a:solidFill>
+          <a:schemeClr val="lt1">
+            <a:alpha val="78000"/>
+          </a:schemeClr>
+        </a:solidFill>
+        <a:ln>
+          <a:noFill/>
+        </a:ln>
+        <a:effectLst/>
+      </c:spPr>
+      <c:txPr>
+        <a:bodyPr rot="0" spcFirstLastPara="1" vertOverflow="ellipsis" vert="horz" wrap="square" anchor="ctr" anchorCtr="1"/>
+        <a:lstStyle/>
+        <a:p>
+          <a:pPr>
+            <a:defRPr sz="900" b="0" i="0" u="none" strike="noStrike" kern="1200" baseline="0">
+              <a:solidFill>
+                <a:schemeClr val="dk1">
+                  <a:lumMod val="65000"/>
+                  <a:lumOff val="35000"/>
+                </a:schemeClr>
+              </a:solidFill>
+              <a:latin typeface="+mn-lt"/>
+              <a:ea typeface="+mn-ea"/>
+              <a:cs typeface="+mn-cs"/>
+            </a:defRPr>
+          </a:pPr>
+          <a:endParaRPr lang="fr-FR"/>
+        </a:p>
+      </c:txPr>
+    </c:legend>
+    <c:plotVisOnly val="1"/>
+    <c:dispBlanksAs val="gap"/>
+    <c:extLst>
+      <c:ext xmlns:c16r3="http://schemas.microsoft.com/office/drawing/2017/03/chart" uri="{56B9EC1D-385E-4148-901F-78D8002777C0}">
+        <c16r3:dataDisplayOptions16>
+          <c16r3:dispNaAsBlank val="1"/>
+        </c16r3:dataDisplayOptions16>
+      </c:ext>
+    </c:extLst>
+    <c:showDLblsOverMax val="0"/>
+  </c:chart>
+  <c:spPr>
+    <a:pattFill prst="dkDnDiag">
+      <a:fgClr>
+        <a:schemeClr val="lt1">
+          <a:lumMod val="95000"/>
+        </a:schemeClr>
+      </a:fgClr>
+      <a:bgClr>
+        <a:schemeClr val="lt1"/>
+      </a:bgClr>
+    </a:pattFill>
+    <a:ln w="9525" cap="flat" cmpd="sng" algn="ctr">
+      <a:solidFill>
+        <a:schemeClr val="dk1">
+          <a:lumMod val="15000"/>
+          <a:lumOff val="85000"/>
+        </a:schemeClr>
+      </a:solidFill>
+      <a:round/>
+    </a:ln>
+    <a:effectLst/>
+  </c:spPr>
+  <c:txPr>
+    <a:bodyPr/>
+    <a:lstStyle/>
+    <a:p>
+      <a:pPr>
+        <a:defRPr/>
+      </a:pPr>
+      <a:endParaRPr lang="fr-FR"/>
+    </a:p>
+  </c:txPr>
+  <c:externalData r:id="rId3">
+    <c:autoUpdate val="0"/>
+  </c:externalData>
+</c:chartSpace>
+</file>
+
 <file path=ppt/charts/colors1.xml><?xml version="1.0" encoding="utf-8"?>
 <cs:colorStyle xmlns:cs="http://schemas.microsoft.com/office/drawing/2012/chartStyle" xmlns:a="http://schemas.openxmlformats.org/drawingml/2006/main" meth="cycle" id="10">
   <a:schemeClr val="accent1"/>
@@ -521,7 +2002,1720 @@
 </cs:colorStyle>
 </file>
 
+<file path=ppt/charts/colors2.xml><?xml version="1.0" encoding="utf-8"?>
+<cs:colorStyle xmlns:cs="http://schemas.microsoft.com/office/drawing/2012/chartStyle" xmlns:a="http://schemas.openxmlformats.org/drawingml/2006/main" meth="cycle" id="10">
+  <a:schemeClr val="accent1"/>
+  <a:schemeClr val="accent2"/>
+  <a:schemeClr val="accent3"/>
+  <a:schemeClr val="accent4"/>
+  <a:schemeClr val="accent5"/>
+  <a:schemeClr val="accent6"/>
+  <cs:variation/>
+  <cs:variation>
+    <a:lumMod val="60000"/>
+  </cs:variation>
+  <cs:variation>
+    <a:lumMod val="80000"/>
+    <a:lumOff val="20000"/>
+  </cs:variation>
+  <cs:variation>
+    <a:lumMod val="80000"/>
+  </cs:variation>
+  <cs:variation>
+    <a:lumMod val="60000"/>
+    <a:lumOff val="40000"/>
+  </cs:variation>
+  <cs:variation>
+    <a:lumMod val="50000"/>
+  </cs:variation>
+  <cs:variation>
+    <a:lumMod val="70000"/>
+    <a:lumOff val="30000"/>
+  </cs:variation>
+  <cs:variation>
+    <a:lumMod val="70000"/>
+  </cs:variation>
+  <cs:variation>
+    <a:lumMod val="50000"/>
+    <a:lumOff val="50000"/>
+  </cs:variation>
+</cs:colorStyle>
+</file>
+
+<file path=ppt/charts/colors3.xml><?xml version="1.0" encoding="utf-8"?>
+<cs:colorStyle xmlns:cs="http://schemas.microsoft.com/office/drawing/2012/chartStyle" xmlns:a="http://schemas.openxmlformats.org/drawingml/2006/main" meth="cycle" id="10">
+  <a:schemeClr val="accent1"/>
+  <a:schemeClr val="accent2"/>
+  <a:schemeClr val="accent3"/>
+  <a:schemeClr val="accent4"/>
+  <a:schemeClr val="accent5"/>
+  <a:schemeClr val="accent6"/>
+  <cs:variation/>
+  <cs:variation>
+    <a:lumMod val="60000"/>
+  </cs:variation>
+  <cs:variation>
+    <a:lumMod val="80000"/>
+    <a:lumOff val="20000"/>
+  </cs:variation>
+  <cs:variation>
+    <a:lumMod val="80000"/>
+  </cs:variation>
+  <cs:variation>
+    <a:lumMod val="60000"/>
+    <a:lumOff val="40000"/>
+  </cs:variation>
+  <cs:variation>
+    <a:lumMod val="50000"/>
+  </cs:variation>
+  <cs:variation>
+    <a:lumMod val="70000"/>
+    <a:lumOff val="30000"/>
+  </cs:variation>
+  <cs:variation>
+    <a:lumMod val="70000"/>
+  </cs:variation>
+  <cs:variation>
+    <a:lumMod val="50000"/>
+    <a:lumOff val="50000"/>
+  </cs:variation>
+</cs:colorStyle>
+</file>
+
+<file path=ppt/charts/colors4.xml><?xml version="1.0" encoding="utf-8"?>
+<cs:colorStyle xmlns:cs="http://schemas.microsoft.com/office/drawing/2012/chartStyle" xmlns:a="http://schemas.openxmlformats.org/drawingml/2006/main" meth="cycle" id="10">
+  <a:schemeClr val="accent1"/>
+  <a:schemeClr val="accent2"/>
+  <a:schemeClr val="accent3"/>
+  <a:schemeClr val="accent4"/>
+  <a:schemeClr val="accent5"/>
+  <a:schemeClr val="accent6"/>
+  <cs:variation/>
+  <cs:variation>
+    <a:lumMod val="60000"/>
+  </cs:variation>
+  <cs:variation>
+    <a:lumMod val="80000"/>
+    <a:lumOff val="20000"/>
+  </cs:variation>
+  <cs:variation>
+    <a:lumMod val="80000"/>
+  </cs:variation>
+  <cs:variation>
+    <a:lumMod val="60000"/>
+    <a:lumOff val="40000"/>
+  </cs:variation>
+  <cs:variation>
+    <a:lumMod val="50000"/>
+  </cs:variation>
+  <cs:variation>
+    <a:lumMod val="70000"/>
+    <a:lumOff val="30000"/>
+  </cs:variation>
+  <cs:variation>
+    <a:lumMod val="70000"/>
+  </cs:variation>
+  <cs:variation>
+    <a:lumMod val="50000"/>
+    <a:lumOff val="50000"/>
+  </cs:variation>
+</cs:colorStyle>
+</file>
+
 <file path=ppt/charts/style1.xml><?xml version="1.0" encoding="utf-8"?>
+<cs:chartStyle xmlns:cs="http://schemas.microsoft.com/office/drawing/2012/chartStyle" xmlns:a="http://schemas.openxmlformats.org/drawingml/2006/main" id="261">
+  <cs:axisTitle>
+    <cs:lnRef idx="0"/>
+    <cs:fillRef idx="0"/>
+    <cs:effectRef idx="0"/>
+    <cs:fontRef idx="minor">
+      <a:schemeClr val="dk1">
+        <a:lumMod val="65000"/>
+        <a:lumOff val="35000"/>
+      </a:schemeClr>
+    </cs:fontRef>
+    <cs:defRPr sz="900" kern="1200"/>
+  </cs:axisTitle>
+  <cs:categoryAxis>
+    <cs:lnRef idx="0"/>
+    <cs:fillRef idx="0"/>
+    <cs:effectRef idx="0"/>
+    <cs:fontRef idx="minor">
+      <a:schemeClr val="dk1">
+        <a:lumMod val="65000"/>
+        <a:lumOff val="35000"/>
+      </a:schemeClr>
+    </cs:fontRef>
+    <cs:defRPr sz="900" kern="1200"/>
+  </cs:categoryAxis>
+  <cs:chartArea>
+    <cs:lnRef idx="0"/>
+    <cs:fillRef idx="0"/>
+    <cs:effectRef idx="0"/>
+    <cs:fontRef idx="minor">
+      <a:schemeClr val="dk1"/>
+    </cs:fontRef>
+    <cs:spPr>
+      <a:pattFill prst="dkDnDiag">
+        <a:fgClr>
+          <a:schemeClr val="lt1">
+            <a:lumMod val="95000"/>
+          </a:schemeClr>
+        </a:fgClr>
+        <a:bgClr>
+          <a:schemeClr val="lt1"/>
+        </a:bgClr>
+      </a:pattFill>
+      <a:ln w="9525" cap="flat" cmpd="sng" algn="ctr">
+        <a:solidFill>
+          <a:schemeClr val="dk1">
+            <a:lumMod val="15000"/>
+            <a:lumOff val="85000"/>
+          </a:schemeClr>
+        </a:solidFill>
+        <a:round/>
+      </a:ln>
+    </cs:spPr>
+    <cs:defRPr sz="900" kern="1200"/>
+  </cs:chartArea>
+  <cs:dataLabel>
+    <cs:lnRef idx="0"/>
+    <cs:fillRef idx="0"/>
+    <cs:effectRef idx="0"/>
+    <cs:fontRef idx="minor">
+      <a:schemeClr val="lt1"/>
+    </cs:fontRef>
+    <cs:defRPr sz="900" b="1" i="0" u="none" strike="noStrike" kern="1200" baseline="0"/>
+  </cs:dataLabel>
+  <cs:dataLabelCallout>
+    <cs:lnRef idx="0"/>
+    <cs:fillRef idx="0"/>
+    <cs:effectRef idx="0"/>
+    <cs:fontRef idx="minor">
+      <a:schemeClr val="dk1">
+        <a:lumMod val="65000"/>
+        <a:lumOff val="35000"/>
+      </a:schemeClr>
+    </cs:fontRef>
+    <cs:spPr>
+      <a:solidFill>
+        <a:schemeClr val="lt1">
+          <a:alpha val="75000"/>
+        </a:schemeClr>
+      </a:solidFill>
+      <a:ln w="9525">
+        <a:solidFill>
+          <a:schemeClr val="dk1">
+            <a:lumMod val="25000"/>
+            <a:lumOff val="75000"/>
+          </a:schemeClr>
+        </a:solidFill>
+      </a:ln>
+    </cs:spPr>
+    <cs:defRPr sz="900" kern="1200"/>
+    <cs:bodyPr rot="0" spcFirstLastPara="1" vertOverflow="clip" horzOverflow="clip" vert="horz" wrap="square" lIns="36576" tIns="18288" rIns="36576" bIns="18288" anchor="ctr" anchorCtr="1">
+      <a:spAutoFit/>
+    </cs:bodyPr>
+  </cs:dataLabelCallout>
+  <cs:dataPoint>
+    <cs:lnRef idx="0"/>
+    <cs:fillRef idx="0">
+      <cs:styleClr val="auto"/>
+    </cs:fillRef>
+    <cs:effectRef idx="0"/>
+    <cs:fontRef idx="minor">
+      <a:schemeClr val="dk1"/>
+    </cs:fontRef>
+    <cs:spPr>
+      <a:solidFill>
+        <a:schemeClr val="phClr"/>
+      </a:solidFill>
+      <a:effectLst>
+        <a:outerShdw blurRad="317500" algn="ctr" rotWithShape="0">
+          <a:prstClr val="black">
+            <a:alpha val="25000"/>
+          </a:prstClr>
+        </a:outerShdw>
+      </a:effectLst>
+    </cs:spPr>
+  </cs:dataPoint>
+  <cs:dataPoint3D>
+    <cs:lnRef idx="0"/>
+    <cs:fillRef idx="0">
+      <cs:styleClr val="auto"/>
+    </cs:fillRef>
+    <cs:effectRef idx="0"/>
+    <cs:fontRef idx="minor">
+      <a:schemeClr val="dk1"/>
+    </cs:fontRef>
+    <cs:spPr>
+      <a:solidFill>
+        <a:schemeClr val="phClr"/>
+      </a:solidFill>
+      <a:effectLst>
+        <a:outerShdw blurRad="88900" sx="102000" sy="102000" algn="ctr" rotWithShape="0">
+          <a:prstClr val="black">
+            <a:alpha val="20000"/>
+          </a:prstClr>
+        </a:outerShdw>
+      </a:effectLst>
+      <a:scene3d>
+        <a:camera prst="orthographicFront"/>
+        <a:lightRig rig="threePt" dir="t"/>
+      </a:scene3d>
+      <a:sp3d prstMaterial="matte"/>
+    </cs:spPr>
+  </cs:dataPoint3D>
+  <cs:dataPointLine>
+    <cs:lnRef idx="0">
+      <cs:styleClr val="auto"/>
+    </cs:lnRef>
+    <cs:fillRef idx="0"/>
+    <cs:effectRef idx="0"/>
+    <cs:fontRef idx="minor">
+      <a:schemeClr val="dk1"/>
+    </cs:fontRef>
+    <cs:spPr>
+      <a:ln w="28575" cap="rnd">
+        <a:solidFill>
+          <a:schemeClr val="phClr"/>
+        </a:solidFill>
+        <a:round/>
+      </a:ln>
+    </cs:spPr>
+  </cs:dataPointLine>
+  <cs:dataPointMarker>
+    <cs:lnRef idx="0"/>
+    <cs:fillRef idx="0">
+      <cs:styleClr val="auto"/>
+    </cs:fillRef>
+    <cs:effectRef idx="0"/>
+    <cs:fontRef idx="minor">
+      <a:schemeClr val="dk1"/>
+    </cs:fontRef>
+    <cs:spPr>
+      <a:solidFill>
+        <a:schemeClr val="phClr"/>
+      </a:solidFill>
+      <a:ln w="9525">
+        <a:solidFill>
+          <a:schemeClr val="lt1"/>
+        </a:solidFill>
+      </a:ln>
+    </cs:spPr>
+  </cs:dataPointMarker>
+  <cs:dataPointMarkerLayout symbol="circle" size="6"/>
+  <cs:dataPointWireframe>
+    <cs:lnRef idx="0">
+      <cs:styleClr val="auto"/>
+    </cs:lnRef>
+    <cs:fillRef idx="0"/>
+    <cs:effectRef idx="0"/>
+    <cs:fontRef idx="minor">
+      <a:schemeClr val="dk1"/>
+    </cs:fontRef>
+    <cs:spPr>
+      <a:ln w="9525" cap="rnd">
+        <a:solidFill>
+          <a:schemeClr val="phClr"/>
+        </a:solidFill>
+        <a:round/>
+      </a:ln>
+    </cs:spPr>
+  </cs:dataPointWireframe>
+  <cs:dataTable>
+    <cs:lnRef idx="0"/>
+    <cs:fillRef idx="0"/>
+    <cs:effectRef idx="0"/>
+    <cs:fontRef idx="minor">
+      <a:schemeClr val="dk1">
+        <a:lumMod val="65000"/>
+        <a:lumOff val="35000"/>
+      </a:schemeClr>
+    </cs:fontRef>
+    <cs:spPr>
+      <a:noFill/>
+      <a:ln w="9525" cap="flat" cmpd="sng" algn="ctr">
+        <a:solidFill>
+          <a:schemeClr val="dk1">
+            <a:lumMod val="15000"/>
+            <a:lumOff val="85000"/>
+          </a:schemeClr>
+        </a:solidFill>
+        <a:round/>
+      </a:ln>
+    </cs:spPr>
+    <cs:defRPr sz="900" kern="1200"/>
+  </cs:dataTable>
+  <cs:downBar>
+    <cs:lnRef idx="0"/>
+    <cs:fillRef idx="0"/>
+    <cs:effectRef idx="0"/>
+    <cs:fontRef idx="minor">
+      <a:schemeClr val="dk1"/>
+    </cs:fontRef>
+    <cs:spPr>
+      <a:solidFill>
+        <a:schemeClr val="dk1">
+          <a:lumMod val="75000"/>
+          <a:lumOff val="25000"/>
+        </a:schemeClr>
+      </a:solidFill>
+      <a:ln w="9525" cap="flat" cmpd="sng" algn="ctr">
+        <a:solidFill>
+          <a:schemeClr val="dk1">
+            <a:lumMod val="65000"/>
+            <a:lumOff val="35000"/>
+          </a:schemeClr>
+        </a:solidFill>
+        <a:round/>
+      </a:ln>
+    </cs:spPr>
+  </cs:downBar>
+  <cs:dropLine>
+    <cs:lnRef idx="0"/>
+    <cs:fillRef idx="0"/>
+    <cs:effectRef idx="0"/>
+    <cs:fontRef idx="minor">
+      <a:schemeClr val="dk1"/>
+    </cs:fontRef>
+    <cs:spPr>
+      <a:ln w="9525" cap="flat" cmpd="sng" algn="ctr">
+        <a:solidFill>
+          <a:schemeClr val="dk1">
+            <a:lumMod val="35000"/>
+            <a:lumOff val="65000"/>
+          </a:schemeClr>
+        </a:solidFill>
+        <a:round/>
+      </a:ln>
+    </cs:spPr>
+  </cs:dropLine>
+  <cs:errorBar>
+    <cs:lnRef idx="0"/>
+    <cs:fillRef idx="0"/>
+    <cs:effectRef idx="0"/>
+    <cs:fontRef idx="minor">
+      <a:schemeClr val="dk1"/>
+    </cs:fontRef>
+    <cs:spPr>
+      <a:ln w="9525" cap="flat" cmpd="sng" algn="ctr">
+        <a:solidFill>
+          <a:schemeClr val="dk1">
+            <a:lumMod val="65000"/>
+            <a:lumOff val="35000"/>
+          </a:schemeClr>
+        </a:solidFill>
+        <a:round/>
+      </a:ln>
+    </cs:spPr>
+  </cs:errorBar>
+  <cs:floor>
+    <cs:lnRef idx="0"/>
+    <cs:fillRef idx="0"/>
+    <cs:effectRef idx="0"/>
+    <cs:fontRef idx="minor">
+      <a:schemeClr val="dk1"/>
+    </cs:fontRef>
+    <cs:spPr>
+      <a:noFill/>
+      <a:ln>
+        <a:noFill/>
+      </a:ln>
+    </cs:spPr>
+  </cs:floor>
+  <cs:gridlineMajor>
+    <cs:lnRef idx="0"/>
+    <cs:fillRef idx="0"/>
+    <cs:effectRef idx="0"/>
+    <cs:fontRef idx="minor">
+      <a:schemeClr val="dk1"/>
+    </cs:fontRef>
+    <cs:spPr>
+      <a:ln w="9525" cap="flat" cmpd="sng" algn="ctr">
+        <a:solidFill>
+          <a:schemeClr val="dk1">
+            <a:lumMod val="15000"/>
+            <a:lumOff val="85000"/>
+          </a:schemeClr>
+        </a:solidFill>
+        <a:round/>
+      </a:ln>
+    </cs:spPr>
+  </cs:gridlineMajor>
+  <cs:gridlineMinor>
+    <cs:lnRef idx="0"/>
+    <cs:fillRef idx="0"/>
+    <cs:effectRef idx="0"/>
+    <cs:fontRef idx="minor">
+      <a:schemeClr val="dk1"/>
+    </cs:fontRef>
+    <cs:spPr>
+      <a:ln w="9525" cap="flat" cmpd="sng" algn="ctr">
+        <a:solidFill>
+          <a:schemeClr val="dk1">
+            <a:lumMod val="5000"/>
+            <a:lumOff val="95000"/>
+          </a:schemeClr>
+        </a:solidFill>
+        <a:round/>
+      </a:ln>
+    </cs:spPr>
+  </cs:gridlineMinor>
+  <cs:hiLoLine>
+    <cs:lnRef idx="0"/>
+    <cs:fillRef idx="0"/>
+    <cs:effectRef idx="0"/>
+    <cs:fontRef idx="minor">
+      <a:schemeClr val="dk1"/>
+    </cs:fontRef>
+    <cs:spPr>
+      <a:ln w="9525" cap="flat" cmpd="sng" algn="ctr">
+        <a:solidFill>
+          <a:schemeClr val="dk1">
+            <a:lumMod val="50000"/>
+            <a:lumOff val="50000"/>
+          </a:schemeClr>
+        </a:solidFill>
+        <a:round/>
+      </a:ln>
+    </cs:spPr>
+  </cs:hiLoLine>
+  <cs:leaderLine>
+    <cs:lnRef idx="0"/>
+    <cs:fillRef idx="0"/>
+    <cs:effectRef idx="0"/>
+    <cs:fontRef idx="minor">
+      <a:schemeClr val="dk1"/>
+    </cs:fontRef>
+    <cs:spPr>
+      <a:ln w="9525" cap="flat" cmpd="sng" algn="ctr">
+        <a:solidFill>
+          <a:schemeClr val="dk1">
+            <a:lumMod val="35000"/>
+            <a:lumOff val="65000"/>
+          </a:schemeClr>
+        </a:solidFill>
+        <a:round/>
+      </a:ln>
+    </cs:spPr>
+  </cs:leaderLine>
+  <cs:legend>
+    <cs:lnRef idx="0"/>
+    <cs:fillRef idx="0"/>
+    <cs:effectRef idx="0"/>
+    <cs:fontRef idx="minor">
+      <a:schemeClr val="dk1">
+        <a:lumMod val="65000"/>
+        <a:lumOff val="35000"/>
+      </a:schemeClr>
+    </cs:fontRef>
+    <cs:spPr>
+      <a:solidFill>
+        <a:schemeClr val="lt1">
+          <a:alpha val="78000"/>
+        </a:schemeClr>
+      </a:solidFill>
+    </cs:spPr>
+    <cs:defRPr sz="900" kern="1200"/>
+  </cs:legend>
+  <cs:plotArea mods="allowNoFillOverride allowNoLineOverride">
+    <cs:lnRef idx="0"/>
+    <cs:fillRef idx="0"/>
+    <cs:effectRef idx="0"/>
+    <cs:fontRef idx="minor">
+      <a:schemeClr val="dk1"/>
+    </cs:fontRef>
+  </cs:plotArea>
+  <cs:plotArea3D mods="allowNoFillOverride allowNoLineOverride">
+    <cs:lnRef idx="0"/>
+    <cs:fillRef idx="0"/>
+    <cs:effectRef idx="0"/>
+    <cs:fontRef idx="minor">
+      <a:schemeClr val="dk1"/>
+    </cs:fontRef>
+  </cs:plotArea3D>
+  <cs:seriesAxis>
+    <cs:lnRef idx="0"/>
+    <cs:fillRef idx="0"/>
+    <cs:effectRef idx="0"/>
+    <cs:fontRef idx="minor">
+      <a:schemeClr val="dk1">
+        <a:lumMod val="65000"/>
+        <a:lumOff val="35000"/>
+      </a:schemeClr>
+    </cs:fontRef>
+    <cs:defRPr sz="900" kern="1200"/>
+  </cs:seriesAxis>
+  <cs:seriesLine>
+    <cs:lnRef idx="0"/>
+    <cs:fillRef idx="0"/>
+    <cs:effectRef idx="0"/>
+    <cs:fontRef idx="minor">
+      <a:schemeClr val="dk1"/>
+    </cs:fontRef>
+    <cs:spPr>
+      <a:ln w="9525" cap="flat" cmpd="sng" algn="ctr">
+        <a:solidFill>
+          <a:schemeClr val="dk1">
+            <a:lumMod val="35000"/>
+            <a:lumOff val="65000"/>
+          </a:schemeClr>
+        </a:solidFill>
+        <a:round/>
+      </a:ln>
+    </cs:spPr>
+  </cs:seriesLine>
+  <cs:title>
+    <cs:lnRef idx="0"/>
+    <cs:fillRef idx="0"/>
+    <cs:effectRef idx="0"/>
+    <cs:fontRef idx="minor">
+      <a:schemeClr val="dk1">
+        <a:lumMod val="65000"/>
+        <a:lumOff val="35000"/>
+      </a:schemeClr>
+    </cs:fontRef>
+    <cs:defRPr sz="1800" b="1" kern="1200" baseline="0"/>
+  </cs:title>
+  <cs:trendline>
+    <cs:lnRef idx="0">
+      <cs:styleClr val="auto"/>
+    </cs:lnRef>
+    <cs:fillRef idx="0"/>
+    <cs:effectRef idx="0"/>
+    <cs:fontRef idx="minor">
+      <a:schemeClr val="dk1"/>
+    </cs:fontRef>
+    <cs:spPr>
+      <a:ln w="19050" cap="rnd">
+        <a:solidFill>
+          <a:schemeClr val="phClr"/>
+        </a:solidFill>
+        <a:prstDash val="sysDash"/>
+      </a:ln>
+    </cs:spPr>
+  </cs:trendline>
+  <cs:trendlineLabel>
+    <cs:lnRef idx="0"/>
+    <cs:fillRef idx="0"/>
+    <cs:effectRef idx="0"/>
+    <cs:fontRef idx="minor">
+      <a:schemeClr val="dk1">
+        <a:lumMod val="65000"/>
+        <a:lumOff val="35000"/>
+      </a:schemeClr>
+    </cs:fontRef>
+    <cs:defRPr sz="900" kern="1200"/>
+  </cs:trendlineLabel>
+  <cs:upBar>
+    <cs:lnRef idx="0"/>
+    <cs:fillRef idx="0"/>
+    <cs:effectRef idx="0"/>
+    <cs:fontRef idx="minor">
+      <a:schemeClr val="dk1"/>
+    </cs:fontRef>
+    <cs:spPr>
+      <a:solidFill>
+        <a:schemeClr val="lt1"/>
+      </a:solidFill>
+      <a:ln w="9525" cap="flat" cmpd="sng" algn="ctr">
+        <a:solidFill>
+          <a:schemeClr val="dk1">
+            <a:lumMod val="65000"/>
+            <a:lumOff val="35000"/>
+          </a:schemeClr>
+        </a:solidFill>
+        <a:round/>
+      </a:ln>
+    </cs:spPr>
+  </cs:upBar>
+  <cs:valueAxis>
+    <cs:lnRef idx="0"/>
+    <cs:fillRef idx="0"/>
+    <cs:effectRef idx="0"/>
+    <cs:fontRef idx="minor">
+      <a:schemeClr val="dk1">
+        <a:lumMod val="65000"/>
+        <a:lumOff val="35000"/>
+      </a:schemeClr>
+    </cs:fontRef>
+    <cs:defRPr sz="900" kern="1200"/>
+  </cs:valueAxis>
+  <cs:wall>
+    <cs:lnRef idx="0"/>
+    <cs:fillRef idx="0"/>
+    <cs:effectRef idx="0"/>
+    <cs:fontRef idx="minor">
+      <a:schemeClr val="dk1"/>
+    </cs:fontRef>
+  </cs:wall>
+</cs:chartStyle>
+</file>
+
+<file path=ppt/charts/style2.xml><?xml version="1.0" encoding="utf-8"?>
+<cs:chartStyle xmlns:cs="http://schemas.microsoft.com/office/drawing/2012/chartStyle" xmlns:a="http://schemas.openxmlformats.org/drawingml/2006/main" id="261">
+  <cs:axisTitle>
+    <cs:lnRef idx="0"/>
+    <cs:fillRef idx="0"/>
+    <cs:effectRef idx="0"/>
+    <cs:fontRef idx="minor">
+      <a:schemeClr val="dk1">
+        <a:lumMod val="65000"/>
+        <a:lumOff val="35000"/>
+      </a:schemeClr>
+    </cs:fontRef>
+    <cs:defRPr sz="900" kern="1200"/>
+  </cs:axisTitle>
+  <cs:categoryAxis>
+    <cs:lnRef idx="0"/>
+    <cs:fillRef idx="0"/>
+    <cs:effectRef idx="0"/>
+    <cs:fontRef idx="minor">
+      <a:schemeClr val="dk1">
+        <a:lumMod val="65000"/>
+        <a:lumOff val="35000"/>
+      </a:schemeClr>
+    </cs:fontRef>
+    <cs:defRPr sz="900" kern="1200"/>
+  </cs:categoryAxis>
+  <cs:chartArea>
+    <cs:lnRef idx="0"/>
+    <cs:fillRef idx="0"/>
+    <cs:effectRef idx="0"/>
+    <cs:fontRef idx="minor">
+      <a:schemeClr val="dk1"/>
+    </cs:fontRef>
+    <cs:spPr>
+      <a:pattFill prst="dkDnDiag">
+        <a:fgClr>
+          <a:schemeClr val="lt1">
+            <a:lumMod val="95000"/>
+          </a:schemeClr>
+        </a:fgClr>
+        <a:bgClr>
+          <a:schemeClr val="lt1"/>
+        </a:bgClr>
+      </a:pattFill>
+      <a:ln w="9525" cap="flat" cmpd="sng" algn="ctr">
+        <a:solidFill>
+          <a:schemeClr val="dk1">
+            <a:lumMod val="15000"/>
+            <a:lumOff val="85000"/>
+          </a:schemeClr>
+        </a:solidFill>
+        <a:round/>
+      </a:ln>
+    </cs:spPr>
+    <cs:defRPr sz="900" kern="1200"/>
+  </cs:chartArea>
+  <cs:dataLabel>
+    <cs:lnRef idx="0"/>
+    <cs:fillRef idx="0"/>
+    <cs:effectRef idx="0"/>
+    <cs:fontRef idx="minor">
+      <a:schemeClr val="lt1"/>
+    </cs:fontRef>
+    <cs:defRPr sz="900" b="1" i="0" u="none" strike="noStrike" kern="1200" baseline="0"/>
+  </cs:dataLabel>
+  <cs:dataLabelCallout>
+    <cs:lnRef idx="0"/>
+    <cs:fillRef idx="0"/>
+    <cs:effectRef idx="0"/>
+    <cs:fontRef idx="minor">
+      <a:schemeClr val="dk1">
+        <a:lumMod val="65000"/>
+        <a:lumOff val="35000"/>
+      </a:schemeClr>
+    </cs:fontRef>
+    <cs:spPr>
+      <a:solidFill>
+        <a:schemeClr val="lt1">
+          <a:alpha val="75000"/>
+        </a:schemeClr>
+      </a:solidFill>
+      <a:ln w="9525">
+        <a:solidFill>
+          <a:schemeClr val="dk1">
+            <a:lumMod val="25000"/>
+            <a:lumOff val="75000"/>
+          </a:schemeClr>
+        </a:solidFill>
+      </a:ln>
+    </cs:spPr>
+    <cs:defRPr sz="900" kern="1200"/>
+    <cs:bodyPr rot="0" spcFirstLastPara="1" vertOverflow="clip" horzOverflow="clip" vert="horz" wrap="square" lIns="36576" tIns="18288" rIns="36576" bIns="18288" anchor="ctr" anchorCtr="1">
+      <a:spAutoFit/>
+    </cs:bodyPr>
+  </cs:dataLabelCallout>
+  <cs:dataPoint>
+    <cs:lnRef idx="0"/>
+    <cs:fillRef idx="0">
+      <cs:styleClr val="auto"/>
+    </cs:fillRef>
+    <cs:effectRef idx="0"/>
+    <cs:fontRef idx="minor">
+      <a:schemeClr val="dk1"/>
+    </cs:fontRef>
+    <cs:spPr>
+      <a:solidFill>
+        <a:schemeClr val="phClr"/>
+      </a:solidFill>
+      <a:effectLst>
+        <a:outerShdw blurRad="317500" algn="ctr" rotWithShape="0">
+          <a:prstClr val="black">
+            <a:alpha val="25000"/>
+          </a:prstClr>
+        </a:outerShdw>
+      </a:effectLst>
+    </cs:spPr>
+  </cs:dataPoint>
+  <cs:dataPoint3D>
+    <cs:lnRef idx="0"/>
+    <cs:fillRef idx="0">
+      <cs:styleClr val="auto"/>
+    </cs:fillRef>
+    <cs:effectRef idx="0"/>
+    <cs:fontRef idx="minor">
+      <a:schemeClr val="dk1"/>
+    </cs:fontRef>
+    <cs:spPr>
+      <a:solidFill>
+        <a:schemeClr val="phClr"/>
+      </a:solidFill>
+      <a:effectLst>
+        <a:outerShdw blurRad="88900" sx="102000" sy="102000" algn="ctr" rotWithShape="0">
+          <a:prstClr val="black">
+            <a:alpha val="20000"/>
+          </a:prstClr>
+        </a:outerShdw>
+      </a:effectLst>
+      <a:scene3d>
+        <a:camera prst="orthographicFront"/>
+        <a:lightRig rig="threePt" dir="t"/>
+      </a:scene3d>
+      <a:sp3d prstMaterial="matte"/>
+    </cs:spPr>
+  </cs:dataPoint3D>
+  <cs:dataPointLine>
+    <cs:lnRef idx="0">
+      <cs:styleClr val="auto"/>
+    </cs:lnRef>
+    <cs:fillRef idx="0"/>
+    <cs:effectRef idx="0"/>
+    <cs:fontRef idx="minor">
+      <a:schemeClr val="dk1"/>
+    </cs:fontRef>
+    <cs:spPr>
+      <a:ln w="28575" cap="rnd">
+        <a:solidFill>
+          <a:schemeClr val="phClr"/>
+        </a:solidFill>
+        <a:round/>
+      </a:ln>
+    </cs:spPr>
+  </cs:dataPointLine>
+  <cs:dataPointMarker>
+    <cs:lnRef idx="0"/>
+    <cs:fillRef idx="0">
+      <cs:styleClr val="auto"/>
+    </cs:fillRef>
+    <cs:effectRef idx="0"/>
+    <cs:fontRef idx="minor">
+      <a:schemeClr val="dk1"/>
+    </cs:fontRef>
+    <cs:spPr>
+      <a:solidFill>
+        <a:schemeClr val="phClr"/>
+      </a:solidFill>
+      <a:ln w="9525">
+        <a:solidFill>
+          <a:schemeClr val="lt1"/>
+        </a:solidFill>
+      </a:ln>
+    </cs:spPr>
+  </cs:dataPointMarker>
+  <cs:dataPointMarkerLayout symbol="circle" size="6"/>
+  <cs:dataPointWireframe>
+    <cs:lnRef idx="0">
+      <cs:styleClr val="auto"/>
+    </cs:lnRef>
+    <cs:fillRef idx="0"/>
+    <cs:effectRef idx="0"/>
+    <cs:fontRef idx="minor">
+      <a:schemeClr val="dk1"/>
+    </cs:fontRef>
+    <cs:spPr>
+      <a:ln w="9525" cap="rnd">
+        <a:solidFill>
+          <a:schemeClr val="phClr"/>
+        </a:solidFill>
+        <a:round/>
+      </a:ln>
+    </cs:spPr>
+  </cs:dataPointWireframe>
+  <cs:dataTable>
+    <cs:lnRef idx="0"/>
+    <cs:fillRef idx="0"/>
+    <cs:effectRef idx="0"/>
+    <cs:fontRef idx="minor">
+      <a:schemeClr val="dk1">
+        <a:lumMod val="65000"/>
+        <a:lumOff val="35000"/>
+      </a:schemeClr>
+    </cs:fontRef>
+    <cs:spPr>
+      <a:noFill/>
+      <a:ln w="9525" cap="flat" cmpd="sng" algn="ctr">
+        <a:solidFill>
+          <a:schemeClr val="dk1">
+            <a:lumMod val="15000"/>
+            <a:lumOff val="85000"/>
+          </a:schemeClr>
+        </a:solidFill>
+        <a:round/>
+      </a:ln>
+    </cs:spPr>
+    <cs:defRPr sz="900" kern="1200"/>
+  </cs:dataTable>
+  <cs:downBar>
+    <cs:lnRef idx="0"/>
+    <cs:fillRef idx="0"/>
+    <cs:effectRef idx="0"/>
+    <cs:fontRef idx="minor">
+      <a:schemeClr val="dk1"/>
+    </cs:fontRef>
+    <cs:spPr>
+      <a:solidFill>
+        <a:schemeClr val="dk1">
+          <a:lumMod val="75000"/>
+          <a:lumOff val="25000"/>
+        </a:schemeClr>
+      </a:solidFill>
+      <a:ln w="9525" cap="flat" cmpd="sng" algn="ctr">
+        <a:solidFill>
+          <a:schemeClr val="dk1">
+            <a:lumMod val="65000"/>
+            <a:lumOff val="35000"/>
+          </a:schemeClr>
+        </a:solidFill>
+        <a:round/>
+      </a:ln>
+    </cs:spPr>
+  </cs:downBar>
+  <cs:dropLine>
+    <cs:lnRef idx="0"/>
+    <cs:fillRef idx="0"/>
+    <cs:effectRef idx="0"/>
+    <cs:fontRef idx="minor">
+      <a:schemeClr val="dk1"/>
+    </cs:fontRef>
+    <cs:spPr>
+      <a:ln w="9525" cap="flat" cmpd="sng" algn="ctr">
+        <a:solidFill>
+          <a:schemeClr val="dk1">
+            <a:lumMod val="35000"/>
+            <a:lumOff val="65000"/>
+          </a:schemeClr>
+        </a:solidFill>
+        <a:round/>
+      </a:ln>
+    </cs:spPr>
+  </cs:dropLine>
+  <cs:errorBar>
+    <cs:lnRef idx="0"/>
+    <cs:fillRef idx="0"/>
+    <cs:effectRef idx="0"/>
+    <cs:fontRef idx="minor">
+      <a:schemeClr val="dk1"/>
+    </cs:fontRef>
+    <cs:spPr>
+      <a:ln w="9525" cap="flat" cmpd="sng" algn="ctr">
+        <a:solidFill>
+          <a:schemeClr val="dk1">
+            <a:lumMod val="65000"/>
+            <a:lumOff val="35000"/>
+          </a:schemeClr>
+        </a:solidFill>
+        <a:round/>
+      </a:ln>
+    </cs:spPr>
+  </cs:errorBar>
+  <cs:floor>
+    <cs:lnRef idx="0"/>
+    <cs:fillRef idx="0"/>
+    <cs:effectRef idx="0"/>
+    <cs:fontRef idx="minor">
+      <a:schemeClr val="dk1"/>
+    </cs:fontRef>
+    <cs:spPr>
+      <a:noFill/>
+      <a:ln>
+        <a:noFill/>
+      </a:ln>
+    </cs:spPr>
+  </cs:floor>
+  <cs:gridlineMajor>
+    <cs:lnRef idx="0"/>
+    <cs:fillRef idx="0"/>
+    <cs:effectRef idx="0"/>
+    <cs:fontRef idx="minor">
+      <a:schemeClr val="dk1"/>
+    </cs:fontRef>
+    <cs:spPr>
+      <a:ln w="9525" cap="flat" cmpd="sng" algn="ctr">
+        <a:solidFill>
+          <a:schemeClr val="dk1">
+            <a:lumMod val="15000"/>
+            <a:lumOff val="85000"/>
+          </a:schemeClr>
+        </a:solidFill>
+        <a:round/>
+      </a:ln>
+    </cs:spPr>
+  </cs:gridlineMajor>
+  <cs:gridlineMinor>
+    <cs:lnRef idx="0"/>
+    <cs:fillRef idx="0"/>
+    <cs:effectRef idx="0"/>
+    <cs:fontRef idx="minor">
+      <a:schemeClr val="dk1"/>
+    </cs:fontRef>
+    <cs:spPr>
+      <a:ln w="9525" cap="flat" cmpd="sng" algn="ctr">
+        <a:solidFill>
+          <a:schemeClr val="dk1">
+            <a:lumMod val="5000"/>
+            <a:lumOff val="95000"/>
+          </a:schemeClr>
+        </a:solidFill>
+        <a:round/>
+      </a:ln>
+    </cs:spPr>
+  </cs:gridlineMinor>
+  <cs:hiLoLine>
+    <cs:lnRef idx="0"/>
+    <cs:fillRef idx="0"/>
+    <cs:effectRef idx="0"/>
+    <cs:fontRef idx="minor">
+      <a:schemeClr val="dk1"/>
+    </cs:fontRef>
+    <cs:spPr>
+      <a:ln w="9525" cap="flat" cmpd="sng" algn="ctr">
+        <a:solidFill>
+          <a:schemeClr val="dk1">
+            <a:lumMod val="50000"/>
+            <a:lumOff val="50000"/>
+          </a:schemeClr>
+        </a:solidFill>
+        <a:round/>
+      </a:ln>
+    </cs:spPr>
+  </cs:hiLoLine>
+  <cs:leaderLine>
+    <cs:lnRef idx="0"/>
+    <cs:fillRef idx="0"/>
+    <cs:effectRef idx="0"/>
+    <cs:fontRef idx="minor">
+      <a:schemeClr val="dk1"/>
+    </cs:fontRef>
+    <cs:spPr>
+      <a:ln w="9525" cap="flat" cmpd="sng" algn="ctr">
+        <a:solidFill>
+          <a:schemeClr val="dk1">
+            <a:lumMod val="35000"/>
+            <a:lumOff val="65000"/>
+          </a:schemeClr>
+        </a:solidFill>
+        <a:round/>
+      </a:ln>
+    </cs:spPr>
+  </cs:leaderLine>
+  <cs:legend>
+    <cs:lnRef idx="0"/>
+    <cs:fillRef idx="0"/>
+    <cs:effectRef idx="0"/>
+    <cs:fontRef idx="minor">
+      <a:schemeClr val="dk1">
+        <a:lumMod val="65000"/>
+        <a:lumOff val="35000"/>
+      </a:schemeClr>
+    </cs:fontRef>
+    <cs:spPr>
+      <a:solidFill>
+        <a:schemeClr val="lt1">
+          <a:alpha val="78000"/>
+        </a:schemeClr>
+      </a:solidFill>
+    </cs:spPr>
+    <cs:defRPr sz="900" kern="1200"/>
+  </cs:legend>
+  <cs:plotArea mods="allowNoFillOverride allowNoLineOverride">
+    <cs:lnRef idx="0"/>
+    <cs:fillRef idx="0"/>
+    <cs:effectRef idx="0"/>
+    <cs:fontRef idx="minor">
+      <a:schemeClr val="dk1"/>
+    </cs:fontRef>
+  </cs:plotArea>
+  <cs:plotArea3D mods="allowNoFillOverride allowNoLineOverride">
+    <cs:lnRef idx="0"/>
+    <cs:fillRef idx="0"/>
+    <cs:effectRef idx="0"/>
+    <cs:fontRef idx="minor">
+      <a:schemeClr val="dk1"/>
+    </cs:fontRef>
+  </cs:plotArea3D>
+  <cs:seriesAxis>
+    <cs:lnRef idx="0"/>
+    <cs:fillRef idx="0"/>
+    <cs:effectRef idx="0"/>
+    <cs:fontRef idx="minor">
+      <a:schemeClr val="dk1">
+        <a:lumMod val="65000"/>
+        <a:lumOff val="35000"/>
+      </a:schemeClr>
+    </cs:fontRef>
+    <cs:defRPr sz="900" kern="1200"/>
+  </cs:seriesAxis>
+  <cs:seriesLine>
+    <cs:lnRef idx="0"/>
+    <cs:fillRef idx="0"/>
+    <cs:effectRef idx="0"/>
+    <cs:fontRef idx="minor">
+      <a:schemeClr val="dk1"/>
+    </cs:fontRef>
+    <cs:spPr>
+      <a:ln w="9525" cap="flat" cmpd="sng" algn="ctr">
+        <a:solidFill>
+          <a:schemeClr val="dk1">
+            <a:lumMod val="35000"/>
+            <a:lumOff val="65000"/>
+          </a:schemeClr>
+        </a:solidFill>
+        <a:round/>
+      </a:ln>
+    </cs:spPr>
+  </cs:seriesLine>
+  <cs:title>
+    <cs:lnRef idx="0"/>
+    <cs:fillRef idx="0"/>
+    <cs:effectRef idx="0"/>
+    <cs:fontRef idx="minor">
+      <a:schemeClr val="dk1">
+        <a:lumMod val="65000"/>
+        <a:lumOff val="35000"/>
+      </a:schemeClr>
+    </cs:fontRef>
+    <cs:defRPr sz="1800" b="1" kern="1200" baseline="0"/>
+  </cs:title>
+  <cs:trendline>
+    <cs:lnRef idx="0">
+      <cs:styleClr val="auto"/>
+    </cs:lnRef>
+    <cs:fillRef idx="0"/>
+    <cs:effectRef idx="0"/>
+    <cs:fontRef idx="minor">
+      <a:schemeClr val="dk1"/>
+    </cs:fontRef>
+    <cs:spPr>
+      <a:ln w="19050" cap="rnd">
+        <a:solidFill>
+          <a:schemeClr val="phClr"/>
+        </a:solidFill>
+        <a:prstDash val="sysDash"/>
+      </a:ln>
+    </cs:spPr>
+  </cs:trendline>
+  <cs:trendlineLabel>
+    <cs:lnRef idx="0"/>
+    <cs:fillRef idx="0"/>
+    <cs:effectRef idx="0"/>
+    <cs:fontRef idx="minor">
+      <a:schemeClr val="dk1">
+        <a:lumMod val="65000"/>
+        <a:lumOff val="35000"/>
+      </a:schemeClr>
+    </cs:fontRef>
+    <cs:defRPr sz="900" kern="1200"/>
+  </cs:trendlineLabel>
+  <cs:upBar>
+    <cs:lnRef idx="0"/>
+    <cs:fillRef idx="0"/>
+    <cs:effectRef idx="0"/>
+    <cs:fontRef idx="minor">
+      <a:schemeClr val="dk1"/>
+    </cs:fontRef>
+    <cs:spPr>
+      <a:solidFill>
+        <a:schemeClr val="lt1"/>
+      </a:solidFill>
+      <a:ln w="9525" cap="flat" cmpd="sng" algn="ctr">
+        <a:solidFill>
+          <a:schemeClr val="dk1">
+            <a:lumMod val="65000"/>
+            <a:lumOff val="35000"/>
+          </a:schemeClr>
+        </a:solidFill>
+        <a:round/>
+      </a:ln>
+    </cs:spPr>
+  </cs:upBar>
+  <cs:valueAxis>
+    <cs:lnRef idx="0"/>
+    <cs:fillRef idx="0"/>
+    <cs:effectRef idx="0"/>
+    <cs:fontRef idx="minor">
+      <a:schemeClr val="dk1">
+        <a:lumMod val="65000"/>
+        <a:lumOff val="35000"/>
+      </a:schemeClr>
+    </cs:fontRef>
+    <cs:defRPr sz="900" kern="1200"/>
+  </cs:valueAxis>
+  <cs:wall>
+    <cs:lnRef idx="0"/>
+    <cs:fillRef idx="0"/>
+    <cs:effectRef idx="0"/>
+    <cs:fontRef idx="minor">
+      <a:schemeClr val="dk1"/>
+    </cs:fontRef>
+  </cs:wall>
+</cs:chartStyle>
+</file>
+
+<file path=ppt/charts/style3.xml><?xml version="1.0" encoding="utf-8"?>
+<cs:chartStyle xmlns:cs="http://schemas.microsoft.com/office/drawing/2012/chartStyle" xmlns:a="http://schemas.openxmlformats.org/drawingml/2006/main" id="261">
+  <cs:axisTitle>
+    <cs:lnRef idx="0"/>
+    <cs:fillRef idx="0"/>
+    <cs:effectRef idx="0"/>
+    <cs:fontRef idx="minor">
+      <a:schemeClr val="dk1">
+        <a:lumMod val="65000"/>
+        <a:lumOff val="35000"/>
+      </a:schemeClr>
+    </cs:fontRef>
+    <cs:defRPr sz="900" kern="1200"/>
+  </cs:axisTitle>
+  <cs:categoryAxis>
+    <cs:lnRef idx="0"/>
+    <cs:fillRef idx="0"/>
+    <cs:effectRef idx="0"/>
+    <cs:fontRef idx="minor">
+      <a:schemeClr val="dk1">
+        <a:lumMod val="65000"/>
+        <a:lumOff val="35000"/>
+      </a:schemeClr>
+    </cs:fontRef>
+    <cs:defRPr sz="900" kern="1200"/>
+  </cs:categoryAxis>
+  <cs:chartArea>
+    <cs:lnRef idx="0"/>
+    <cs:fillRef idx="0"/>
+    <cs:effectRef idx="0"/>
+    <cs:fontRef idx="minor">
+      <a:schemeClr val="dk1"/>
+    </cs:fontRef>
+    <cs:spPr>
+      <a:pattFill prst="dkDnDiag">
+        <a:fgClr>
+          <a:schemeClr val="lt1">
+            <a:lumMod val="95000"/>
+          </a:schemeClr>
+        </a:fgClr>
+        <a:bgClr>
+          <a:schemeClr val="lt1"/>
+        </a:bgClr>
+      </a:pattFill>
+      <a:ln w="9525" cap="flat" cmpd="sng" algn="ctr">
+        <a:solidFill>
+          <a:schemeClr val="dk1">
+            <a:lumMod val="15000"/>
+            <a:lumOff val="85000"/>
+          </a:schemeClr>
+        </a:solidFill>
+        <a:round/>
+      </a:ln>
+    </cs:spPr>
+    <cs:defRPr sz="900" kern="1200"/>
+  </cs:chartArea>
+  <cs:dataLabel>
+    <cs:lnRef idx="0"/>
+    <cs:fillRef idx="0"/>
+    <cs:effectRef idx="0"/>
+    <cs:fontRef idx="minor">
+      <a:schemeClr val="lt1"/>
+    </cs:fontRef>
+    <cs:defRPr sz="900" b="1" i="0" u="none" strike="noStrike" kern="1200" baseline="0"/>
+  </cs:dataLabel>
+  <cs:dataLabelCallout>
+    <cs:lnRef idx="0"/>
+    <cs:fillRef idx="0"/>
+    <cs:effectRef idx="0"/>
+    <cs:fontRef idx="minor">
+      <a:schemeClr val="dk1">
+        <a:lumMod val="65000"/>
+        <a:lumOff val="35000"/>
+      </a:schemeClr>
+    </cs:fontRef>
+    <cs:spPr>
+      <a:solidFill>
+        <a:schemeClr val="lt1">
+          <a:alpha val="75000"/>
+        </a:schemeClr>
+      </a:solidFill>
+      <a:ln w="9525">
+        <a:solidFill>
+          <a:schemeClr val="dk1">
+            <a:lumMod val="25000"/>
+            <a:lumOff val="75000"/>
+          </a:schemeClr>
+        </a:solidFill>
+      </a:ln>
+    </cs:spPr>
+    <cs:defRPr sz="900" kern="1200"/>
+    <cs:bodyPr rot="0" spcFirstLastPara="1" vertOverflow="clip" horzOverflow="clip" vert="horz" wrap="square" lIns="36576" tIns="18288" rIns="36576" bIns="18288" anchor="ctr" anchorCtr="1">
+      <a:spAutoFit/>
+    </cs:bodyPr>
+  </cs:dataLabelCallout>
+  <cs:dataPoint>
+    <cs:lnRef idx="0"/>
+    <cs:fillRef idx="0">
+      <cs:styleClr val="auto"/>
+    </cs:fillRef>
+    <cs:effectRef idx="0"/>
+    <cs:fontRef idx="minor">
+      <a:schemeClr val="dk1"/>
+    </cs:fontRef>
+    <cs:spPr>
+      <a:solidFill>
+        <a:schemeClr val="phClr"/>
+      </a:solidFill>
+      <a:effectLst>
+        <a:outerShdw blurRad="317500" algn="ctr" rotWithShape="0">
+          <a:prstClr val="black">
+            <a:alpha val="25000"/>
+          </a:prstClr>
+        </a:outerShdw>
+      </a:effectLst>
+    </cs:spPr>
+  </cs:dataPoint>
+  <cs:dataPoint3D>
+    <cs:lnRef idx="0"/>
+    <cs:fillRef idx="0">
+      <cs:styleClr val="auto"/>
+    </cs:fillRef>
+    <cs:effectRef idx="0"/>
+    <cs:fontRef idx="minor">
+      <a:schemeClr val="dk1"/>
+    </cs:fontRef>
+    <cs:spPr>
+      <a:solidFill>
+        <a:schemeClr val="phClr"/>
+      </a:solidFill>
+      <a:effectLst>
+        <a:outerShdw blurRad="88900" sx="102000" sy="102000" algn="ctr" rotWithShape="0">
+          <a:prstClr val="black">
+            <a:alpha val="20000"/>
+          </a:prstClr>
+        </a:outerShdw>
+      </a:effectLst>
+      <a:scene3d>
+        <a:camera prst="orthographicFront"/>
+        <a:lightRig rig="threePt" dir="t"/>
+      </a:scene3d>
+      <a:sp3d prstMaterial="matte"/>
+    </cs:spPr>
+  </cs:dataPoint3D>
+  <cs:dataPointLine>
+    <cs:lnRef idx="0">
+      <cs:styleClr val="auto"/>
+    </cs:lnRef>
+    <cs:fillRef idx="0"/>
+    <cs:effectRef idx="0"/>
+    <cs:fontRef idx="minor">
+      <a:schemeClr val="dk1"/>
+    </cs:fontRef>
+    <cs:spPr>
+      <a:ln w="28575" cap="rnd">
+        <a:solidFill>
+          <a:schemeClr val="phClr"/>
+        </a:solidFill>
+        <a:round/>
+      </a:ln>
+    </cs:spPr>
+  </cs:dataPointLine>
+  <cs:dataPointMarker>
+    <cs:lnRef idx="0"/>
+    <cs:fillRef idx="0">
+      <cs:styleClr val="auto"/>
+    </cs:fillRef>
+    <cs:effectRef idx="0"/>
+    <cs:fontRef idx="minor">
+      <a:schemeClr val="dk1"/>
+    </cs:fontRef>
+    <cs:spPr>
+      <a:solidFill>
+        <a:schemeClr val="phClr"/>
+      </a:solidFill>
+      <a:ln w="9525">
+        <a:solidFill>
+          <a:schemeClr val="lt1"/>
+        </a:solidFill>
+      </a:ln>
+    </cs:spPr>
+  </cs:dataPointMarker>
+  <cs:dataPointMarkerLayout symbol="circle" size="6"/>
+  <cs:dataPointWireframe>
+    <cs:lnRef idx="0">
+      <cs:styleClr val="auto"/>
+    </cs:lnRef>
+    <cs:fillRef idx="0"/>
+    <cs:effectRef idx="0"/>
+    <cs:fontRef idx="minor">
+      <a:schemeClr val="dk1"/>
+    </cs:fontRef>
+    <cs:spPr>
+      <a:ln w="9525" cap="rnd">
+        <a:solidFill>
+          <a:schemeClr val="phClr"/>
+        </a:solidFill>
+        <a:round/>
+      </a:ln>
+    </cs:spPr>
+  </cs:dataPointWireframe>
+  <cs:dataTable>
+    <cs:lnRef idx="0"/>
+    <cs:fillRef idx="0"/>
+    <cs:effectRef idx="0"/>
+    <cs:fontRef idx="minor">
+      <a:schemeClr val="dk1">
+        <a:lumMod val="65000"/>
+        <a:lumOff val="35000"/>
+      </a:schemeClr>
+    </cs:fontRef>
+    <cs:spPr>
+      <a:noFill/>
+      <a:ln w="9525" cap="flat" cmpd="sng" algn="ctr">
+        <a:solidFill>
+          <a:schemeClr val="dk1">
+            <a:lumMod val="15000"/>
+            <a:lumOff val="85000"/>
+          </a:schemeClr>
+        </a:solidFill>
+        <a:round/>
+      </a:ln>
+    </cs:spPr>
+    <cs:defRPr sz="900" kern="1200"/>
+  </cs:dataTable>
+  <cs:downBar>
+    <cs:lnRef idx="0"/>
+    <cs:fillRef idx="0"/>
+    <cs:effectRef idx="0"/>
+    <cs:fontRef idx="minor">
+      <a:schemeClr val="dk1"/>
+    </cs:fontRef>
+    <cs:spPr>
+      <a:solidFill>
+        <a:schemeClr val="dk1">
+          <a:lumMod val="75000"/>
+          <a:lumOff val="25000"/>
+        </a:schemeClr>
+      </a:solidFill>
+      <a:ln w="9525" cap="flat" cmpd="sng" algn="ctr">
+        <a:solidFill>
+          <a:schemeClr val="dk1">
+            <a:lumMod val="65000"/>
+            <a:lumOff val="35000"/>
+          </a:schemeClr>
+        </a:solidFill>
+        <a:round/>
+      </a:ln>
+    </cs:spPr>
+  </cs:downBar>
+  <cs:dropLine>
+    <cs:lnRef idx="0"/>
+    <cs:fillRef idx="0"/>
+    <cs:effectRef idx="0"/>
+    <cs:fontRef idx="minor">
+      <a:schemeClr val="dk1"/>
+    </cs:fontRef>
+    <cs:spPr>
+      <a:ln w="9525" cap="flat" cmpd="sng" algn="ctr">
+        <a:solidFill>
+          <a:schemeClr val="dk1">
+            <a:lumMod val="35000"/>
+            <a:lumOff val="65000"/>
+          </a:schemeClr>
+        </a:solidFill>
+        <a:round/>
+      </a:ln>
+    </cs:spPr>
+  </cs:dropLine>
+  <cs:errorBar>
+    <cs:lnRef idx="0"/>
+    <cs:fillRef idx="0"/>
+    <cs:effectRef idx="0"/>
+    <cs:fontRef idx="minor">
+      <a:schemeClr val="dk1"/>
+    </cs:fontRef>
+    <cs:spPr>
+      <a:ln w="9525" cap="flat" cmpd="sng" algn="ctr">
+        <a:solidFill>
+          <a:schemeClr val="dk1">
+            <a:lumMod val="65000"/>
+            <a:lumOff val="35000"/>
+          </a:schemeClr>
+        </a:solidFill>
+        <a:round/>
+      </a:ln>
+    </cs:spPr>
+  </cs:errorBar>
+  <cs:floor>
+    <cs:lnRef idx="0"/>
+    <cs:fillRef idx="0"/>
+    <cs:effectRef idx="0"/>
+    <cs:fontRef idx="minor">
+      <a:schemeClr val="dk1"/>
+    </cs:fontRef>
+    <cs:spPr>
+      <a:noFill/>
+      <a:ln>
+        <a:noFill/>
+      </a:ln>
+    </cs:spPr>
+  </cs:floor>
+  <cs:gridlineMajor>
+    <cs:lnRef idx="0"/>
+    <cs:fillRef idx="0"/>
+    <cs:effectRef idx="0"/>
+    <cs:fontRef idx="minor">
+      <a:schemeClr val="dk1"/>
+    </cs:fontRef>
+    <cs:spPr>
+      <a:ln w="9525" cap="flat" cmpd="sng" algn="ctr">
+        <a:solidFill>
+          <a:schemeClr val="dk1">
+            <a:lumMod val="15000"/>
+            <a:lumOff val="85000"/>
+          </a:schemeClr>
+        </a:solidFill>
+        <a:round/>
+      </a:ln>
+    </cs:spPr>
+  </cs:gridlineMajor>
+  <cs:gridlineMinor>
+    <cs:lnRef idx="0"/>
+    <cs:fillRef idx="0"/>
+    <cs:effectRef idx="0"/>
+    <cs:fontRef idx="minor">
+      <a:schemeClr val="dk1"/>
+    </cs:fontRef>
+    <cs:spPr>
+      <a:ln w="9525" cap="flat" cmpd="sng" algn="ctr">
+        <a:solidFill>
+          <a:schemeClr val="dk1">
+            <a:lumMod val="5000"/>
+            <a:lumOff val="95000"/>
+          </a:schemeClr>
+        </a:solidFill>
+        <a:round/>
+      </a:ln>
+    </cs:spPr>
+  </cs:gridlineMinor>
+  <cs:hiLoLine>
+    <cs:lnRef idx="0"/>
+    <cs:fillRef idx="0"/>
+    <cs:effectRef idx="0"/>
+    <cs:fontRef idx="minor">
+      <a:schemeClr val="dk1"/>
+    </cs:fontRef>
+    <cs:spPr>
+      <a:ln w="9525" cap="flat" cmpd="sng" algn="ctr">
+        <a:solidFill>
+          <a:schemeClr val="dk1">
+            <a:lumMod val="50000"/>
+            <a:lumOff val="50000"/>
+          </a:schemeClr>
+        </a:solidFill>
+        <a:round/>
+      </a:ln>
+    </cs:spPr>
+  </cs:hiLoLine>
+  <cs:leaderLine>
+    <cs:lnRef idx="0"/>
+    <cs:fillRef idx="0"/>
+    <cs:effectRef idx="0"/>
+    <cs:fontRef idx="minor">
+      <a:schemeClr val="dk1"/>
+    </cs:fontRef>
+    <cs:spPr>
+      <a:ln w="9525" cap="flat" cmpd="sng" algn="ctr">
+        <a:solidFill>
+          <a:schemeClr val="dk1">
+            <a:lumMod val="35000"/>
+            <a:lumOff val="65000"/>
+          </a:schemeClr>
+        </a:solidFill>
+        <a:round/>
+      </a:ln>
+    </cs:spPr>
+  </cs:leaderLine>
+  <cs:legend>
+    <cs:lnRef idx="0"/>
+    <cs:fillRef idx="0"/>
+    <cs:effectRef idx="0"/>
+    <cs:fontRef idx="minor">
+      <a:schemeClr val="dk1">
+        <a:lumMod val="65000"/>
+        <a:lumOff val="35000"/>
+      </a:schemeClr>
+    </cs:fontRef>
+    <cs:spPr>
+      <a:solidFill>
+        <a:schemeClr val="lt1">
+          <a:alpha val="78000"/>
+        </a:schemeClr>
+      </a:solidFill>
+    </cs:spPr>
+    <cs:defRPr sz="900" kern="1200"/>
+  </cs:legend>
+  <cs:plotArea mods="allowNoFillOverride allowNoLineOverride">
+    <cs:lnRef idx="0"/>
+    <cs:fillRef idx="0"/>
+    <cs:effectRef idx="0"/>
+    <cs:fontRef idx="minor">
+      <a:schemeClr val="dk1"/>
+    </cs:fontRef>
+  </cs:plotArea>
+  <cs:plotArea3D mods="allowNoFillOverride allowNoLineOverride">
+    <cs:lnRef idx="0"/>
+    <cs:fillRef idx="0"/>
+    <cs:effectRef idx="0"/>
+    <cs:fontRef idx="minor">
+      <a:schemeClr val="dk1"/>
+    </cs:fontRef>
+  </cs:plotArea3D>
+  <cs:seriesAxis>
+    <cs:lnRef idx="0"/>
+    <cs:fillRef idx="0"/>
+    <cs:effectRef idx="0"/>
+    <cs:fontRef idx="minor">
+      <a:schemeClr val="dk1">
+        <a:lumMod val="65000"/>
+        <a:lumOff val="35000"/>
+      </a:schemeClr>
+    </cs:fontRef>
+    <cs:defRPr sz="900" kern="1200"/>
+  </cs:seriesAxis>
+  <cs:seriesLine>
+    <cs:lnRef idx="0"/>
+    <cs:fillRef idx="0"/>
+    <cs:effectRef idx="0"/>
+    <cs:fontRef idx="minor">
+      <a:schemeClr val="dk1"/>
+    </cs:fontRef>
+    <cs:spPr>
+      <a:ln w="9525" cap="flat" cmpd="sng" algn="ctr">
+        <a:solidFill>
+          <a:schemeClr val="dk1">
+            <a:lumMod val="35000"/>
+            <a:lumOff val="65000"/>
+          </a:schemeClr>
+        </a:solidFill>
+        <a:round/>
+      </a:ln>
+    </cs:spPr>
+  </cs:seriesLine>
+  <cs:title>
+    <cs:lnRef idx="0"/>
+    <cs:fillRef idx="0"/>
+    <cs:effectRef idx="0"/>
+    <cs:fontRef idx="minor">
+      <a:schemeClr val="dk1">
+        <a:lumMod val="65000"/>
+        <a:lumOff val="35000"/>
+      </a:schemeClr>
+    </cs:fontRef>
+    <cs:defRPr sz="1800" b="1" kern="1200" baseline="0"/>
+  </cs:title>
+  <cs:trendline>
+    <cs:lnRef idx="0">
+      <cs:styleClr val="auto"/>
+    </cs:lnRef>
+    <cs:fillRef idx="0"/>
+    <cs:effectRef idx="0"/>
+    <cs:fontRef idx="minor">
+      <a:schemeClr val="dk1"/>
+    </cs:fontRef>
+    <cs:spPr>
+      <a:ln w="19050" cap="rnd">
+        <a:solidFill>
+          <a:schemeClr val="phClr"/>
+        </a:solidFill>
+        <a:prstDash val="sysDash"/>
+      </a:ln>
+    </cs:spPr>
+  </cs:trendline>
+  <cs:trendlineLabel>
+    <cs:lnRef idx="0"/>
+    <cs:fillRef idx="0"/>
+    <cs:effectRef idx="0"/>
+    <cs:fontRef idx="minor">
+      <a:schemeClr val="dk1">
+        <a:lumMod val="65000"/>
+        <a:lumOff val="35000"/>
+      </a:schemeClr>
+    </cs:fontRef>
+    <cs:defRPr sz="900" kern="1200"/>
+  </cs:trendlineLabel>
+  <cs:upBar>
+    <cs:lnRef idx="0"/>
+    <cs:fillRef idx="0"/>
+    <cs:effectRef idx="0"/>
+    <cs:fontRef idx="minor">
+      <a:schemeClr val="dk1"/>
+    </cs:fontRef>
+    <cs:spPr>
+      <a:solidFill>
+        <a:schemeClr val="lt1"/>
+      </a:solidFill>
+      <a:ln w="9525" cap="flat" cmpd="sng" algn="ctr">
+        <a:solidFill>
+          <a:schemeClr val="dk1">
+            <a:lumMod val="65000"/>
+            <a:lumOff val="35000"/>
+          </a:schemeClr>
+        </a:solidFill>
+        <a:round/>
+      </a:ln>
+    </cs:spPr>
+  </cs:upBar>
+  <cs:valueAxis>
+    <cs:lnRef idx="0"/>
+    <cs:fillRef idx="0"/>
+    <cs:effectRef idx="0"/>
+    <cs:fontRef idx="minor">
+      <a:schemeClr val="dk1">
+        <a:lumMod val="65000"/>
+        <a:lumOff val="35000"/>
+      </a:schemeClr>
+    </cs:fontRef>
+    <cs:defRPr sz="900" kern="1200"/>
+  </cs:valueAxis>
+  <cs:wall>
+    <cs:lnRef idx="0"/>
+    <cs:fillRef idx="0"/>
+    <cs:effectRef idx="0"/>
+    <cs:fontRef idx="minor">
+      <a:schemeClr val="dk1"/>
+    </cs:fontRef>
+  </cs:wall>
+</cs:chartStyle>
+</file>
+
+<file path=ppt/charts/style4.xml><?xml version="1.0" encoding="utf-8"?>
 <cs:chartStyle xmlns:cs="http://schemas.microsoft.com/office/drawing/2012/chartStyle" xmlns:a="http://schemas.openxmlformats.org/drawingml/2006/main" id="261">
   <cs:axisTitle>
     <cs:lnRef idx="0"/>
@@ -8151,6 +11345,96 @@
           </a:p>
         </p:txBody>
       </p:sp>
+      <p:graphicFrame>
+        <p:nvGraphicFramePr>
+          <p:cNvPr id="8" name="Graphique 7">
+            <a:extLst>
+              <a:ext uri="{FF2B5EF4-FFF2-40B4-BE49-F238E27FC236}">
+                <a16:creationId xmlns:a16="http://schemas.microsoft.com/office/drawing/2014/main" id="{305DD662-A9E6-1624-2A68-98EBF3CBD4C7}"/>
+              </a:ext>
+            </a:extLst>
+          </p:cNvPr>
+          <p:cNvGraphicFramePr>
+            <a:graphicFrameLocks/>
+          </p:cNvGraphicFramePr>
+          <p:nvPr>
+            <p:extLst>
+              <p:ext uri="{D42A27DB-BD31-4B8C-83A1-F6EECF244321}">
+                <p14:modId xmlns:p14="http://schemas.microsoft.com/office/powerpoint/2010/main" val="1496807423"/>
+              </p:ext>
+            </p:extLst>
+          </p:nvPr>
+        </p:nvGraphicFramePr>
+        <p:xfrm>
+          <a:off x="274768" y="1690688"/>
+          <a:ext cx="3808207" cy="3932498"/>
+        </p:xfrm>
+        <a:graphic>
+          <a:graphicData uri="http://schemas.openxmlformats.org/drawingml/2006/chart">
+            <c:chart xmlns:c="http://schemas.openxmlformats.org/drawingml/2006/chart" xmlns:r="http://schemas.openxmlformats.org/officeDocument/2006/relationships" r:id="rId2"/>
+          </a:graphicData>
+        </a:graphic>
+      </p:graphicFrame>
+      <p:graphicFrame>
+        <p:nvGraphicFramePr>
+          <p:cNvPr id="9" name="Graphique 8">
+            <a:extLst>
+              <a:ext uri="{FF2B5EF4-FFF2-40B4-BE49-F238E27FC236}">
+                <a16:creationId xmlns:a16="http://schemas.microsoft.com/office/drawing/2014/main" id="{9FC360F4-B101-7CD6-A1C7-729E2A2773F6}"/>
+              </a:ext>
+            </a:extLst>
+          </p:cNvPr>
+          <p:cNvGraphicFramePr>
+            <a:graphicFrameLocks/>
+          </p:cNvGraphicFramePr>
+          <p:nvPr>
+            <p:extLst>
+              <p:ext uri="{D42A27DB-BD31-4B8C-83A1-F6EECF244321}">
+                <p14:modId xmlns:p14="http://schemas.microsoft.com/office/powerpoint/2010/main" val="3993416024"/>
+              </p:ext>
+            </p:extLst>
+          </p:nvPr>
+        </p:nvGraphicFramePr>
+        <p:xfrm>
+          <a:off x="4271682" y="1696851"/>
+          <a:ext cx="3648636" cy="3932498"/>
+        </p:xfrm>
+        <a:graphic>
+          <a:graphicData uri="http://schemas.openxmlformats.org/drawingml/2006/chart">
+            <c:chart xmlns:c="http://schemas.openxmlformats.org/drawingml/2006/chart" xmlns:r="http://schemas.openxmlformats.org/officeDocument/2006/relationships" r:id="rId3"/>
+          </a:graphicData>
+        </a:graphic>
+      </p:graphicFrame>
+      <p:graphicFrame>
+        <p:nvGraphicFramePr>
+          <p:cNvPr id="10" name="Graphique 9">
+            <a:extLst>
+              <a:ext uri="{FF2B5EF4-FFF2-40B4-BE49-F238E27FC236}">
+                <a16:creationId xmlns:a16="http://schemas.microsoft.com/office/drawing/2014/main" id="{8AAC310F-5EDC-8D47-54AA-80FEF5C52D45}"/>
+              </a:ext>
+            </a:extLst>
+          </p:cNvPr>
+          <p:cNvGraphicFramePr>
+            <a:graphicFrameLocks/>
+          </p:cNvGraphicFramePr>
+          <p:nvPr>
+            <p:extLst>
+              <p:ext uri="{D42A27DB-BD31-4B8C-83A1-F6EECF244321}">
+                <p14:modId xmlns:p14="http://schemas.microsoft.com/office/powerpoint/2010/main" val="1427926605"/>
+              </p:ext>
+            </p:extLst>
+          </p:nvPr>
+        </p:nvGraphicFramePr>
+        <p:xfrm>
+          <a:off x="8109025" y="1690688"/>
+          <a:ext cx="3648637" cy="3938661"/>
+        </p:xfrm>
+        <a:graphic>
+          <a:graphicData uri="http://schemas.openxmlformats.org/drawingml/2006/chart">
+            <c:chart xmlns:c="http://schemas.openxmlformats.org/drawingml/2006/chart" xmlns:r="http://schemas.openxmlformats.org/officeDocument/2006/relationships" r:id="rId4"/>
+          </a:graphicData>
+        </a:graphic>
+      </p:graphicFrame>
     </p:spTree>
     <p:extLst>
       <p:ext uri="{BB962C8B-B14F-4D97-AF65-F5344CB8AC3E}">

</xml_diff>